<commit_message>
Improve explanation of timing processes by providing definitions of speedup and Amdahl's law.
</commit_message>
<xml_diff>
--- a/lecture-2/presentation-2.pptx
+++ b/lecture-2/presentation-2.pptx
@@ -3199,7 +3199,7 @@
           <a:p>
             <a:fld id="{E758746B-B0EA-CA41-BB8E-A8C6FE44757D}" type="datetimeFigureOut">
               <a:rPr lang="en-US"/>
-              <a:t>10/10/19</a:t>
+              <a:t>10/17/19</a:t>
             </a:fld>
             <a:endParaRPr lang="en-US" dirty="0"/>
           </a:p>
@@ -3614,7 +3614,7 @@
             <a:fld id="{B61BEF0D-F0BB-DE4B-95CE-6DB70DBA9567}" type="datetimeFigureOut">
               <a:rPr lang="en-US"/>
               <a:pPr/>
-              <a:t>10/10/19</a:t>
+              <a:t>10/17/19</a:t>
             </a:fld>
             <a:endParaRPr lang="en-US" dirty="0"/>
           </a:p>
@@ -3826,7 +3826,7 @@
             <a:fld id="{B61BEF0D-F0BB-DE4B-95CE-6DB70DBA9567}" type="datetimeFigureOut">
               <a:rPr lang="en-US"/>
               <a:pPr/>
-              <a:t>10/10/19</a:t>
+              <a:t>10/17/19</a:t>
             </a:fld>
             <a:endParaRPr lang="en-US" dirty="0"/>
           </a:p>
@@ -4048,7 +4048,7 @@
             <a:fld id="{B61BEF0D-F0BB-DE4B-95CE-6DB70DBA9567}" type="datetimeFigureOut">
               <a:rPr lang="en-US"/>
               <a:pPr/>
-              <a:t>10/10/19</a:t>
+              <a:t>10/17/19</a:t>
             </a:fld>
             <a:endParaRPr lang="en-US" dirty="0"/>
           </a:p>
@@ -4260,7 +4260,7 @@
             <a:fld id="{B61BEF0D-F0BB-DE4B-95CE-6DB70DBA9567}" type="datetimeFigureOut">
               <a:rPr lang="en-US"/>
               <a:pPr/>
-              <a:t>10/10/19</a:t>
+              <a:t>10/17/19</a:t>
             </a:fld>
             <a:endParaRPr lang="en-US" dirty="0"/>
           </a:p>
@@ -4549,7 +4549,7 @@
             <a:fld id="{B61BEF0D-F0BB-DE4B-95CE-6DB70DBA9567}" type="datetimeFigureOut">
               <a:rPr lang="en-US"/>
               <a:pPr/>
-              <a:t>10/10/19</a:t>
+              <a:t>10/17/19</a:t>
             </a:fld>
             <a:endParaRPr lang="en-US" dirty="0"/>
           </a:p>
@@ -4828,7 +4828,7 @@
             <a:fld id="{B61BEF0D-F0BB-DE4B-95CE-6DB70DBA9567}" type="datetimeFigureOut">
               <a:rPr lang="en-US"/>
               <a:pPr/>
-              <a:t>10/10/19</a:t>
+              <a:t>10/17/19</a:t>
             </a:fld>
             <a:endParaRPr lang="en-US" dirty="0"/>
           </a:p>
@@ -5254,7 +5254,7 @@
             <a:fld id="{B61BEF0D-F0BB-DE4B-95CE-6DB70DBA9567}" type="datetimeFigureOut">
               <a:rPr lang="en-US"/>
               <a:pPr/>
-              <a:t>10/10/19</a:t>
+              <a:t>10/17/19</a:t>
             </a:fld>
             <a:endParaRPr lang="en-US" dirty="0"/>
           </a:p>
@@ -5397,7 +5397,7 @@
             <a:fld id="{B61BEF0D-F0BB-DE4B-95CE-6DB70DBA9567}" type="datetimeFigureOut">
               <a:rPr lang="en-US"/>
               <a:pPr/>
-              <a:t>10/10/19</a:t>
+              <a:t>10/17/19</a:t>
             </a:fld>
             <a:endParaRPr lang="en-US" dirty="0"/>
           </a:p>
@@ -5524,7 +5524,7 @@
             <a:fld id="{B61BEF0D-F0BB-DE4B-95CE-6DB70DBA9567}" type="datetimeFigureOut">
               <a:rPr lang="en-US"/>
               <a:pPr/>
-              <a:t>10/10/19</a:t>
+              <a:t>10/17/19</a:t>
             </a:fld>
             <a:endParaRPr lang="en-US" dirty="0"/>
           </a:p>
@@ -5849,7 +5849,7 @@
             <a:fld id="{B61BEF0D-F0BB-DE4B-95CE-6DB70DBA9567}" type="datetimeFigureOut">
               <a:rPr lang="en-US"/>
               <a:pPr/>
-              <a:t>10/10/19</a:t>
+              <a:t>10/17/19</a:t>
             </a:fld>
             <a:endParaRPr lang="en-US" dirty="0"/>
           </a:p>
@@ -6151,7 +6151,7 @@
             <a:fld id="{B61BEF0D-F0BB-DE4B-95CE-6DB70DBA9567}" type="datetimeFigureOut">
               <a:rPr lang="en-US"/>
               <a:pPr/>
-              <a:t>10/10/19</a:t>
+              <a:t>10/17/19</a:t>
             </a:fld>
             <a:endParaRPr lang="en-US" dirty="0"/>
           </a:p>
@@ -6406,7 +6406,7 @@
             <a:fld id="{B61BEF0D-F0BB-DE4B-95CE-6DB70DBA9567}" type="datetimeFigureOut">
               <a:rPr lang="en-US"/>
               <a:pPr/>
-              <a:t>10/10/19</a:t>
+              <a:t>10/17/19</a:t>
             </a:fld>
             <a:endParaRPr lang="en-US" dirty="0"/>
           </a:p>
@@ -11642,47 +11642,415 @@
           </a:fontRef>
         </p:style>
       </p:cxnSp>
-      <p:sp>
-        <p:nvSpPr>
-          <p:cNvPr id="3" name="Content Placeholder 2">
-            <a:extLst>
-              <a:ext uri="{FF2B5EF4-FFF2-40B4-BE49-F238E27FC236}">
-                <a16:creationId xmlns:a16="http://schemas.microsoft.com/office/drawing/2014/main" id="{A602302E-CFBE-BA46-A497-5E7A00F2A596}"/>
-              </a:ext>
-            </a:extLst>
-          </p:cNvPr>
-          <p:cNvSpPr>
-            <a:spLocks noGrp="1"/>
-          </p:cNvSpPr>
-          <p:nvPr>
-            <p:ph idx="1"/>
-          </p:nvPr>
-        </p:nvSpPr>
-        <p:spPr>
-          <a:xfrm>
-            <a:off x="4976031" y="963877"/>
-            <a:ext cx="6377769" cy="4930246"/>
-          </a:xfrm>
-        </p:spPr>
-        <p:txBody>
-          <a:bodyPr anchor="ctr">
-            <a:normAutofit/>
-          </a:bodyPr>
-          <a:lstStyle/>
-          <a:p>
-            <a:r>
-              <a:rPr lang="en-US" sz="2400" dirty="0"/>
-              <a:t>Using join to time a child process</a:t>
-            </a:r>
-          </a:p>
-          <a:p>
-            <a:r>
-              <a:rPr lang="en-US" sz="2400" dirty="0"/>
-              <a:t>Compare speedup between sequential and parallel variants</a:t>
-            </a:r>
-          </a:p>
-        </p:txBody>
-      </p:sp>
+      <mc:AlternateContent xmlns:mc="http://schemas.openxmlformats.org/markup-compatibility/2006">
+        <mc:Choice xmlns:a14="http://schemas.microsoft.com/office/drawing/2010/main" Requires="a14">
+          <p:sp>
+            <p:nvSpPr>
+              <p:cNvPr id="3" name="Content Placeholder 2">
+                <a:extLst>
+                  <a:ext uri="{FF2B5EF4-FFF2-40B4-BE49-F238E27FC236}">
+                    <a16:creationId xmlns:a16="http://schemas.microsoft.com/office/drawing/2014/main" id="{A602302E-CFBE-BA46-A497-5E7A00F2A596}"/>
+                  </a:ext>
+                </a:extLst>
+              </p:cNvPr>
+              <p:cNvSpPr>
+                <a:spLocks noGrp="1"/>
+              </p:cNvSpPr>
+              <p:nvPr>
+                <p:ph idx="1"/>
+              </p:nvPr>
+            </p:nvSpPr>
+            <p:spPr>
+              <a:xfrm>
+                <a:off x="4976031" y="963877"/>
+                <a:ext cx="6377769" cy="4930246"/>
+              </a:xfrm>
+            </p:spPr>
+            <p:txBody>
+              <a:bodyPr anchor="ctr">
+                <a:normAutofit/>
+              </a:bodyPr>
+              <a:lstStyle/>
+              <a:p>
+                <a:r>
+                  <a:rPr lang="en-US" sz="2400" dirty="0"/>
+                  <a:t>Using join to time a child process.</a:t>
+                </a:r>
+              </a:p>
+              <a:p>
+                <a:r>
+                  <a:rPr lang="en-US" sz="2400" dirty="0"/>
+                  <a:t>Calculate relative speedup </a:t>
+                </a:r>
+                <a14:m>
+                  <m:oMath xmlns:m="http://schemas.openxmlformats.org/officeDocument/2006/math">
+                    <m:r>
+                      <a:rPr lang="en-US" sz="2400" b="0" i="1">
+                        <a:latin typeface="Cambria Math" panose="02040503050406030204" pitchFamily="18" charset="0"/>
+                      </a:rPr>
+                      <m:t>𝑆</m:t>
+                    </m:r>
+                    <m:r>
+                      <a:rPr lang="en-US" sz="2400" b="0" i="1">
+                        <a:latin typeface="Cambria Math" panose="02040503050406030204" pitchFamily="18" charset="0"/>
+                      </a:rPr>
+                      <m:t>=</m:t>
+                    </m:r>
+                    <m:f>
+                      <m:fPr>
+                        <m:ctrlPr>
+                          <a:rPr lang="en-US" sz="2400" b="0" i="1">
+                            <a:latin typeface="Cambria Math" panose="02040503050406030204" pitchFamily="18" charset="0"/>
+                          </a:rPr>
+                        </m:ctrlPr>
+                      </m:fPr>
+                      <m:num>
+                        <m:sSub>
+                          <m:sSubPr>
+                            <m:ctrlPr>
+                              <a:rPr lang="en-US" sz="2400" b="0" i="1">
+                                <a:latin typeface="Cambria Math" panose="02040503050406030204" pitchFamily="18" charset="0"/>
+                              </a:rPr>
+                            </m:ctrlPr>
+                          </m:sSubPr>
+                          <m:e>
+                            <m:r>
+                              <a:rPr lang="en-US" sz="2400" b="0" i="1">
+                                <a:latin typeface="Cambria Math" panose="02040503050406030204" pitchFamily="18" charset="0"/>
+                              </a:rPr>
+                              <m:t>𝑇</m:t>
+                            </m:r>
+                          </m:e>
+                          <m:sub>
+                            <m:r>
+                              <a:rPr lang="en-US" sz="2400" b="0" i="1">
+                                <a:latin typeface="Cambria Math" panose="02040503050406030204" pitchFamily="18" charset="0"/>
+                              </a:rPr>
+                              <m:t>1</m:t>
+                            </m:r>
+                          </m:sub>
+                        </m:sSub>
+                      </m:num>
+                      <m:den>
+                        <m:sSub>
+                          <m:sSubPr>
+                            <m:ctrlPr>
+                              <a:rPr lang="en-US" sz="2400" b="0" i="1">
+                                <a:latin typeface="Cambria Math" panose="02040503050406030204" pitchFamily="18" charset="0"/>
+                              </a:rPr>
+                            </m:ctrlPr>
+                          </m:sSubPr>
+                          <m:e>
+                            <m:r>
+                              <a:rPr lang="en-US" sz="2400" b="0" i="1">
+                                <a:latin typeface="Cambria Math" panose="02040503050406030204" pitchFamily="18" charset="0"/>
+                              </a:rPr>
+                              <m:t>𝑇</m:t>
+                            </m:r>
+                          </m:e>
+                          <m:sub>
+                            <m:r>
+                              <a:rPr lang="en-US" sz="2400" b="0" i="1">
+                                <a:latin typeface="Cambria Math" panose="02040503050406030204" pitchFamily="18" charset="0"/>
+                              </a:rPr>
+                              <m:t>𝑃</m:t>
+                            </m:r>
+                          </m:sub>
+                        </m:sSub>
+                      </m:den>
+                    </m:f>
+                  </m:oMath>
+                </a14:m>
+                <a:r>
+                  <a:rPr lang="en-US" sz="2400" b="0" dirty="0"/>
+                  <a:t> and absolute speedup </a:t>
+                </a:r>
+                <a14:m>
+                  <m:oMath xmlns:m="http://schemas.openxmlformats.org/officeDocument/2006/math">
+                    <m:sSup>
+                      <m:sSupPr>
+                        <m:ctrlPr>
+                          <a:rPr lang="en-US" sz="2400" b="0" i="1">
+                            <a:latin typeface="Cambria Math" panose="02040503050406030204" pitchFamily="18" charset="0"/>
+                          </a:rPr>
+                        </m:ctrlPr>
+                      </m:sSupPr>
+                      <m:e>
+                        <m:r>
+                          <a:rPr lang="en-US" sz="2400" b="0" i="1">
+                            <a:latin typeface="Cambria Math" panose="02040503050406030204" pitchFamily="18" charset="0"/>
+                          </a:rPr>
+                          <m:t>𝑆</m:t>
+                        </m:r>
+                      </m:e>
+                      <m:sup>
+                        <m:r>
+                          <a:rPr lang="en-US" sz="2400" b="0" i="1">
+                            <a:latin typeface="Cambria Math" panose="02040503050406030204" pitchFamily="18" charset="0"/>
+                          </a:rPr>
+                          <m:t>∗</m:t>
+                        </m:r>
+                      </m:sup>
+                    </m:sSup>
+                    <m:r>
+                      <a:rPr lang="en-US" sz="2400" b="0" i="1">
+                        <a:latin typeface="Cambria Math" panose="02040503050406030204" pitchFamily="18" charset="0"/>
+                      </a:rPr>
+                      <m:t>=</m:t>
+                    </m:r>
+                    <m:f>
+                      <m:fPr>
+                        <m:ctrlPr>
+                          <a:rPr lang="en-US" sz="2400" b="0" i="1">
+                            <a:latin typeface="Cambria Math" panose="02040503050406030204" pitchFamily="18" charset="0"/>
+                          </a:rPr>
+                        </m:ctrlPr>
+                      </m:fPr>
+                      <m:num>
+                        <m:sSubSup>
+                          <m:sSubSupPr>
+                            <m:ctrlPr>
+                              <a:rPr lang="en-US" sz="2400" b="0" i="1">
+                                <a:latin typeface="Cambria Math" panose="02040503050406030204" pitchFamily="18" charset="0"/>
+                              </a:rPr>
+                            </m:ctrlPr>
+                          </m:sSubSupPr>
+                          <m:e>
+                            <m:r>
+                              <a:rPr lang="en-US" sz="2400" b="0" i="1">
+                                <a:latin typeface="Cambria Math" panose="02040503050406030204" pitchFamily="18" charset="0"/>
+                              </a:rPr>
+                              <m:t>𝑇</m:t>
+                            </m:r>
+                          </m:e>
+                          <m:sub>
+                            <m:r>
+                              <a:rPr lang="en-US" sz="2400" b="0" i="1">
+                                <a:latin typeface="Cambria Math" panose="02040503050406030204" pitchFamily="18" charset="0"/>
+                              </a:rPr>
+                              <m:t>1</m:t>
+                            </m:r>
+                          </m:sub>
+                          <m:sup>
+                            <m:r>
+                              <a:rPr lang="en-US" sz="2400" b="0" i="1">
+                                <a:latin typeface="Cambria Math" panose="02040503050406030204" pitchFamily="18" charset="0"/>
+                              </a:rPr>
+                              <m:t>∗</m:t>
+                            </m:r>
+                          </m:sup>
+                        </m:sSubSup>
+                      </m:num>
+                      <m:den>
+                        <m:sSub>
+                          <m:sSubPr>
+                            <m:ctrlPr>
+                              <a:rPr lang="en-US" sz="2400" b="0" i="1">
+                                <a:latin typeface="Cambria Math" panose="02040503050406030204" pitchFamily="18" charset="0"/>
+                              </a:rPr>
+                            </m:ctrlPr>
+                          </m:sSubPr>
+                          <m:e>
+                            <m:r>
+                              <a:rPr lang="en-US" sz="2400" b="0" i="1">
+                                <a:latin typeface="Cambria Math" panose="02040503050406030204" pitchFamily="18" charset="0"/>
+                              </a:rPr>
+                              <m:t>𝑇</m:t>
+                            </m:r>
+                          </m:e>
+                          <m:sub>
+                            <m:r>
+                              <a:rPr lang="en-US" sz="2400" b="0" i="1">
+                                <a:latin typeface="Cambria Math" panose="02040503050406030204" pitchFamily="18" charset="0"/>
+                              </a:rPr>
+                              <m:t>𝑃</m:t>
+                            </m:r>
+                          </m:sub>
+                        </m:sSub>
+                      </m:den>
+                    </m:f>
+                  </m:oMath>
+                </a14:m>
+                <a:r>
+                  <a:rPr lang="en-US" sz="2400" b="0" dirty="0"/>
+                  <a:t>.</a:t>
+                </a:r>
+              </a:p>
+              <a:p>
+                <a:r>
+                  <a:rPr lang="en-US" sz="2400" dirty="0"/>
+                  <a:t>Amdahl’s law </a:t>
+                </a:r>
+                <a14:m>
+                  <m:oMath xmlns:m="http://schemas.openxmlformats.org/officeDocument/2006/math">
+                    <m:r>
+                      <a:rPr lang="en-US" sz="2400" b="0" i="1">
+                        <a:latin typeface="Cambria Math" panose="02040503050406030204" pitchFamily="18" charset="0"/>
+                      </a:rPr>
+                      <m:t>𝑆</m:t>
+                    </m:r>
+                    <m:r>
+                      <a:rPr lang="en-US" sz="2400" b="0" i="1">
+                        <a:latin typeface="Cambria Math" panose="02040503050406030204" pitchFamily="18" charset="0"/>
+                      </a:rPr>
+                      <m:t>=</m:t>
+                    </m:r>
+                    <m:f>
+                      <m:fPr>
+                        <m:ctrlPr>
+                          <a:rPr lang="en-US" sz="2400" b="0" i="1">
+                            <a:latin typeface="Cambria Math" panose="02040503050406030204" pitchFamily="18" charset="0"/>
+                          </a:rPr>
+                        </m:ctrlPr>
+                      </m:fPr>
+                      <m:num>
+                        <m:r>
+                          <a:rPr lang="en-US" sz="2400" b="0" i="1">
+                            <a:latin typeface="Cambria Math" panose="02040503050406030204" pitchFamily="18" charset="0"/>
+                          </a:rPr>
+                          <m:t>1</m:t>
+                        </m:r>
+                      </m:num>
+                      <m:den>
+                        <m:f>
+                          <m:fPr>
+                            <m:ctrlPr>
+                              <a:rPr lang="en-US" sz="2400" b="0" i="1">
+                                <a:latin typeface="Cambria Math" panose="02040503050406030204" pitchFamily="18" charset="0"/>
+                              </a:rPr>
+                            </m:ctrlPr>
+                          </m:fPr>
+                          <m:num>
+                            <m:sSub>
+                              <m:sSubPr>
+                                <m:ctrlPr>
+                                  <a:rPr lang="en-US" sz="2400" b="0" i="1">
+                                    <a:latin typeface="Cambria Math" panose="02040503050406030204" pitchFamily="18" charset="0"/>
+                                  </a:rPr>
+                                </m:ctrlPr>
+                              </m:sSubPr>
+                              <m:e>
+                                <m:r>
+                                  <a:rPr lang="en-US" sz="2400" b="0" i="1">
+                                    <a:latin typeface="Cambria Math" panose="02040503050406030204" pitchFamily="18" charset="0"/>
+                                  </a:rPr>
+                                  <m:t>𝑓</m:t>
+                                </m:r>
+                              </m:e>
+                              <m:sub>
+                                <m:r>
+                                  <a:rPr lang="en-US" sz="2400" b="0" i="1">
+                                    <a:latin typeface="Cambria Math" panose="02040503050406030204" pitchFamily="18" charset="0"/>
+                                  </a:rPr>
+                                  <m:t>𝑝𝑎𝑟</m:t>
+                                </m:r>
+                              </m:sub>
+                            </m:sSub>
+                          </m:num>
+                          <m:den>
+                            <m:r>
+                              <a:rPr lang="en-US" sz="2400" b="0" i="1">
+                                <a:latin typeface="Cambria Math" panose="02040503050406030204" pitchFamily="18" charset="0"/>
+                              </a:rPr>
+                              <m:t>𝑃</m:t>
+                            </m:r>
+                          </m:den>
+                        </m:f>
+                        <m:r>
+                          <a:rPr lang="en-US" sz="2400" b="0" i="1">
+                            <a:latin typeface="Cambria Math" panose="02040503050406030204" pitchFamily="18" charset="0"/>
+                          </a:rPr>
+                          <m:t>+1−</m:t>
+                        </m:r>
+                        <m:sSub>
+                          <m:sSubPr>
+                            <m:ctrlPr>
+                              <a:rPr lang="en-US" sz="2400" b="0" i="1">
+                                <a:latin typeface="Cambria Math" panose="02040503050406030204" pitchFamily="18" charset="0"/>
+                              </a:rPr>
+                            </m:ctrlPr>
+                          </m:sSubPr>
+                          <m:e>
+                            <m:r>
+                              <a:rPr lang="en-US" sz="2400" b="0" i="1">
+                                <a:latin typeface="Cambria Math" panose="02040503050406030204" pitchFamily="18" charset="0"/>
+                              </a:rPr>
+                              <m:t>𝑓</m:t>
+                            </m:r>
+                          </m:e>
+                          <m:sub>
+                            <m:r>
+                              <a:rPr lang="en-US" sz="2400" b="0" i="1">
+                                <a:latin typeface="Cambria Math" panose="02040503050406030204" pitchFamily="18" charset="0"/>
+                              </a:rPr>
+                              <m:t>𝑝𝑎𝑟</m:t>
+                            </m:r>
+                          </m:sub>
+                        </m:sSub>
+                      </m:den>
+                    </m:f>
+                  </m:oMath>
+                </a14:m>
+                <a:r>
+                  <a:rPr lang="en-US" sz="2400" dirty="0"/>
+                  <a:t>, where f</a:t>
+                </a:r>
+                <a:r>
+                  <a:rPr lang="en-US" sz="2400" baseline="-25000" dirty="0"/>
+                  <a:t>par</a:t>
+                </a:r>
+                <a:r>
+                  <a:rPr lang="en-US" sz="2400" dirty="0"/>
+                  <a:t> is the parallel fraction of the code and P is the number of processors.</a:t>
+                </a:r>
+              </a:p>
+            </p:txBody>
+          </p:sp>
+        </mc:Choice>
+        <mc:Fallback>
+          <p:sp>
+            <p:nvSpPr>
+              <p:cNvPr id="3" name="Content Placeholder 2">
+                <a:extLst>
+                  <a:ext uri="{FF2B5EF4-FFF2-40B4-BE49-F238E27FC236}">
+                    <a16:creationId xmlns:a16="http://schemas.microsoft.com/office/drawing/2014/main" id="{A602302E-CFBE-BA46-A497-5E7A00F2A596}"/>
+                  </a:ext>
+                </a:extLst>
+              </p:cNvPr>
+              <p:cNvSpPr>
+                <a:spLocks noGrp="1" noRot="1" noChangeAspect="1" noMove="1" noResize="1" noEditPoints="1" noAdjustHandles="1" noChangeArrowheads="1" noChangeShapeType="1" noTextEdit="1"/>
+              </p:cNvSpPr>
+              <p:nvPr>
+                <p:ph idx="1"/>
+              </p:nvPr>
+            </p:nvSpPr>
+            <p:spPr>
+              <a:xfrm>
+                <a:off x="4976031" y="963877"/>
+                <a:ext cx="6377769" cy="4930246"/>
+              </a:xfrm>
+              <a:blipFill>
+                <a:blip r:embed="rId2"/>
+                <a:stretch>
+                  <a:fillRect l="-1193" r="-398"/>
+                </a:stretch>
+              </a:blipFill>
+            </p:spPr>
+            <p:txBody>
+              <a:bodyPr/>
+              <a:lstStyle/>
+              <a:p>
+                <a:r>
+                  <a:rPr lang="en-US">
+                    <a:noFill/>
+                  </a:rPr>
+                  <a:t> </a:t>
+                </a:r>
+              </a:p>
+            </p:txBody>
+          </p:sp>
+        </mc:Fallback>
+      </mc:AlternateContent>
     </p:spTree>
     <p:extLst>
       <p:ext uri="{BB962C8B-B14F-4D97-AF65-F5344CB8AC3E}">
@@ -11890,6 +12258,109 @@
                                           <p:spTgt spid="3">
                                             <p:txEl>
                                               <p:pRg st="1" end="1"/>
+                                            </p:txEl>
+                                          </p:spTgt>
+                                        </p:tgtEl>
+                                        <p:attrNameLst>
+                                          <p:attrName>ppt_y</p:attrName>
+                                        </p:attrNameLst>
+                                      </p:cBhvr>
+                                      <p:tavLst>
+                                        <p:tav tm="0">
+                                          <p:val>
+                                            <p:strVal val="1+#ppt_h/2"/>
+                                          </p:val>
+                                        </p:tav>
+                                        <p:tav tm="100000">
+                                          <p:val>
+                                            <p:strVal val="#ppt_y"/>
+                                          </p:val>
+                                        </p:tav>
+                                      </p:tavLst>
+                                    </p:anim>
+                                  </p:childTnLst>
+                                </p:cTn>
+                              </p:par>
+                            </p:childTnLst>
+                          </p:cTn>
+                        </p:par>
+                      </p:childTnLst>
+                    </p:cTn>
+                  </p:par>
+                  <p:par>
+                    <p:cTn id="15" fill="hold">
+                      <p:stCondLst>
+                        <p:cond delay="indefinite"/>
+                      </p:stCondLst>
+                      <p:childTnLst>
+                        <p:par>
+                          <p:cTn id="16" fill="hold">
+                            <p:stCondLst>
+                              <p:cond delay="0"/>
+                            </p:stCondLst>
+                            <p:childTnLst>
+                              <p:par>
+                                <p:cTn id="17" presetID="2" presetClass="entr" presetSubtype="4" fill="hold" grpId="0" nodeType="clickEffect">
+                                  <p:stCondLst>
+                                    <p:cond delay="0"/>
+                                  </p:stCondLst>
+                                  <p:childTnLst>
+                                    <p:set>
+                                      <p:cBhvr>
+                                        <p:cTn id="18" dur="1" fill="hold">
+                                          <p:stCondLst>
+                                            <p:cond delay="0"/>
+                                          </p:stCondLst>
+                                        </p:cTn>
+                                        <p:tgtEl>
+                                          <p:spTgt spid="3">
+                                            <p:txEl>
+                                              <p:pRg st="2" end="2"/>
+                                            </p:txEl>
+                                          </p:spTgt>
+                                        </p:tgtEl>
+                                        <p:attrNameLst>
+                                          <p:attrName>style.visibility</p:attrName>
+                                        </p:attrNameLst>
+                                      </p:cBhvr>
+                                      <p:to>
+                                        <p:strVal val="visible"/>
+                                      </p:to>
+                                    </p:set>
+                                    <p:anim calcmode="lin" valueType="num">
+                                      <p:cBhvr additive="base">
+                                        <p:cTn id="19" dur="500" fill="hold"/>
+                                        <p:tgtEl>
+                                          <p:spTgt spid="3">
+                                            <p:txEl>
+                                              <p:pRg st="2" end="2"/>
+                                            </p:txEl>
+                                          </p:spTgt>
+                                        </p:tgtEl>
+                                        <p:attrNameLst>
+                                          <p:attrName>ppt_x</p:attrName>
+                                        </p:attrNameLst>
+                                      </p:cBhvr>
+                                      <p:tavLst>
+                                        <p:tav tm="0">
+                                          <p:val>
+                                            <p:strVal val="#ppt_x"/>
+                                          </p:val>
+                                        </p:tav>
+                                        <p:tav tm="100000">
+                                          <p:val>
+                                            <p:strVal val="#ppt_x"/>
+                                          </p:val>
+                                        </p:tav>
+                                      </p:tavLst>
+                                    </p:anim>
+                                    <p:anim calcmode="lin" valueType="num">
+                                      <p:cBhvr additive="base">
+                                        <p:cTn id="20" dur="500" fill="hold"/>
+                                        <p:tgtEl>
+                                          <p:spTgt spid="3">
+                                            <p:txEl>
+                                              <p:pRg st="2" end="2"/>
                                             </p:txEl>
                                           </p:spTgt>
                                         </p:tgtEl>

</xml_diff>

<commit_message>
Add definition for parallelism.
</commit_message>
<xml_diff>
--- a/lecture-2/presentation-2.pptx
+++ b/lecture-2/presentation-2.pptx
@@ -11873,6 +11873,78 @@
                 </a14:m>
                 <a:r>
                   <a:rPr lang="en-US" sz="2400" b="0" dirty="0"/>
+                  <a:t>. Parallelism is </a:t>
+                </a:r>
+                <a14:m>
+                  <m:oMath xmlns:m="http://schemas.openxmlformats.org/officeDocument/2006/math">
+                    <m:f>
+                      <m:fPr>
+                        <m:ctrlPr>
+                          <a:rPr lang="en-US" sz="2400" i="1">
+                            <a:latin typeface="Cambria Math" panose="02040503050406030204" pitchFamily="18" charset="0"/>
+                          </a:rPr>
+                        </m:ctrlPr>
+                      </m:fPr>
+                      <m:num>
+                        <m:sSub>
+                          <m:sSubPr>
+                            <m:ctrlPr>
+                              <a:rPr lang="en-US" sz="2400" i="1">
+                                <a:latin typeface="Cambria Math" panose="02040503050406030204" pitchFamily="18" charset="0"/>
+                              </a:rPr>
+                            </m:ctrlPr>
+                          </m:sSubPr>
+                          <m:e>
+                            <m:r>
+                              <a:rPr lang="en-US" sz="2400" i="1">
+                                <a:latin typeface="Cambria Math" panose="02040503050406030204" pitchFamily="18" charset="0"/>
+                              </a:rPr>
+                              <m:t>𝑇</m:t>
+                            </m:r>
+                          </m:e>
+                          <m:sub>
+                            <m:r>
+                              <a:rPr lang="en-US" sz="2400" i="1">
+                                <a:latin typeface="Cambria Math" panose="02040503050406030204" pitchFamily="18" charset="0"/>
+                              </a:rPr>
+                              <m:t>1</m:t>
+                            </m:r>
+                          </m:sub>
+                        </m:sSub>
+                      </m:num>
+                      <m:den>
+                        <m:sSub>
+                          <m:sSubPr>
+                            <m:ctrlPr>
+                              <a:rPr lang="en-US" sz="2400" i="1">
+                                <a:latin typeface="Cambria Math" panose="02040503050406030204" pitchFamily="18" charset="0"/>
+                              </a:rPr>
+                            </m:ctrlPr>
+                          </m:sSubPr>
+                          <m:e>
+                            <m:r>
+                              <a:rPr lang="en-US" sz="2400" i="1">
+                                <a:latin typeface="Cambria Math" panose="02040503050406030204" pitchFamily="18" charset="0"/>
+                              </a:rPr>
+                              <m:t>𝑇</m:t>
+                            </m:r>
+                          </m:e>
+                          <m:sub>
+                            <m:r>
+                              <a:rPr lang="en-US" sz="2400" i="1">
+                                <a:latin typeface="Cambria Math" panose="02040503050406030204" pitchFamily="18" charset="0"/>
+                                <a:ea typeface="Cambria Math" panose="02040503050406030204" pitchFamily="18" charset="0"/>
+                              </a:rPr>
+                              <m:t>∞</m:t>
+                            </m:r>
+                          </m:sub>
+                        </m:sSub>
+                      </m:den>
+                    </m:f>
+                  </m:oMath>
+                </a14:m>
+                <a:r>
+                  <a:rPr lang="en-US" sz="2400" dirty="0"/>
                   <a:t>.</a:t>
                 </a:r>
               </a:p>

</xml_diff>

<commit_message>
Add diagram about Amdahl's law.
</commit_message>
<xml_diff>
--- a/lecture-2/presentation-2.pptx
+++ b/lecture-2/presentation-2.pptx
@@ -5,7 +5,7 @@
     <p:sldMasterId id="2147483764" r:id="rId1"/>
   </p:sldMasterIdLst>
   <p:notesMasterIdLst>
-    <p:notesMasterId r:id="rId11"/>
+    <p:notesMasterId r:id="rId12"/>
   </p:notesMasterIdLst>
   <p:sldIdLst>
     <p:sldId id="256" r:id="rId2"/>
@@ -15,8 +15,9 @@
     <p:sldId id="309" r:id="rId6"/>
     <p:sldId id="310" r:id="rId7"/>
     <p:sldId id="313" r:id="rId8"/>
-    <p:sldId id="314" r:id="rId9"/>
-    <p:sldId id="312" r:id="rId10"/>
+    <p:sldId id="315" r:id="rId9"/>
+    <p:sldId id="314" r:id="rId10"/>
+    <p:sldId id="312" r:id="rId11"/>
   </p:sldIdLst>
   <p:sldSz cx="12192000" cy="6858000"/>
   <p:notesSz cx="6858000" cy="9144000"/>
@@ -3199,7 +3200,7 @@
           <a:p>
             <a:fld id="{E758746B-B0EA-CA41-BB8E-A8C6FE44757D}" type="datetimeFigureOut">
               <a:rPr lang="en-US"/>
-              <a:t>10/17/19</a:t>
+              <a:t>10/21/19</a:t>
             </a:fld>
             <a:endParaRPr lang="en-US" dirty="0"/>
           </a:p>
@@ -3466,6 +3467,90 @@
 </p:notesMaster>
 </file>
 
+<file path=ppt/notesSlides/notesSlide1.xml><?xml version="1.0" encoding="utf-8"?>
+<p:notes xmlns:a="http://schemas.openxmlformats.org/drawingml/2006/main" xmlns:r="http://schemas.openxmlformats.org/officeDocument/2006/relationships" xmlns:p="http://schemas.openxmlformats.org/presentationml/2006/main">
+  <p:cSld>
+    <p:spTree>
+      <p:nvGrpSpPr>
+        <p:cNvPr id="1" name=""/>
+        <p:cNvGrpSpPr/>
+        <p:nvPr/>
+      </p:nvGrpSpPr>
+      <p:grpSpPr>
+        <a:xfrm>
+          <a:off x="0" y="0"/>
+          <a:ext cx="0" cy="0"/>
+          <a:chOff x="0" y="0"/>
+          <a:chExt cx="0" cy="0"/>
+        </a:xfrm>
+      </p:grpSpPr>
+      <p:sp>
+        <p:nvSpPr>
+          <p:cNvPr id="2" name="Slide Image Placeholder 1"/>
+          <p:cNvSpPr>
+            <a:spLocks noGrp="1" noRot="1" noChangeAspect="1"/>
+          </p:cNvSpPr>
+          <p:nvPr>
+            <p:ph type="sldImg"/>
+          </p:nvPr>
+        </p:nvSpPr>
+        <p:spPr/>
+      </p:sp>
+      <p:sp>
+        <p:nvSpPr>
+          <p:cNvPr id="3" name="Notes Placeholder 2"/>
+          <p:cNvSpPr>
+            <a:spLocks noGrp="1"/>
+          </p:cNvSpPr>
+          <p:nvPr>
+            <p:ph type="body" idx="1"/>
+          </p:nvPr>
+        </p:nvSpPr>
+        <p:spPr/>
+        <p:txBody>
+          <a:bodyPr/>
+          <a:lstStyle/>
+          <a:p>
+            <a:endParaRPr lang="en-US"/>
+          </a:p>
+        </p:txBody>
+      </p:sp>
+      <p:sp>
+        <p:nvSpPr>
+          <p:cNvPr id="4" name="Slide Number Placeholder 3"/>
+          <p:cNvSpPr>
+            <a:spLocks noGrp="1"/>
+          </p:cNvSpPr>
+          <p:nvPr>
+            <p:ph type="sldNum" sz="quarter" idx="5"/>
+          </p:nvPr>
+        </p:nvSpPr>
+        <p:spPr/>
+        <p:txBody>
+          <a:bodyPr/>
+          <a:lstStyle/>
+          <a:p>
+            <a:fld id="{488DFEC0-A4ED-6E4A-B0B6-6FC7C158168F}" type="slidenum">
+              <a:rPr lang="en-US"/>
+              <a:t>8</a:t>
+            </a:fld>
+            <a:endParaRPr lang="en-US" dirty="0"/>
+          </a:p>
+        </p:txBody>
+      </p:sp>
+    </p:spTree>
+    <p:extLst>
+      <p:ext uri="{BB962C8B-B14F-4D97-AF65-F5344CB8AC3E}">
+        <p14:creationId xmlns:p14="http://schemas.microsoft.com/office/powerpoint/2010/main" val="2845327195"/>
+      </p:ext>
+    </p:extLst>
+  </p:cSld>
+  <p:clrMapOvr>
+    <a:masterClrMapping/>
+  </p:clrMapOvr>
+</p:notes>
+</file>
+
 <file path=ppt/slideLayouts/slideLayout1.xml><?xml version="1.0" encoding="utf-8"?>
 <p:sldLayout xmlns:a="http://schemas.openxmlformats.org/drawingml/2006/main" xmlns:r="http://schemas.openxmlformats.org/officeDocument/2006/relationships" xmlns:p="http://schemas.openxmlformats.org/presentationml/2006/main" type="title" preserve="1">
   <p:cSld name="Title Slide">
@@ -3614,7 +3699,7 @@
             <a:fld id="{B61BEF0D-F0BB-DE4B-95CE-6DB70DBA9567}" type="datetimeFigureOut">
               <a:rPr lang="en-US"/>
               <a:pPr/>
-              <a:t>10/17/19</a:t>
+              <a:t>10/21/19</a:t>
             </a:fld>
             <a:endParaRPr lang="en-US" dirty="0"/>
           </a:p>
@@ -3826,7 +3911,7 @@
             <a:fld id="{B61BEF0D-F0BB-DE4B-95CE-6DB70DBA9567}" type="datetimeFigureOut">
               <a:rPr lang="en-US"/>
               <a:pPr/>
-              <a:t>10/17/19</a:t>
+              <a:t>10/21/19</a:t>
             </a:fld>
             <a:endParaRPr lang="en-US" dirty="0"/>
           </a:p>
@@ -4048,7 +4133,7 @@
             <a:fld id="{B61BEF0D-F0BB-DE4B-95CE-6DB70DBA9567}" type="datetimeFigureOut">
               <a:rPr lang="en-US"/>
               <a:pPr/>
-              <a:t>10/17/19</a:t>
+              <a:t>10/21/19</a:t>
             </a:fld>
             <a:endParaRPr lang="en-US" dirty="0"/>
           </a:p>
@@ -4260,7 +4345,7 @@
             <a:fld id="{B61BEF0D-F0BB-DE4B-95CE-6DB70DBA9567}" type="datetimeFigureOut">
               <a:rPr lang="en-US"/>
               <a:pPr/>
-              <a:t>10/17/19</a:t>
+              <a:t>10/21/19</a:t>
             </a:fld>
             <a:endParaRPr lang="en-US" dirty="0"/>
           </a:p>
@@ -4549,7 +4634,7 @@
             <a:fld id="{B61BEF0D-F0BB-DE4B-95CE-6DB70DBA9567}" type="datetimeFigureOut">
               <a:rPr lang="en-US"/>
               <a:pPr/>
-              <a:t>10/17/19</a:t>
+              <a:t>10/21/19</a:t>
             </a:fld>
             <a:endParaRPr lang="en-US" dirty="0"/>
           </a:p>
@@ -4828,7 +4913,7 @@
             <a:fld id="{B61BEF0D-F0BB-DE4B-95CE-6DB70DBA9567}" type="datetimeFigureOut">
               <a:rPr lang="en-US"/>
               <a:pPr/>
-              <a:t>10/17/19</a:t>
+              <a:t>10/21/19</a:t>
             </a:fld>
             <a:endParaRPr lang="en-US" dirty="0"/>
           </a:p>
@@ -5254,7 +5339,7 @@
             <a:fld id="{B61BEF0D-F0BB-DE4B-95CE-6DB70DBA9567}" type="datetimeFigureOut">
               <a:rPr lang="en-US"/>
               <a:pPr/>
-              <a:t>10/17/19</a:t>
+              <a:t>10/21/19</a:t>
             </a:fld>
             <a:endParaRPr lang="en-US" dirty="0"/>
           </a:p>
@@ -5397,7 +5482,7 @@
             <a:fld id="{B61BEF0D-F0BB-DE4B-95CE-6DB70DBA9567}" type="datetimeFigureOut">
               <a:rPr lang="en-US"/>
               <a:pPr/>
-              <a:t>10/17/19</a:t>
+              <a:t>10/21/19</a:t>
             </a:fld>
             <a:endParaRPr lang="en-US" dirty="0"/>
           </a:p>
@@ -5524,7 +5609,7 @@
             <a:fld id="{B61BEF0D-F0BB-DE4B-95CE-6DB70DBA9567}" type="datetimeFigureOut">
               <a:rPr lang="en-US"/>
               <a:pPr/>
-              <a:t>10/17/19</a:t>
+              <a:t>10/21/19</a:t>
             </a:fld>
             <a:endParaRPr lang="en-US" dirty="0"/>
           </a:p>
@@ -5849,7 +5934,7 @@
             <a:fld id="{B61BEF0D-F0BB-DE4B-95CE-6DB70DBA9567}" type="datetimeFigureOut">
               <a:rPr lang="en-US"/>
               <a:pPr/>
-              <a:t>10/17/19</a:t>
+              <a:t>10/21/19</a:t>
             </a:fld>
             <a:endParaRPr lang="en-US" dirty="0"/>
           </a:p>
@@ -6151,7 +6236,7 @@
             <a:fld id="{B61BEF0D-F0BB-DE4B-95CE-6DB70DBA9567}" type="datetimeFigureOut">
               <a:rPr lang="en-US"/>
               <a:pPr/>
-              <a:t>10/17/19</a:t>
+              <a:t>10/21/19</a:t>
             </a:fld>
             <a:endParaRPr lang="en-US" dirty="0"/>
           </a:p>
@@ -6406,7 +6491,7 @@
             <a:fld id="{B61BEF0D-F0BB-DE4B-95CE-6DB70DBA9567}" type="datetimeFigureOut">
               <a:rPr lang="en-US"/>
               <a:pPr/>
-              <a:t>10/17/19</a:t>
+              <a:t>10/21/19</a:t>
             </a:fld>
             <a:endParaRPr lang="en-US" dirty="0"/>
           </a:p>
@@ -6914,6 +6999,704 @@
       </p:transition>
     </mc:Fallback>
   </mc:AlternateContent>
+</p:sld>
+</file>
+
+<file path=ppt/slides/slide10.xml><?xml version="1.0" encoding="utf-8"?>
+<p:sld xmlns:a="http://schemas.openxmlformats.org/drawingml/2006/main" xmlns:r="http://schemas.openxmlformats.org/officeDocument/2006/relationships" xmlns:p="http://schemas.openxmlformats.org/presentationml/2006/main">
+  <p:cSld>
+    <p:bg>
+      <p:bgPr>
+        <a:solidFill>
+          <a:schemeClr val="bg1"/>
+        </a:solidFill>
+        <a:effectLst/>
+      </p:bgPr>
+    </p:bg>
+    <p:spTree>
+      <p:nvGrpSpPr>
+        <p:cNvPr id="1" name=""/>
+        <p:cNvGrpSpPr/>
+        <p:nvPr/>
+      </p:nvGrpSpPr>
+      <p:grpSpPr>
+        <a:xfrm>
+          <a:off x="0" y="0"/>
+          <a:ext cx="0" cy="0"/>
+          <a:chOff x="0" y="0"/>
+          <a:chExt cx="0" cy="0"/>
+        </a:xfrm>
+      </p:grpSpPr>
+      <p:sp useBgFill="1">
+        <p:nvSpPr>
+          <p:cNvPr id="8" name="Rectangle 7">
+            <a:extLst>
+              <a:ext uri="{FF2B5EF4-FFF2-40B4-BE49-F238E27FC236}">
+                <a16:creationId xmlns:a16="http://schemas.microsoft.com/office/drawing/2014/main" id="{3B854194-185D-494D-905C-7C7CB2E30F6E}"/>
+              </a:ext>
+              <a:ext uri="{C183D7F6-B498-43B3-948B-1728B52AA6E4}">
+                <adec:decorative xmlns:adec="http://schemas.microsoft.com/office/drawing/2017/decorative" val="1"/>
+              </a:ext>
+            </a:extLst>
+          </p:cNvPr>
+          <p:cNvSpPr>
+            <a:spLocks noGrp="1" noRot="1" noChangeAspect="1" noMove="1" noResize="1" noEditPoints="1" noAdjustHandles="1" noChangeArrowheads="1" noChangeShapeType="1" noTextEdit="1"/>
+          </p:cNvSpPr>
+          <p:nvPr>
+            <p:extLst>
+              <p:ext uri="{386F3935-93C4-4BCD-93E2-E3B085C9AB24}">
+                <p16:designElem xmlns:p16="http://schemas.microsoft.com/office/powerpoint/2015/main" val="1"/>
+              </p:ext>
+            </p:extLst>
+          </p:nvPr>
+        </p:nvSpPr>
+        <p:spPr>
+          <a:xfrm>
+            <a:off x="1" y="0"/>
+            <a:ext cx="6082110" cy="6858000"/>
+          </a:xfrm>
+          <a:prstGeom prst="rect">
+            <a:avLst/>
+          </a:prstGeom>
+          <a:ln>
+            <a:noFill/>
+          </a:ln>
+        </p:spPr>
+        <p:style>
+          <a:lnRef idx="2">
+            <a:schemeClr val="accent1">
+              <a:shade val="50000"/>
+            </a:schemeClr>
+          </a:lnRef>
+          <a:fillRef idx="1">
+            <a:schemeClr val="accent1"/>
+          </a:fillRef>
+          <a:effectRef idx="0">
+            <a:schemeClr val="accent1"/>
+          </a:effectRef>
+          <a:fontRef idx="minor">
+            <a:schemeClr val="lt1"/>
+          </a:fontRef>
+        </p:style>
+        <p:txBody>
+          <a:bodyPr rtlCol="0" anchor="ctr"/>
+          <a:lstStyle/>
+          <a:p>
+            <a:pPr algn="ctr"/>
+            <a:endParaRPr lang="en-US" dirty="0"/>
+          </a:p>
+        </p:txBody>
+      </p:sp>
+      <p:sp>
+        <p:nvSpPr>
+          <p:cNvPr id="10" name="Rectangle 9">
+            <a:extLst>
+              <a:ext uri="{FF2B5EF4-FFF2-40B4-BE49-F238E27FC236}">
+                <a16:creationId xmlns:a16="http://schemas.microsoft.com/office/drawing/2014/main" id="{B4F5FA0D-0104-4987-8241-EFF7C85B88DE}"/>
+              </a:ext>
+              <a:ext uri="{C183D7F6-B498-43B3-948B-1728B52AA6E4}">
+                <adec:decorative xmlns:adec="http://schemas.microsoft.com/office/drawing/2017/decorative" val="1"/>
+              </a:ext>
+            </a:extLst>
+          </p:cNvPr>
+          <p:cNvSpPr>
+            <a:spLocks noGrp="1" noRot="1" noChangeAspect="1" noMove="1" noResize="1" noEditPoints="1" noAdjustHandles="1" noChangeArrowheads="1" noChangeShapeType="1" noTextEdit="1"/>
+          </p:cNvSpPr>
+          <p:nvPr>
+            <p:extLst>
+              <p:ext uri="{386F3935-93C4-4BCD-93E2-E3B085C9AB24}">
+                <p16:designElem xmlns:p16="http://schemas.microsoft.com/office/powerpoint/2015/main" val="1"/>
+              </p:ext>
+            </p:extLst>
+          </p:nvPr>
+        </p:nvSpPr>
+        <p:spPr>
+          <a:xfrm>
+            <a:off x="1" y="0"/>
+            <a:ext cx="12191998" cy="6858000"/>
+          </a:xfrm>
+          <a:prstGeom prst="rect">
+            <a:avLst/>
+          </a:prstGeom>
+          <a:gradFill>
+            <a:gsLst>
+              <a:gs pos="0">
+                <a:schemeClr val="accent1">
+                  <a:lumMod val="90000"/>
+                </a:schemeClr>
+              </a:gs>
+              <a:gs pos="25000">
+                <a:schemeClr val="accent1">
+                  <a:lumMod val="90000"/>
+                </a:schemeClr>
+              </a:gs>
+              <a:gs pos="94000">
+                <a:schemeClr val="bg2">
+                  <a:lumMod val="25000"/>
+                </a:schemeClr>
+              </a:gs>
+              <a:gs pos="100000">
+                <a:schemeClr val="bg2">
+                  <a:lumMod val="25000"/>
+                </a:schemeClr>
+              </a:gs>
+            </a:gsLst>
+            <a:lin ang="4200000" scaled="0"/>
+          </a:gradFill>
+          <a:ln>
+            <a:noFill/>
+          </a:ln>
+        </p:spPr>
+        <p:style>
+          <a:lnRef idx="2">
+            <a:schemeClr val="accent1">
+              <a:shade val="50000"/>
+            </a:schemeClr>
+          </a:lnRef>
+          <a:fillRef idx="1">
+            <a:schemeClr val="accent1"/>
+          </a:fillRef>
+          <a:effectRef idx="0">
+            <a:schemeClr val="accent1"/>
+          </a:effectRef>
+          <a:fontRef idx="minor">
+            <a:schemeClr val="lt1"/>
+          </a:fontRef>
+        </p:style>
+        <p:txBody>
+          <a:bodyPr rtlCol="0" anchor="ctr"/>
+          <a:lstStyle/>
+          <a:p>
+            <a:pPr algn="ctr"/>
+            <a:endParaRPr lang="en-US" dirty="0"/>
+          </a:p>
+        </p:txBody>
+      </p:sp>
+      <p:pic>
+        <p:nvPicPr>
+          <p:cNvPr id="12" name="Picture 11">
+            <a:extLst>
+              <a:ext uri="{FF2B5EF4-FFF2-40B4-BE49-F238E27FC236}">
+                <a16:creationId xmlns:a16="http://schemas.microsoft.com/office/drawing/2014/main" id="{2897127E-6CEF-446C-BE87-93B7C46E49D1}"/>
+              </a:ext>
+              <a:ext uri="{C183D7F6-B498-43B3-948B-1728B52AA6E4}">
+                <adec:decorative xmlns:adec="http://schemas.microsoft.com/office/drawing/2017/decorative" val="1"/>
+              </a:ext>
+            </a:extLst>
+          </p:cNvPr>
+          <p:cNvPicPr>
+            <a:picLocks noGrp="1" noRot="1" noChangeAspect="1" noMove="1" noResize="1" noEditPoints="1" noAdjustHandles="1" noChangeArrowheads="1" noChangeShapeType="1" noCrop="1"/>
+          </p:cNvPicPr>
+          <p:nvPr>
+            <p:extLst>
+              <p:ext uri="{386F3935-93C4-4BCD-93E2-E3B085C9AB24}">
+                <p16:designElem xmlns:p16="http://schemas.microsoft.com/office/powerpoint/2015/main" val="1"/>
+              </p:ext>
+            </p:extLst>
+          </p:nvPr>
+        </p:nvPicPr>
+        <p:blipFill>
+          <a:blip r:embed="rId2">
+            <a:extLst>
+              <a:ext uri="{28A0092B-C50C-407E-A947-70E740481C1C}">
+                <a14:useLocalDpi xmlns:a14="http://schemas.microsoft.com/office/drawing/2010/main" val="0"/>
+              </a:ext>
+            </a:extLst>
+          </a:blip>
+          <a:stretch>
+            <a:fillRect/>
+          </a:stretch>
+        </p:blipFill>
+        <p:spPr>
+          <a:xfrm>
+            <a:off x="0" y="0"/>
+            <a:ext cx="12192000" cy="6858000"/>
+          </a:xfrm>
+          <a:prstGeom prst="rect">
+            <a:avLst/>
+          </a:prstGeom>
+        </p:spPr>
+      </p:pic>
+      <p:sp>
+        <p:nvSpPr>
+          <p:cNvPr id="2" name="Title 1">
+            <a:extLst>
+              <a:ext uri="{FF2B5EF4-FFF2-40B4-BE49-F238E27FC236}">
+                <a16:creationId xmlns:a16="http://schemas.microsoft.com/office/drawing/2014/main" id="{8C601C3B-4D47-8348-BC4A-FD48875EDBAC}"/>
+              </a:ext>
+            </a:extLst>
+          </p:cNvPr>
+          <p:cNvSpPr>
+            <a:spLocks noGrp="1"/>
+          </p:cNvSpPr>
+          <p:nvPr>
+            <p:ph type="title"/>
+          </p:nvPr>
+        </p:nvSpPr>
+        <p:spPr>
+          <a:xfrm>
+            <a:off x="640079" y="2053641"/>
+            <a:ext cx="3669161" cy="2760098"/>
+          </a:xfrm>
+        </p:spPr>
+        <p:txBody>
+          <a:bodyPr>
+            <a:normAutofit/>
+          </a:bodyPr>
+          <a:lstStyle/>
+          <a:p>
+            <a:r>
+              <a:rPr lang="en-US" dirty="0">
+                <a:solidFill>
+                  <a:srgbClr val="FFFFFF"/>
+                </a:solidFill>
+              </a:rPr>
+              <a:t>Conclusion</a:t>
+            </a:r>
+          </a:p>
+        </p:txBody>
+      </p:sp>
+      <p:sp>
+        <p:nvSpPr>
+          <p:cNvPr id="3" name="Content Placeholder 2">
+            <a:extLst>
+              <a:ext uri="{FF2B5EF4-FFF2-40B4-BE49-F238E27FC236}">
+                <a16:creationId xmlns:a16="http://schemas.microsoft.com/office/drawing/2014/main" id="{4E96CE26-75BF-634E-9173-A86837E71C55}"/>
+              </a:ext>
+            </a:extLst>
+          </p:cNvPr>
+          <p:cNvSpPr>
+            <a:spLocks noGrp="1"/>
+          </p:cNvSpPr>
+          <p:nvPr>
+            <p:ph idx="1"/>
+          </p:nvPr>
+        </p:nvSpPr>
+        <p:spPr>
+          <a:xfrm>
+            <a:off x="6090574" y="801866"/>
+            <a:ext cx="5306084" cy="5230634"/>
+          </a:xfrm>
+        </p:spPr>
+        <p:txBody>
+          <a:bodyPr anchor="ctr">
+            <a:normAutofit/>
+          </a:bodyPr>
+          <a:lstStyle/>
+          <a:p>
+            <a:r>
+              <a:rPr lang="en-US" sz="2400" dirty="0">
+                <a:solidFill>
+                  <a:srgbClr val="000000"/>
+                </a:solidFill>
+              </a:rPr>
+              <a:t>Python is shipped with a powerful library called </a:t>
+            </a:r>
+            <a:r>
+              <a:rPr lang="en-US" sz="2400" dirty="0">
+                <a:solidFill>
+                  <a:srgbClr val="000000"/>
+                </a:solidFill>
+                <a:latin typeface="Courier New" panose="02070309020205020404" pitchFamily="49" charset="0"/>
+                <a:cs typeface="Courier New" panose="02070309020205020404" pitchFamily="49" charset="0"/>
+              </a:rPr>
+              <a:t>multiprocessing</a:t>
+            </a:r>
+            <a:r>
+              <a:rPr lang="en-US" sz="2400" dirty="0">
+                <a:solidFill>
+                  <a:srgbClr val="000000"/>
+                </a:solidFill>
+              </a:rPr>
+              <a:t> for working with processes.</a:t>
+            </a:r>
+          </a:p>
+          <a:p>
+            <a:r>
+              <a:rPr lang="en-US" sz="2400" dirty="0">
+                <a:solidFill>
+                  <a:srgbClr val="000000"/>
+                </a:solidFill>
+              </a:rPr>
+              <a:t>Processes need to communicate and exchange data. Most often this can be accomplished via queues.</a:t>
+            </a:r>
+          </a:p>
+          <a:p>
+            <a:r>
+              <a:rPr lang="en-US" sz="2400" dirty="0">
+                <a:solidFill>
+                  <a:srgbClr val="000000"/>
+                </a:solidFill>
+              </a:rPr>
+              <a:t>Pool/map paradigm is based upon the 3 steps general parallel problem solving procedure: distribute work, execute tasks in parallel, and combine partial results. Very reminiscent to the MapReduce paradigm.</a:t>
+            </a:r>
+          </a:p>
+        </p:txBody>
+      </p:sp>
+    </p:spTree>
+    <p:extLst>
+      <p:ext uri="{BB962C8B-B14F-4D97-AF65-F5344CB8AC3E}">
+        <p14:creationId xmlns:p14="http://schemas.microsoft.com/office/powerpoint/2010/main" val="2157392188"/>
+      </p:ext>
+    </p:extLst>
+  </p:cSld>
+  <p:clrMapOvr>
+    <a:masterClrMapping/>
+  </p:clrMapOvr>
+  <mc:AlternateContent xmlns:mc="http://schemas.openxmlformats.org/markup-compatibility/2006" xmlns:p15="http://schemas.microsoft.com/office/powerpoint/2012/main">
+    <mc:Choice Requires="p15">
+      <p:transition xmlns:p14="http://schemas.microsoft.com/office/powerpoint/2010/main" spd="slow" p14:dur="2000">
+        <p15:prstTrans prst="drape"/>
+      </p:transition>
+    </mc:Choice>
+    <mc:Fallback xmlns="">
+      <p:transition spd="slow">
+        <p:fade/>
+      </p:transition>
+    </mc:Fallback>
+  </mc:AlternateContent>
+  <p:timing>
+    <p:tnLst>
+      <p:par>
+        <p:cTn id="1" dur="indefinite" restart="never" nodeType="tmRoot">
+          <p:childTnLst>
+            <p:seq concurrent="1" nextAc="seek">
+              <p:cTn id="2" dur="indefinite" nodeType="mainSeq">
+                <p:childTnLst>
+                  <p:par>
+                    <p:cTn id="3" fill="hold">
+                      <p:stCondLst>
+                        <p:cond delay="indefinite"/>
+                      </p:stCondLst>
+                      <p:childTnLst>
+                        <p:par>
+                          <p:cTn id="4" fill="hold">
+                            <p:stCondLst>
+                              <p:cond delay="0"/>
+                            </p:stCondLst>
+                            <p:childTnLst>
+                              <p:par>
+                                <p:cTn id="5" presetID="2" presetClass="entr" presetSubtype="4" fill="hold" grpId="0" nodeType="clickEffect">
+                                  <p:stCondLst>
+                                    <p:cond delay="0"/>
+                                  </p:stCondLst>
+                                  <p:childTnLst>
+                                    <p:set>
+                                      <p:cBhvr>
+                                        <p:cTn id="6" dur="1" fill="hold">
+                                          <p:stCondLst>
+                                            <p:cond delay="0"/>
+                                          </p:stCondLst>
+                                        </p:cTn>
+                                        <p:tgtEl>
+                                          <p:spTgt spid="3">
+                                            <p:txEl>
+                                              <p:pRg st="0" end="0"/>
+                                            </p:txEl>
+                                          </p:spTgt>
+                                        </p:tgtEl>
+                                        <p:attrNameLst>
+                                          <p:attrName>style.visibility</p:attrName>
+                                        </p:attrNameLst>
+                                      </p:cBhvr>
+                                      <p:to>
+                                        <p:strVal val="visible"/>
+                                      </p:to>
+                                    </p:set>
+                                    <p:anim calcmode="lin" valueType="num">
+                                      <p:cBhvr additive="base">
+                                        <p:cTn id="7" dur="500" fill="hold"/>
+                                        <p:tgtEl>
+                                          <p:spTgt spid="3">
+                                            <p:txEl>
+                                              <p:pRg st="0" end="0"/>
+                                            </p:txEl>
+                                          </p:spTgt>
+                                        </p:tgtEl>
+                                        <p:attrNameLst>
+                                          <p:attrName>ppt_x</p:attrName>
+                                        </p:attrNameLst>
+                                      </p:cBhvr>
+                                      <p:tavLst>
+                                        <p:tav tm="0">
+                                          <p:val>
+                                            <p:strVal val="#ppt_x"/>
+                                          </p:val>
+                                        </p:tav>
+                                        <p:tav tm="100000">
+                                          <p:val>
+                                            <p:strVal val="#ppt_x"/>
+                                          </p:val>
+                                        </p:tav>
+                                      </p:tavLst>
+                                    </p:anim>
+                                    <p:anim calcmode="lin" valueType="num">
+                                      <p:cBhvr additive="base">
+                                        <p:cTn id="8" dur="500" fill="hold"/>
+                                        <p:tgtEl>
+                                          <p:spTgt spid="3">
+                                            <p:txEl>
+                                              <p:pRg st="0" end="0"/>
+                                            </p:txEl>
+                                          </p:spTgt>
+                                        </p:tgtEl>
+                                        <p:attrNameLst>
+                                          <p:attrName>ppt_y</p:attrName>
+                                        </p:attrNameLst>
+                                      </p:cBhvr>
+                                      <p:tavLst>
+                                        <p:tav tm="0">
+                                          <p:val>
+                                            <p:strVal val="1+#ppt_h/2"/>
+                                          </p:val>
+                                        </p:tav>
+                                        <p:tav tm="100000">
+                                          <p:val>
+                                            <p:strVal val="#ppt_y"/>
+                                          </p:val>
+                                        </p:tav>
+                                      </p:tavLst>
+                                    </p:anim>
+                                  </p:childTnLst>
+                                </p:cTn>
+                              </p:par>
+                            </p:childTnLst>
+                          </p:cTn>
+                        </p:par>
+                      </p:childTnLst>
+                    </p:cTn>
+                  </p:par>
+                  <p:par>
+                    <p:cTn id="9" fill="hold">
+                      <p:stCondLst>
+                        <p:cond delay="indefinite"/>
+                      </p:stCondLst>
+                      <p:childTnLst>
+                        <p:par>
+                          <p:cTn id="10" fill="hold">
+                            <p:stCondLst>
+                              <p:cond delay="0"/>
+                            </p:stCondLst>
+                            <p:childTnLst>
+                              <p:par>
+                                <p:cTn id="11" presetID="2" presetClass="entr" presetSubtype="4" fill="hold" grpId="0" nodeType="clickEffect">
+                                  <p:stCondLst>
+                                    <p:cond delay="0"/>
+                                  </p:stCondLst>
+                                  <p:childTnLst>
+                                    <p:set>
+                                      <p:cBhvr>
+                                        <p:cTn id="12" dur="1" fill="hold">
+                                          <p:stCondLst>
+                                            <p:cond delay="0"/>
+                                          </p:stCondLst>
+                                        </p:cTn>
+                                        <p:tgtEl>
+                                          <p:spTgt spid="3">
+                                            <p:txEl>
+                                              <p:pRg st="1" end="1"/>
+                                            </p:txEl>
+                                          </p:spTgt>
+                                        </p:tgtEl>
+                                        <p:attrNameLst>
+                                          <p:attrName>style.visibility</p:attrName>
+                                        </p:attrNameLst>
+                                      </p:cBhvr>
+                                      <p:to>
+                                        <p:strVal val="visible"/>
+                                      </p:to>
+                                    </p:set>
+                                    <p:anim calcmode="lin" valueType="num">
+                                      <p:cBhvr additive="base">
+                                        <p:cTn id="13" dur="500" fill="hold"/>
+                                        <p:tgtEl>
+                                          <p:spTgt spid="3">
+                                            <p:txEl>
+                                              <p:pRg st="1" end="1"/>
+                                            </p:txEl>
+                                          </p:spTgt>
+                                        </p:tgtEl>
+                                        <p:attrNameLst>
+                                          <p:attrName>ppt_x</p:attrName>
+                                        </p:attrNameLst>
+                                      </p:cBhvr>
+                                      <p:tavLst>
+                                        <p:tav tm="0">
+                                          <p:val>
+                                            <p:strVal val="#ppt_x"/>
+                                          </p:val>
+                                        </p:tav>
+                                        <p:tav tm="100000">
+                                          <p:val>
+                                            <p:strVal val="#ppt_x"/>
+                                          </p:val>
+                                        </p:tav>
+                                      </p:tavLst>
+                                    </p:anim>
+                                    <p:anim calcmode="lin" valueType="num">
+                                      <p:cBhvr additive="base">
+                                        <p:cTn id="14" dur="500" fill="hold"/>
+                                        <p:tgtEl>
+                                          <p:spTgt spid="3">
+                                            <p:txEl>
+                                              <p:pRg st="1" end="1"/>
+                                            </p:txEl>
+                                          </p:spTgt>
+                                        </p:tgtEl>
+                                        <p:attrNameLst>
+                                          <p:attrName>ppt_y</p:attrName>
+                                        </p:attrNameLst>
+                                      </p:cBhvr>
+                                      <p:tavLst>
+                                        <p:tav tm="0">
+                                          <p:val>
+                                            <p:strVal val="1+#ppt_h/2"/>
+                                          </p:val>
+                                        </p:tav>
+                                        <p:tav tm="100000">
+                                          <p:val>
+                                            <p:strVal val="#ppt_y"/>
+                                          </p:val>
+                                        </p:tav>
+                                      </p:tavLst>
+                                    </p:anim>
+                                  </p:childTnLst>
+                                </p:cTn>
+                              </p:par>
+                            </p:childTnLst>
+                          </p:cTn>
+                        </p:par>
+                      </p:childTnLst>
+                    </p:cTn>
+                  </p:par>
+                  <p:par>
+                    <p:cTn id="15" fill="hold">
+                      <p:stCondLst>
+                        <p:cond delay="indefinite"/>
+                      </p:stCondLst>
+                      <p:childTnLst>
+                        <p:par>
+                          <p:cTn id="16" fill="hold">
+                            <p:stCondLst>
+                              <p:cond delay="0"/>
+                            </p:stCondLst>
+                            <p:childTnLst>
+                              <p:par>
+                                <p:cTn id="17" presetID="2" presetClass="entr" presetSubtype="4" fill="hold" grpId="0" nodeType="clickEffect">
+                                  <p:stCondLst>
+                                    <p:cond delay="0"/>
+                                  </p:stCondLst>
+                                  <p:childTnLst>
+                                    <p:set>
+                                      <p:cBhvr>
+                                        <p:cTn id="18" dur="1" fill="hold">
+                                          <p:stCondLst>
+                                            <p:cond delay="0"/>
+                                          </p:stCondLst>
+                                        </p:cTn>
+                                        <p:tgtEl>
+                                          <p:spTgt spid="3">
+                                            <p:txEl>
+                                              <p:pRg st="2" end="2"/>
+                                            </p:txEl>
+                                          </p:spTgt>
+                                        </p:tgtEl>
+                                        <p:attrNameLst>
+                                          <p:attrName>style.visibility</p:attrName>
+                                        </p:attrNameLst>
+                                      </p:cBhvr>
+                                      <p:to>
+                                        <p:strVal val="visible"/>
+                                      </p:to>
+                                    </p:set>
+                                    <p:anim calcmode="lin" valueType="num">
+                                      <p:cBhvr additive="base">
+                                        <p:cTn id="19" dur="500" fill="hold"/>
+                                        <p:tgtEl>
+                                          <p:spTgt spid="3">
+                                            <p:txEl>
+                                              <p:pRg st="2" end="2"/>
+                                            </p:txEl>
+                                          </p:spTgt>
+                                        </p:tgtEl>
+                                        <p:attrNameLst>
+                                          <p:attrName>ppt_x</p:attrName>
+                                        </p:attrNameLst>
+                                      </p:cBhvr>
+                                      <p:tavLst>
+                                        <p:tav tm="0">
+                                          <p:val>
+                                            <p:strVal val="#ppt_x"/>
+                                          </p:val>
+                                        </p:tav>
+                                        <p:tav tm="100000">
+                                          <p:val>
+                                            <p:strVal val="#ppt_x"/>
+                                          </p:val>
+                                        </p:tav>
+                                      </p:tavLst>
+                                    </p:anim>
+                                    <p:anim calcmode="lin" valueType="num">
+                                      <p:cBhvr additive="base">
+                                        <p:cTn id="20" dur="500" fill="hold"/>
+                                        <p:tgtEl>
+                                          <p:spTgt spid="3">
+                                            <p:txEl>
+                                              <p:pRg st="2" end="2"/>
+                                            </p:txEl>
+                                          </p:spTgt>
+                                        </p:tgtEl>
+                                        <p:attrNameLst>
+                                          <p:attrName>ppt_y</p:attrName>
+                                        </p:attrNameLst>
+                                      </p:cBhvr>
+                                      <p:tavLst>
+                                        <p:tav tm="0">
+                                          <p:val>
+                                            <p:strVal val="1+#ppt_h/2"/>
+                                          </p:val>
+                                        </p:tav>
+                                        <p:tav tm="100000">
+                                          <p:val>
+                                            <p:strVal val="#ppt_y"/>
+                                          </p:val>
+                                        </p:tav>
+                                      </p:tavLst>
+                                    </p:anim>
+                                  </p:childTnLst>
+                                </p:cTn>
+                              </p:par>
+                            </p:childTnLst>
+                          </p:cTn>
+                        </p:par>
+                      </p:childTnLst>
+                    </p:cTn>
+                  </p:par>
+                </p:childTnLst>
+              </p:cTn>
+              <p:prevCondLst>
+                <p:cond evt="onPrev" delay="0">
+                  <p:tgtEl>
+                    <p:sldTgt/>
+                  </p:tgtEl>
+                </p:cond>
+              </p:prevCondLst>
+              <p:nextCondLst>
+                <p:cond evt="onNext" delay="0">
+                  <p:tgtEl>
+                    <p:sldTgt/>
+                  </p:tgtEl>
+                </p:cond>
+              </p:nextCondLst>
+            </p:seq>
+          </p:childTnLst>
+        </p:cTn>
+      </p:par>
+    </p:tnLst>
+    <p:bldLst>
+      <p:bldP spid="3" grpId="0" build="p"/>
+    </p:bldLst>
+  </p:timing>
 </p:sld>
 </file>
 
@@ -11642,8 +12425,8 @@
           </a:fontRef>
         </p:style>
       </p:cxnSp>
-      <mc:AlternateContent xmlns:mc="http://schemas.openxmlformats.org/markup-compatibility/2006">
-        <mc:Choice xmlns:a14="http://schemas.microsoft.com/office/drawing/2010/main" Requires="a14">
+      <mc:AlternateContent xmlns:mc="http://schemas.openxmlformats.org/markup-compatibility/2006" xmlns:a14="http://schemas.microsoft.com/office/drawing/2010/main">
+        <mc:Choice Requires="a14">
           <p:sp>
             <p:nvSpPr>
               <p:cNvPr id="3" name="Content Placeholder 2">
@@ -12079,7 +12862,7 @@
             </p:txBody>
           </p:sp>
         </mc:Choice>
-        <mc:Fallback>
+        <mc:Fallback xmlns="">
           <p:sp>
             <p:nvSpPr>
               <p:cNvPr id="3" name="Content Placeholder 2">
@@ -12496,6 +13279,283 @@
     <p:bg>
       <p:bgPr>
         <a:solidFill>
+          <a:schemeClr val="bg1"/>
+        </a:solidFill>
+        <a:effectLst/>
+      </p:bgPr>
+    </p:bg>
+    <p:spTree>
+      <p:nvGrpSpPr>
+        <p:cNvPr id="1" name=""/>
+        <p:cNvGrpSpPr/>
+        <p:nvPr/>
+      </p:nvGrpSpPr>
+      <p:grpSpPr>
+        <a:xfrm>
+          <a:off x="0" y="0"/>
+          <a:ext cx="0" cy="0"/>
+          <a:chOff x="0" y="0"/>
+          <a:chExt cx="0" cy="0"/>
+        </a:xfrm>
+      </p:grpSpPr>
+      <p:sp>
+        <p:nvSpPr>
+          <p:cNvPr id="17" name="Down Arrow 7">
+            <a:extLst>
+              <a:ext uri="{FF2B5EF4-FFF2-40B4-BE49-F238E27FC236}">
+                <a16:creationId xmlns:a16="http://schemas.microsoft.com/office/drawing/2014/main" id="{73DE2CFE-42F2-48F0-8706-5264E012B10C}"/>
+              </a:ext>
+              <a:ext uri="{C183D7F6-B498-43B3-948B-1728B52AA6E4}">
+                <adec:decorative xmlns:adec="http://schemas.microsoft.com/office/drawing/2017/decorative" val="1"/>
+              </a:ext>
+            </a:extLst>
+          </p:cNvPr>
+          <p:cNvSpPr>
+            <a:spLocks noGrp="1" noRot="1" noChangeAspect="1" noMove="1" noResize="1" noEditPoints="1" noAdjustHandles="1" noChangeArrowheads="1" noChangeShapeType="1" noTextEdit="1"/>
+          </p:cNvSpPr>
+          <p:nvPr>
+            <p:extLst>
+              <p:ext uri="{386F3935-93C4-4BCD-93E2-E3B085C9AB24}">
+                <p16:designElem xmlns:p16="http://schemas.microsoft.com/office/powerpoint/2015/main" val="1"/>
+              </p:ext>
+            </p:extLst>
+          </p:nvPr>
+        </p:nvSpPr>
+        <p:spPr>
+          <a:xfrm rot="16200000">
+            <a:off x="1288521" y="381403"/>
+            <a:ext cx="2200313" cy="3342508"/>
+          </a:xfrm>
+          <a:prstGeom prst="downArrow">
+            <a:avLst>
+              <a:gd name="adj1" fmla="val 100000"/>
+              <a:gd name="adj2" fmla="val 15788"/>
+            </a:avLst>
+          </a:prstGeom>
+          <a:solidFill>
+            <a:srgbClr val="404040"/>
+          </a:solidFill>
+          <a:ln w="53975">
+            <a:noFill/>
+          </a:ln>
+        </p:spPr>
+        <p:style>
+          <a:lnRef idx="2">
+            <a:schemeClr val="accent1">
+              <a:shade val="50000"/>
+            </a:schemeClr>
+          </a:lnRef>
+          <a:fillRef idx="1">
+            <a:schemeClr val="accent1"/>
+          </a:fillRef>
+          <a:effectRef idx="0">
+            <a:schemeClr val="accent1"/>
+          </a:effectRef>
+          <a:fontRef idx="minor">
+            <a:schemeClr val="lt1"/>
+          </a:fontRef>
+        </p:style>
+        <p:txBody>
+          <a:bodyPr rtlCol="0" anchor="ctr"/>
+          <a:lstStyle/>
+          <a:p>
+            <a:pPr marL="0" marR="0" lvl="0" indent="0" algn="ctr" defTabSz="914400" rtl="0" eaLnBrk="1" fontAlgn="auto" latinLnBrk="0" hangingPunct="1">
+              <a:lnSpc>
+                <a:spcPct val="100000"/>
+              </a:lnSpc>
+              <a:spcBef>
+                <a:spcPts val="0"/>
+              </a:spcBef>
+              <a:spcAft>
+                <a:spcPts val="0"/>
+              </a:spcAft>
+              <a:buClrTx/>
+              <a:buSzTx/>
+              <a:buFontTx/>
+              <a:buNone/>
+              <a:tabLst/>
+              <a:defRPr/>
+            </a:pPr>
+            <a:endParaRPr kumimoji="0" lang="en-US" sz="1800" b="0" i="0" u="none" strike="noStrike" kern="1200" cap="none" spc="0" normalizeH="0" baseline="0" noProof="0">
+              <a:ln>
+                <a:noFill/>
+              </a:ln>
+              <a:solidFill>
+                <a:prstClr val="white"/>
+              </a:solidFill>
+              <a:effectLst/>
+              <a:uLnTx/>
+              <a:uFillTx/>
+              <a:latin typeface="Calibri" panose="020F0502020204030204"/>
+              <a:ea typeface="+mn-ea"/>
+              <a:cs typeface="+mn-cs"/>
+            </a:endParaRPr>
+          </a:p>
+        </p:txBody>
+      </p:sp>
+      <p:sp>
+        <p:nvSpPr>
+          <p:cNvPr id="2" name="Title 1">
+            <a:extLst>
+              <a:ext uri="{FF2B5EF4-FFF2-40B4-BE49-F238E27FC236}">
+                <a16:creationId xmlns:a16="http://schemas.microsoft.com/office/drawing/2014/main" id="{3B357B2C-2F78-FA4C-8406-722390C3108F}"/>
+              </a:ext>
+            </a:extLst>
+          </p:cNvPr>
+          <p:cNvSpPr>
+            <a:spLocks noGrp="1"/>
+          </p:cNvSpPr>
+          <p:nvPr>
+            <p:ph type="title"/>
+          </p:nvPr>
+        </p:nvSpPr>
+        <p:spPr>
+          <a:xfrm>
+            <a:off x="966952" y="1204108"/>
+            <a:ext cx="2669406" cy="1781175"/>
+          </a:xfrm>
+          <a:prstGeom prst="ellipse">
+            <a:avLst/>
+          </a:prstGeom>
+        </p:spPr>
+        <p:txBody>
+          <a:bodyPr vert="horz" lIns="91440" tIns="45720" rIns="91440" bIns="45720" rtlCol="0" anchor="ctr">
+            <a:normAutofit/>
+          </a:bodyPr>
+          <a:lstStyle/>
+          <a:p>
+            <a:r>
+              <a:rPr lang="en-US" sz="2200" kern="1200">
+                <a:solidFill>
+                  <a:srgbClr val="FFFFFF"/>
+                </a:solidFill>
+                <a:latin typeface="+mj-lt"/>
+                <a:ea typeface="+mj-ea"/>
+                <a:cs typeface="+mj-cs"/>
+              </a:rPr>
+              <a:t>Parallel Scalability by Amdahl’s Law</a:t>
+            </a:r>
+          </a:p>
+        </p:txBody>
+      </p:sp>
+      <p:sp>
+        <p:nvSpPr>
+          <p:cNvPr id="6" name="TextBox 5">
+            <a:extLst>
+              <a:ext uri="{FF2B5EF4-FFF2-40B4-BE49-F238E27FC236}">
+                <a16:creationId xmlns:a16="http://schemas.microsoft.com/office/drawing/2014/main" id="{85585E1C-3E5A-904D-A762-8135B47EC283}"/>
+              </a:ext>
+            </a:extLst>
+          </p:cNvPr>
+          <p:cNvSpPr txBox="1"/>
+          <p:nvPr/>
+        </p:nvSpPr>
+        <p:spPr>
+          <a:xfrm>
+            <a:off x="625982" y="3355131"/>
+            <a:ext cx="4305364" cy="576790"/>
+          </a:xfrm>
+          <a:prstGeom prst="rect">
+            <a:avLst/>
+          </a:prstGeom>
+        </p:spPr>
+        <p:txBody>
+          <a:bodyPr vert="horz" lIns="91440" tIns="45720" rIns="91440" bIns="45720" rtlCol="0">
+            <a:normAutofit/>
+          </a:bodyPr>
+          <a:lstStyle/>
+          <a:p>
+            <a:pPr>
+              <a:lnSpc>
+                <a:spcPct val="90000"/>
+              </a:lnSpc>
+              <a:spcAft>
+                <a:spcPts val="600"/>
+              </a:spcAft>
+            </a:pPr>
+            <a:r>
+              <a:rPr lang="en-US" sz="1600"/>
+              <a:t>Source: </a:t>
+            </a:r>
+            <a:r>
+              <a:rPr lang="en-US" sz="1600">
+                <a:hlinkClick r:id="rId3"/>
+              </a:rPr>
+              <a:t>https://en.wikipedia.org/wiki/Amdahl%27s_law</a:t>
+            </a:r>
+            <a:endParaRPr lang="en-US" sz="1600"/>
+          </a:p>
+        </p:txBody>
+      </p:sp>
+      <p:pic>
+        <p:nvPicPr>
+          <p:cNvPr id="5" name="Content Placeholder 4">
+            <a:extLst>
+              <a:ext uri="{FF2B5EF4-FFF2-40B4-BE49-F238E27FC236}">
+                <a16:creationId xmlns:a16="http://schemas.microsoft.com/office/drawing/2014/main" id="{4723796D-F52B-524C-B1E9-3077A1BC4161}"/>
+              </a:ext>
+            </a:extLst>
+          </p:cNvPr>
+          <p:cNvPicPr>
+            <a:picLocks noGrp="1" noChangeAspect="1"/>
+          </p:cNvPicPr>
+          <p:nvPr>
+            <p:ph idx="1"/>
+          </p:nvPr>
+        </p:nvPicPr>
+        <p:blipFill>
+          <a:blip r:embed="rId4">
+            <a:extLst>
+              <a:ext uri="{96DAC541-7B7A-43D3-8B79-37D633B846F1}">
+                <asvg:svgBlip xmlns:asvg="http://schemas.microsoft.com/office/drawing/2016/SVG/main" r:embed="rId5"/>
+              </a:ext>
+            </a:extLst>
+          </a:blip>
+          <a:stretch>
+            <a:fillRect/>
+          </a:stretch>
+        </p:blipFill>
+        <p:spPr>
+          <a:xfrm>
+            <a:off x="4738540" y="287384"/>
+            <a:ext cx="7440601" cy="5812970"/>
+          </a:xfrm>
+          <a:prstGeom prst="rect">
+            <a:avLst/>
+          </a:prstGeom>
+        </p:spPr>
+      </p:pic>
+    </p:spTree>
+    <p:extLst>
+      <p:ext uri="{BB962C8B-B14F-4D97-AF65-F5344CB8AC3E}">
+        <p14:creationId xmlns:p14="http://schemas.microsoft.com/office/powerpoint/2010/main" val="2162965245"/>
+      </p:ext>
+    </p:extLst>
+  </p:cSld>
+  <p:clrMapOvr>
+    <a:masterClrMapping/>
+  </p:clrMapOvr>
+  <mc:AlternateContent xmlns:mc="http://schemas.openxmlformats.org/markup-compatibility/2006" xmlns:p15="http://schemas.microsoft.com/office/powerpoint/2012/main">
+    <mc:Choice Requires="p15">
+      <p:transition xmlns:p14="http://schemas.microsoft.com/office/powerpoint/2010/main" spd="slow" p14:dur="2000">
+        <p15:prstTrans prst="drape"/>
+      </p:transition>
+    </mc:Choice>
+    <mc:Fallback xmlns="">
+      <p:transition spd="slow">
+        <p:fade/>
+      </p:transition>
+    </mc:Fallback>
+  </mc:AlternateContent>
+</p:sld>
+</file>
+
+<file path=ppt/slides/slide9.xml><?xml version="1.0" encoding="utf-8"?>
+<p:sld xmlns:a="http://schemas.openxmlformats.org/drawingml/2006/main" xmlns:r="http://schemas.openxmlformats.org/officeDocument/2006/relationships" xmlns:p="http://schemas.openxmlformats.org/presentationml/2006/main">
+  <p:cSld>
+    <p:bg>
+      <p:bgPr>
+        <a:solidFill>
           <a:srgbClr val="FFFFFF"/>
         </a:solidFill>
         <a:effectLst/>
@@ -12734,704 +13794,6 @@
       </p:transition>
     </mc:Fallback>
   </mc:AlternateContent>
-</p:sld>
-</file>
-
-<file path=ppt/slides/slide9.xml><?xml version="1.0" encoding="utf-8"?>
-<p:sld xmlns:a="http://schemas.openxmlformats.org/drawingml/2006/main" xmlns:r="http://schemas.openxmlformats.org/officeDocument/2006/relationships" xmlns:p="http://schemas.openxmlformats.org/presentationml/2006/main">
-  <p:cSld>
-    <p:bg>
-      <p:bgPr>
-        <a:solidFill>
-          <a:schemeClr val="bg1"/>
-        </a:solidFill>
-        <a:effectLst/>
-      </p:bgPr>
-    </p:bg>
-    <p:spTree>
-      <p:nvGrpSpPr>
-        <p:cNvPr id="1" name=""/>
-        <p:cNvGrpSpPr/>
-        <p:nvPr/>
-      </p:nvGrpSpPr>
-      <p:grpSpPr>
-        <a:xfrm>
-          <a:off x="0" y="0"/>
-          <a:ext cx="0" cy="0"/>
-          <a:chOff x="0" y="0"/>
-          <a:chExt cx="0" cy="0"/>
-        </a:xfrm>
-      </p:grpSpPr>
-      <p:sp useBgFill="1">
-        <p:nvSpPr>
-          <p:cNvPr id="8" name="Rectangle 7">
-            <a:extLst>
-              <a:ext uri="{FF2B5EF4-FFF2-40B4-BE49-F238E27FC236}">
-                <a16:creationId xmlns:a16="http://schemas.microsoft.com/office/drawing/2014/main" id="{3B854194-185D-494D-905C-7C7CB2E30F6E}"/>
-              </a:ext>
-              <a:ext uri="{C183D7F6-B498-43B3-948B-1728B52AA6E4}">
-                <adec:decorative xmlns:adec="http://schemas.microsoft.com/office/drawing/2017/decorative" val="1"/>
-              </a:ext>
-            </a:extLst>
-          </p:cNvPr>
-          <p:cNvSpPr>
-            <a:spLocks noGrp="1" noRot="1" noChangeAspect="1" noMove="1" noResize="1" noEditPoints="1" noAdjustHandles="1" noChangeArrowheads="1" noChangeShapeType="1" noTextEdit="1"/>
-          </p:cNvSpPr>
-          <p:nvPr>
-            <p:extLst>
-              <p:ext uri="{386F3935-93C4-4BCD-93E2-E3B085C9AB24}">
-                <p16:designElem xmlns:p16="http://schemas.microsoft.com/office/powerpoint/2015/main" val="1"/>
-              </p:ext>
-            </p:extLst>
-          </p:nvPr>
-        </p:nvSpPr>
-        <p:spPr>
-          <a:xfrm>
-            <a:off x="1" y="0"/>
-            <a:ext cx="6082110" cy="6858000"/>
-          </a:xfrm>
-          <a:prstGeom prst="rect">
-            <a:avLst/>
-          </a:prstGeom>
-          <a:ln>
-            <a:noFill/>
-          </a:ln>
-        </p:spPr>
-        <p:style>
-          <a:lnRef idx="2">
-            <a:schemeClr val="accent1">
-              <a:shade val="50000"/>
-            </a:schemeClr>
-          </a:lnRef>
-          <a:fillRef idx="1">
-            <a:schemeClr val="accent1"/>
-          </a:fillRef>
-          <a:effectRef idx="0">
-            <a:schemeClr val="accent1"/>
-          </a:effectRef>
-          <a:fontRef idx="minor">
-            <a:schemeClr val="lt1"/>
-          </a:fontRef>
-        </p:style>
-        <p:txBody>
-          <a:bodyPr rtlCol="0" anchor="ctr"/>
-          <a:lstStyle/>
-          <a:p>
-            <a:pPr algn="ctr"/>
-            <a:endParaRPr lang="en-US" dirty="0"/>
-          </a:p>
-        </p:txBody>
-      </p:sp>
-      <p:sp>
-        <p:nvSpPr>
-          <p:cNvPr id="10" name="Rectangle 9">
-            <a:extLst>
-              <a:ext uri="{FF2B5EF4-FFF2-40B4-BE49-F238E27FC236}">
-                <a16:creationId xmlns:a16="http://schemas.microsoft.com/office/drawing/2014/main" id="{B4F5FA0D-0104-4987-8241-EFF7C85B88DE}"/>
-              </a:ext>
-              <a:ext uri="{C183D7F6-B498-43B3-948B-1728B52AA6E4}">
-                <adec:decorative xmlns:adec="http://schemas.microsoft.com/office/drawing/2017/decorative" val="1"/>
-              </a:ext>
-            </a:extLst>
-          </p:cNvPr>
-          <p:cNvSpPr>
-            <a:spLocks noGrp="1" noRot="1" noChangeAspect="1" noMove="1" noResize="1" noEditPoints="1" noAdjustHandles="1" noChangeArrowheads="1" noChangeShapeType="1" noTextEdit="1"/>
-          </p:cNvSpPr>
-          <p:nvPr>
-            <p:extLst>
-              <p:ext uri="{386F3935-93C4-4BCD-93E2-E3B085C9AB24}">
-                <p16:designElem xmlns:p16="http://schemas.microsoft.com/office/powerpoint/2015/main" val="1"/>
-              </p:ext>
-            </p:extLst>
-          </p:nvPr>
-        </p:nvSpPr>
-        <p:spPr>
-          <a:xfrm>
-            <a:off x="1" y="0"/>
-            <a:ext cx="12191998" cy="6858000"/>
-          </a:xfrm>
-          <a:prstGeom prst="rect">
-            <a:avLst/>
-          </a:prstGeom>
-          <a:gradFill>
-            <a:gsLst>
-              <a:gs pos="0">
-                <a:schemeClr val="accent1">
-                  <a:lumMod val="90000"/>
-                </a:schemeClr>
-              </a:gs>
-              <a:gs pos="25000">
-                <a:schemeClr val="accent1">
-                  <a:lumMod val="90000"/>
-                </a:schemeClr>
-              </a:gs>
-              <a:gs pos="94000">
-                <a:schemeClr val="bg2">
-                  <a:lumMod val="25000"/>
-                </a:schemeClr>
-              </a:gs>
-              <a:gs pos="100000">
-                <a:schemeClr val="bg2">
-                  <a:lumMod val="25000"/>
-                </a:schemeClr>
-              </a:gs>
-            </a:gsLst>
-            <a:lin ang="4200000" scaled="0"/>
-          </a:gradFill>
-          <a:ln>
-            <a:noFill/>
-          </a:ln>
-        </p:spPr>
-        <p:style>
-          <a:lnRef idx="2">
-            <a:schemeClr val="accent1">
-              <a:shade val="50000"/>
-            </a:schemeClr>
-          </a:lnRef>
-          <a:fillRef idx="1">
-            <a:schemeClr val="accent1"/>
-          </a:fillRef>
-          <a:effectRef idx="0">
-            <a:schemeClr val="accent1"/>
-          </a:effectRef>
-          <a:fontRef idx="minor">
-            <a:schemeClr val="lt1"/>
-          </a:fontRef>
-        </p:style>
-        <p:txBody>
-          <a:bodyPr rtlCol="0" anchor="ctr"/>
-          <a:lstStyle/>
-          <a:p>
-            <a:pPr algn="ctr"/>
-            <a:endParaRPr lang="en-US" dirty="0"/>
-          </a:p>
-        </p:txBody>
-      </p:sp>
-      <p:pic>
-        <p:nvPicPr>
-          <p:cNvPr id="12" name="Picture 11">
-            <a:extLst>
-              <a:ext uri="{FF2B5EF4-FFF2-40B4-BE49-F238E27FC236}">
-                <a16:creationId xmlns:a16="http://schemas.microsoft.com/office/drawing/2014/main" id="{2897127E-6CEF-446C-BE87-93B7C46E49D1}"/>
-              </a:ext>
-              <a:ext uri="{C183D7F6-B498-43B3-948B-1728B52AA6E4}">
-                <adec:decorative xmlns:adec="http://schemas.microsoft.com/office/drawing/2017/decorative" val="1"/>
-              </a:ext>
-            </a:extLst>
-          </p:cNvPr>
-          <p:cNvPicPr>
-            <a:picLocks noGrp="1" noRot="1" noChangeAspect="1" noMove="1" noResize="1" noEditPoints="1" noAdjustHandles="1" noChangeArrowheads="1" noChangeShapeType="1" noCrop="1"/>
-          </p:cNvPicPr>
-          <p:nvPr>
-            <p:extLst>
-              <p:ext uri="{386F3935-93C4-4BCD-93E2-E3B085C9AB24}">
-                <p16:designElem xmlns:p16="http://schemas.microsoft.com/office/powerpoint/2015/main" val="1"/>
-              </p:ext>
-            </p:extLst>
-          </p:nvPr>
-        </p:nvPicPr>
-        <p:blipFill>
-          <a:blip r:embed="rId2">
-            <a:extLst>
-              <a:ext uri="{28A0092B-C50C-407E-A947-70E740481C1C}">
-                <a14:useLocalDpi xmlns:a14="http://schemas.microsoft.com/office/drawing/2010/main" val="0"/>
-              </a:ext>
-            </a:extLst>
-          </a:blip>
-          <a:stretch>
-            <a:fillRect/>
-          </a:stretch>
-        </p:blipFill>
-        <p:spPr>
-          <a:xfrm>
-            <a:off x="0" y="0"/>
-            <a:ext cx="12192000" cy="6858000"/>
-          </a:xfrm>
-          <a:prstGeom prst="rect">
-            <a:avLst/>
-          </a:prstGeom>
-        </p:spPr>
-      </p:pic>
-      <p:sp>
-        <p:nvSpPr>
-          <p:cNvPr id="2" name="Title 1">
-            <a:extLst>
-              <a:ext uri="{FF2B5EF4-FFF2-40B4-BE49-F238E27FC236}">
-                <a16:creationId xmlns:a16="http://schemas.microsoft.com/office/drawing/2014/main" id="{8C601C3B-4D47-8348-BC4A-FD48875EDBAC}"/>
-              </a:ext>
-            </a:extLst>
-          </p:cNvPr>
-          <p:cNvSpPr>
-            <a:spLocks noGrp="1"/>
-          </p:cNvSpPr>
-          <p:nvPr>
-            <p:ph type="title"/>
-          </p:nvPr>
-        </p:nvSpPr>
-        <p:spPr>
-          <a:xfrm>
-            <a:off x="640079" y="2053641"/>
-            <a:ext cx="3669161" cy="2760098"/>
-          </a:xfrm>
-        </p:spPr>
-        <p:txBody>
-          <a:bodyPr>
-            <a:normAutofit/>
-          </a:bodyPr>
-          <a:lstStyle/>
-          <a:p>
-            <a:r>
-              <a:rPr lang="en-US" dirty="0">
-                <a:solidFill>
-                  <a:srgbClr val="FFFFFF"/>
-                </a:solidFill>
-              </a:rPr>
-              <a:t>Conclusion</a:t>
-            </a:r>
-          </a:p>
-        </p:txBody>
-      </p:sp>
-      <p:sp>
-        <p:nvSpPr>
-          <p:cNvPr id="3" name="Content Placeholder 2">
-            <a:extLst>
-              <a:ext uri="{FF2B5EF4-FFF2-40B4-BE49-F238E27FC236}">
-                <a16:creationId xmlns:a16="http://schemas.microsoft.com/office/drawing/2014/main" id="{4E96CE26-75BF-634E-9173-A86837E71C55}"/>
-              </a:ext>
-            </a:extLst>
-          </p:cNvPr>
-          <p:cNvSpPr>
-            <a:spLocks noGrp="1"/>
-          </p:cNvSpPr>
-          <p:nvPr>
-            <p:ph idx="1"/>
-          </p:nvPr>
-        </p:nvSpPr>
-        <p:spPr>
-          <a:xfrm>
-            <a:off x="6090574" y="801866"/>
-            <a:ext cx="5306084" cy="5230634"/>
-          </a:xfrm>
-        </p:spPr>
-        <p:txBody>
-          <a:bodyPr anchor="ctr">
-            <a:normAutofit/>
-          </a:bodyPr>
-          <a:lstStyle/>
-          <a:p>
-            <a:r>
-              <a:rPr lang="en-US" sz="2400" dirty="0">
-                <a:solidFill>
-                  <a:srgbClr val="000000"/>
-                </a:solidFill>
-              </a:rPr>
-              <a:t>Python is shipped with a powerful library called </a:t>
-            </a:r>
-            <a:r>
-              <a:rPr lang="en-US" sz="2400" dirty="0">
-                <a:solidFill>
-                  <a:srgbClr val="000000"/>
-                </a:solidFill>
-                <a:latin typeface="Courier New" panose="02070309020205020404" pitchFamily="49" charset="0"/>
-                <a:cs typeface="Courier New" panose="02070309020205020404" pitchFamily="49" charset="0"/>
-              </a:rPr>
-              <a:t>multiprocessing</a:t>
-            </a:r>
-            <a:r>
-              <a:rPr lang="en-US" sz="2400" dirty="0">
-                <a:solidFill>
-                  <a:srgbClr val="000000"/>
-                </a:solidFill>
-              </a:rPr>
-              <a:t> for working with processes.</a:t>
-            </a:r>
-          </a:p>
-          <a:p>
-            <a:r>
-              <a:rPr lang="en-US" sz="2400" dirty="0">
-                <a:solidFill>
-                  <a:srgbClr val="000000"/>
-                </a:solidFill>
-              </a:rPr>
-              <a:t>Processes need to communicate and exchange data. Most often this can be accomplished via queues.</a:t>
-            </a:r>
-          </a:p>
-          <a:p>
-            <a:r>
-              <a:rPr lang="en-US" sz="2400" dirty="0">
-                <a:solidFill>
-                  <a:srgbClr val="000000"/>
-                </a:solidFill>
-              </a:rPr>
-              <a:t>Pool/map paradigm is based upon the 3 steps general parallel problem solving procedure: distribute work, execute tasks in parallel, and combine partial results. Very reminiscent to the MapReduce paradigm.</a:t>
-            </a:r>
-          </a:p>
-        </p:txBody>
-      </p:sp>
-    </p:spTree>
-    <p:extLst>
-      <p:ext uri="{BB962C8B-B14F-4D97-AF65-F5344CB8AC3E}">
-        <p14:creationId xmlns:p14="http://schemas.microsoft.com/office/powerpoint/2010/main" val="2157392188"/>
-      </p:ext>
-    </p:extLst>
-  </p:cSld>
-  <p:clrMapOvr>
-    <a:masterClrMapping/>
-  </p:clrMapOvr>
-  <mc:AlternateContent xmlns:mc="http://schemas.openxmlformats.org/markup-compatibility/2006" xmlns:p15="http://schemas.microsoft.com/office/powerpoint/2012/main">
-    <mc:Choice Requires="p15">
-      <p:transition xmlns:p14="http://schemas.microsoft.com/office/powerpoint/2010/main" spd="slow" p14:dur="2000">
-        <p15:prstTrans prst="drape"/>
-      </p:transition>
-    </mc:Choice>
-    <mc:Fallback xmlns="">
-      <p:transition spd="slow">
-        <p:fade/>
-      </p:transition>
-    </mc:Fallback>
-  </mc:AlternateContent>
-  <p:timing>
-    <p:tnLst>
-      <p:par>
-        <p:cTn id="1" dur="indefinite" restart="never" nodeType="tmRoot">
-          <p:childTnLst>
-            <p:seq concurrent="1" nextAc="seek">
-              <p:cTn id="2" dur="indefinite" nodeType="mainSeq">
-                <p:childTnLst>
-                  <p:par>
-                    <p:cTn id="3" fill="hold">
-                      <p:stCondLst>
-                        <p:cond delay="indefinite"/>
-                      </p:stCondLst>
-                      <p:childTnLst>
-                        <p:par>
-                          <p:cTn id="4" fill="hold">
-                            <p:stCondLst>
-                              <p:cond delay="0"/>
-                            </p:stCondLst>
-                            <p:childTnLst>
-                              <p:par>
-                                <p:cTn id="5" presetID="2" presetClass="entr" presetSubtype="4" fill="hold" grpId="0" nodeType="clickEffect">
-                                  <p:stCondLst>
-                                    <p:cond delay="0"/>
-                                  </p:stCondLst>
-                                  <p:childTnLst>
-                                    <p:set>
-                                      <p:cBhvr>
-                                        <p:cTn id="6" dur="1" fill="hold">
-                                          <p:stCondLst>
-                                            <p:cond delay="0"/>
-                                          </p:stCondLst>
-                                        </p:cTn>
-                                        <p:tgtEl>
-                                          <p:spTgt spid="3">
-                                            <p:txEl>
-                                              <p:pRg st="0" end="0"/>
-                                            </p:txEl>
-                                          </p:spTgt>
-                                        </p:tgtEl>
-                                        <p:attrNameLst>
-                                          <p:attrName>style.visibility</p:attrName>
-                                        </p:attrNameLst>
-                                      </p:cBhvr>
-                                      <p:to>
-                                        <p:strVal val="visible"/>
-                                      </p:to>
-                                    </p:set>
-                                    <p:anim calcmode="lin" valueType="num">
-                                      <p:cBhvr additive="base">
-                                        <p:cTn id="7" dur="500" fill="hold"/>
-                                        <p:tgtEl>
-                                          <p:spTgt spid="3">
-                                            <p:txEl>
-                                              <p:pRg st="0" end="0"/>
-                                            </p:txEl>
-                                          </p:spTgt>
-                                        </p:tgtEl>
-                                        <p:attrNameLst>
-                                          <p:attrName>ppt_x</p:attrName>
-                                        </p:attrNameLst>
-                                      </p:cBhvr>
-                                      <p:tavLst>
-                                        <p:tav tm="0">
-                                          <p:val>
-                                            <p:strVal val="#ppt_x"/>
-                                          </p:val>
-                                        </p:tav>
-                                        <p:tav tm="100000">
-                                          <p:val>
-                                            <p:strVal val="#ppt_x"/>
-                                          </p:val>
-                                        </p:tav>
-                                      </p:tavLst>
-                                    </p:anim>
-                                    <p:anim calcmode="lin" valueType="num">
-                                      <p:cBhvr additive="base">
-                                        <p:cTn id="8" dur="500" fill="hold"/>
-                                        <p:tgtEl>
-                                          <p:spTgt spid="3">
-                                            <p:txEl>
-                                              <p:pRg st="0" end="0"/>
-                                            </p:txEl>
-                                          </p:spTgt>
-                                        </p:tgtEl>
-                                        <p:attrNameLst>
-                                          <p:attrName>ppt_y</p:attrName>
-                                        </p:attrNameLst>
-                                      </p:cBhvr>
-                                      <p:tavLst>
-                                        <p:tav tm="0">
-                                          <p:val>
-                                            <p:strVal val="1+#ppt_h/2"/>
-                                          </p:val>
-                                        </p:tav>
-                                        <p:tav tm="100000">
-                                          <p:val>
-                                            <p:strVal val="#ppt_y"/>
-                                          </p:val>
-                                        </p:tav>
-                                      </p:tavLst>
-                                    </p:anim>
-                                  </p:childTnLst>
-                                </p:cTn>
-                              </p:par>
-                            </p:childTnLst>
-                          </p:cTn>
-                        </p:par>
-                      </p:childTnLst>
-                    </p:cTn>
-                  </p:par>
-                  <p:par>
-                    <p:cTn id="9" fill="hold">
-                      <p:stCondLst>
-                        <p:cond delay="indefinite"/>
-                      </p:stCondLst>
-                      <p:childTnLst>
-                        <p:par>
-                          <p:cTn id="10" fill="hold">
-                            <p:stCondLst>
-                              <p:cond delay="0"/>
-                            </p:stCondLst>
-                            <p:childTnLst>
-                              <p:par>
-                                <p:cTn id="11" presetID="2" presetClass="entr" presetSubtype="4" fill="hold" grpId="0" nodeType="clickEffect">
-                                  <p:stCondLst>
-                                    <p:cond delay="0"/>
-                                  </p:stCondLst>
-                                  <p:childTnLst>
-                                    <p:set>
-                                      <p:cBhvr>
-                                        <p:cTn id="12" dur="1" fill="hold">
-                                          <p:stCondLst>
-                                            <p:cond delay="0"/>
-                                          </p:stCondLst>
-                                        </p:cTn>
-                                        <p:tgtEl>
-                                          <p:spTgt spid="3">
-                                            <p:txEl>
-                                              <p:pRg st="1" end="1"/>
-                                            </p:txEl>
-                                          </p:spTgt>
-                                        </p:tgtEl>
-                                        <p:attrNameLst>
-                                          <p:attrName>style.visibility</p:attrName>
-                                        </p:attrNameLst>
-                                      </p:cBhvr>
-                                      <p:to>
-                                        <p:strVal val="visible"/>
-                                      </p:to>
-                                    </p:set>
-                                    <p:anim calcmode="lin" valueType="num">
-                                      <p:cBhvr additive="base">
-                                        <p:cTn id="13" dur="500" fill="hold"/>
-                                        <p:tgtEl>
-                                          <p:spTgt spid="3">
-                                            <p:txEl>
-                                              <p:pRg st="1" end="1"/>
-                                            </p:txEl>
-                                          </p:spTgt>
-                                        </p:tgtEl>
-                                        <p:attrNameLst>
-                                          <p:attrName>ppt_x</p:attrName>
-                                        </p:attrNameLst>
-                                      </p:cBhvr>
-                                      <p:tavLst>
-                                        <p:tav tm="0">
-                                          <p:val>
-                                            <p:strVal val="#ppt_x"/>
-                                          </p:val>
-                                        </p:tav>
-                                        <p:tav tm="100000">
-                                          <p:val>
-                                            <p:strVal val="#ppt_x"/>
-                                          </p:val>
-                                        </p:tav>
-                                      </p:tavLst>
-                                    </p:anim>
-                                    <p:anim calcmode="lin" valueType="num">
-                                      <p:cBhvr additive="base">
-                                        <p:cTn id="14" dur="500" fill="hold"/>
-                                        <p:tgtEl>
-                                          <p:spTgt spid="3">
-                                            <p:txEl>
-                                              <p:pRg st="1" end="1"/>
-                                            </p:txEl>
-                                          </p:spTgt>
-                                        </p:tgtEl>
-                                        <p:attrNameLst>
-                                          <p:attrName>ppt_y</p:attrName>
-                                        </p:attrNameLst>
-                                      </p:cBhvr>
-                                      <p:tavLst>
-                                        <p:tav tm="0">
-                                          <p:val>
-                                            <p:strVal val="1+#ppt_h/2"/>
-                                          </p:val>
-                                        </p:tav>
-                                        <p:tav tm="100000">
-                                          <p:val>
-                                            <p:strVal val="#ppt_y"/>
-                                          </p:val>
-                                        </p:tav>
-                                      </p:tavLst>
-                                    </p:anim>
-                                  </p:childTnLst>
-                                </p:cTn>
-                              </p:par>
-                            </p:childTnLst>
-                          </p:cTn>
-                        </p:par>
-                      </p:childTnLst>
-                    </p:cTn>
-                  </p:par>
-                  <p:par>
-                    <p:cTn id="15" fill="hold">
-                      <p:stCondLst>
-                        <p:cond delay="indefinite"/>
-                      </p:stCondLst>
-                      <p:childTnLst>
-                        <p:par>
-                          <p:cTn id="16" fill="hold">
-                            <p:stCondLst>
-                              <p:cond delay="0"/>
-                            </p:stCondLst>
-                            <p:childTnLst>
-                              <p:par>
-                                <p:cTn id="17" presetID="2" presetClass="entr" presetSubtype="4" fill="hold" grpId="0" nodeType="clickEffect">
-                                  <p:stCondLst>
-                                    <p:cond delay="0"/>
-                                  </p:stCondLst>
-                                  <p:childTnLst>
-                                    <p:set>
-                                      <p:cBhvr>
-                                        <p:cTn id="18" dur="1" fill="hold">
-                                          <p:stCondLst>
-                                            <p:cond delay="0"/>
-                                          </p:stCondLst>
-                                        </p:cTn>
-                                        <p:tgtEl>
-                                          <p:spTgt spid="3">
-                                            <p:txEl>
-                                              <p:pRg st="2" end="2"/>
-                                            </p:txEl>
-                                          </p:spTgt>
-                                        </p:tgtEl>
-                                        <p:attrNameLst>
-                                          <p:attrName>style.visibility</p:attrName>
-                                        </p:attrNameLst>
-                                      </p:cBhvr>
-                                      <p:to>
-                                        <p:strVal val="visible"/>
-                                      </p:to>
-                                    </p:set>
-                                    <p:anim calcmode="lin" valueType="num">
-                                      <p:cBhvr additive="base">
-                                        <p:cTn id="19" dur="500" fill="hold"/>
-                                        <p:tgtEl>
-                                          <p:spTgt spid="3">
-                                            <p:txEl>
-                                              <p:pRg st="2" end="2"/>
-                                            </p:txEl>
-                                          </p:spTgt>
-                                        </p:tgtEl>
-                                        <p:attrNameLst>
-                                          <p:attrName>ppt_x</p:attrName>
-                                        </p:attrNameLst>
-                                      </p:cBhvr>
-                                      <p:tavLst>
-                                        <p:tav tm="0">
-                                          <p:val>
-                                            <p:strVal val="#ppt_x"/>
-                                          </p:val>
-                                        </p:tav>
-                                        <p:tav tm="100000">
-                                          <p:val>
-                                            <p:strVal val="#ppt_x"/>
-                                          </p:val>
-                                        </p:tav>
-                                      </p:tavLst>
-                                    </p:anim>
-                                    <p:anim calcmode="lin" valueType="num">
-                                      <p:cBhvr additive="base">
-                                        <p:cTn id="20" dur="500" fill="hold"/>
-                                        <p:tgtEl>
-                                          <p:spTgt spid="3">
-                                            <p:txEl>
-                                              <p:pRg st="2" end="2"/>
-                                            </p:txEl>
-                                          </p:spTgt>
-                                        </p:tgtEl>
-                                        <p:attrNameLst>
-                                          <p:attrName>ppt_y</p:attrName>
-                                        </p:attrNameLst>
-                                      </p:cBhvr>
-                                      <p:tavLst>
-                                        <p:tav tm="0">
-                                          <p:val>
-                                            <p:strVal val="1+#ppt_h/2"/>
-                                          </p:val>
-                                        </p:tav>
-                                        <p:tav tm="100000">
-                                          <p:val>
-                                            <p:strVal val="#ppt_y"/>
-                                          </p:val>
-                                        </p:tav>
-                                      </p:tavLst>
-                                    </p:anim>
-                                  </p:childTnLst>
-                                </p:cTn>
-                              </p:par>
-                            </p:childTnLst>
-                          </p:cTn>
-                        </p:par>
-                      </p:childTnLst>
-                    </p:cTn>
-                  </p:par>
-                </p:childTnLst>
-              </p:cTn>
-              <p:prevCondLst>
-                <p:cond evt="onPrev" delay="0">
-                  <p:tgtEl>
-                    <p:sldTgt/>
-                  </p:tgtEl>
-                </p:cond>
-              </p:prevCondLst>
-              <p:nextCondLst>
-                <p:cond evt="onNext" delay="0">
-                  <p:tgtEl>
-                    <p:sldTgt/>
-                  </p:tgtEl>
-                </p:cond>
-              </p:nextCondLst>
-            </p:seq>
-          </p:childTnLst>
-        </p:cTn>
-      </p:par>
-    </p:tnLst>
-    <p:bldLst>
-      <p:bldP spid="3" grpId="0" build="p"/>
-    </p:bldLst>
-  </p:timing>
 </p:sld>
 </file>
 

</xml_diff>

<commit_message>
Update presentations to reflect recent additions to the code base.
</commit_message>
<xml_diff>
--- a/lecture-2/presentation-2.pptx
+++ b/lecture-2/presentation-2.pptx
@@ -3200,7 +3200,7 @@
           <a:p>
             <a:fld id="{E758746B-B0EA-CA41-BB8E-A8C6FE44757D}" type="datetimeFigureOut">
               <a:rPr lang="en-US"/>
-              <a:t>11/6/19</a:t>
+              <a:t>2/25/20</a:t>
             </a:fld>
             <a:endParaRPr lang="en-US" dirty="0"/>
           </a:p>
@@ -3699,7 +3699,7 @@
             <a:fld id="{B61BEF0D-F0BB-DE4B-95CE-6DB70DBA9567}" type="datetimeFigureOut">
               <a:rPr lang="en-US"/>
               <a:pPr/>
-              <a:t>11/6/19</a:t>
+              <a:t>2/25/20</a:t>
             </a:fld>
             <a:endParaRPr lang="en-US" dirty="0"/>
           </a:p>
@@ -3911,7 +3911,7 @@
             <a:fld id="{B61BEF0D-F0BB-DE4B-95CE-6DB70DBA9567}" type="datetimeFigureOut">
               <a:rPr lang="en-US"/>
               <a:pPr/>
-              <a:t>11/6/19</a:t>
+              <a:t>2/25/20</a:t>
             </a:fld>
             <a:endParaRPr lang="en-US" dirty="0"/>
           </a:p>
@@ -4133,7 +4133,7 @@
             <a:fld id="{B61BEF0D-F0BB-DE4B-95CE-6DB70DBA9567}" type="datetimeFigureOut">
               <a:rPr lang="en-US"/>
               <a:pPr/>
-              <a:t>11/6/19</a:t>
+              <a:t>2/25/20</a:t>
             </a:fld>
             <a:endParaRPr lang="en-US" dirty="0"/>
           </a:p>
@@ -4345,7 +4345,7 @@
             <a:fld id="{B61BEF0D-F0BB-DE4B-95CE-6DB70DBA9567}" type="datetimeFigureOut">
               <a:rPr lang="en-US"/>
               <a:pPr/>
-              <a:t>11/6/19</a:t>
+              <a:t>2/25/20</a:t>
             </a:fld>
             <a:endParaRPr lang="en-US" dirty="0"/>
           </a:p>
@@ -4634,7 +4634,7 @@
             <a:fld id="{B61BEF0D-F0BB-DE4B-95CE-6DB70DBA9567}" type="datetimeFigureOut">
               <a:rPr lang="en-US"/>
               <a:pPr/>
-              <a:t>11/6/19</a:t>
+              <a:t>2/25/20</a:t>
             </a:fld>
             <a:endParaRPr lang="en-US" dirty="0"/>
           </a:p>
@@ -4913,7 +4913,7 @@
             <a:fld id="{B61BEF0D-F0BB-DE4B-95CE-6DB70DBA9567}" type="datetimeFigureOut">
               <a:rPr lang="en-US"/>
               <a:pPr/>
-              <a:t>11/6/19</a:t>
+              <a:t>2/25/20</a:t>
             </a:fld>
             <a:endParaRPr lang="en-US" dirty="0"/>
           </a:p>
@@ -5339,7 +5339,7 @@
             <a:fld id="{B61BEF0D-F0BB-DE4B-95CE-6DB70DBA9567}" type="datetimeFigureOut">
               <a:rPr lang="en-US"/>
               <a:pPr/>
-              <a:t>11/6/19</a:t>
+              <a:t>2/25/20</a:t>
             </a:fld>
             <a:endParaRPr lang="en-US" dirty="0"/>
           </a:p>
@@ -5482,7 +5482,7 @@
             <a:fld id="{B61BEF0D-F0BB-DE4B-95CE-6DB70DBA9567}" type="datetimeFigureOut">
               <a:rPr lang="en-US"/>
               <a:pPr/>
-              <a:t>11/6/19</a:t>
+              <a:t>2/25/20</a:t>
             </a:fld>
             <a:endParaRPr lang="en-US" dirty="0"/>
           </a:p>
@@ -5609,7 +5609,7 @@
             <a:fld id="{B61BEF0D-F0BB-DE4B-95CE-6DB70DBA9567}" type="datetimeFigureOut">
               <a:rPr lang="en-US"/>
               <a:pPr/>
-              <a:t>11/6/19</a:t>
+              <a:t>2/25/20</a:t>
             </a:fld>
             <a:endParaRPr lang="en-US" dirty="0"/>
           </a:p>
@@ -5934,7 +5934,7 @@
             <a:fld id="{B61BEF0D-F0BB-DE4B-95CE-6DB70DBA9567}" type="datetimeFigureOut">
               <a:rPr lang="en-US"/>
               <a:pPr/>
-              <a:t>11/6/19</a:t>
+              <a:t>2/25/20</a:t>
             </a:fld>
             <a:endParaRPr lang="en-US" dirty="0"/>
           </a:p>
@@ -6236,7 +6236,7 @@
             <a:fld id="{B61BEF0D-F0BB-DE4B-95CE-6DB70DBA9567}" type="datetimeFigureOut">
               <a:rPr lang="en-US"/>
               <a:pPr/>
-              <a:t>11/6/19</a:t>
+              <a:t>2/25/20</a:t>
             </a:fld>
             <a:endParaRPr lang="en-US" dirty="0"/>
           </a:p>
@@ -6491,7 +6491,7 @@
             <a:fld id="{B61BEF0D-F0BB-DE4B-95CE-6DB70DBA9567}" type="datetimeFigureOut">
               <a:rPr lang="en-US"/>
               <a:pPr/>
-              <a:t>11/6/19</a:t>
+              <a:t>2/25/20</a:t>
             </a:fld>
             <a:endParaRPr lang="en-US" dirty="0"/>
           </a:p>
@@ -11817,7 +11817,7 @@
                   <a:srgbClr val="FFFFFF"/>
                 </a:solidFill>
               </a:rPr>
-              <a:t>Communicating via a Queue</a:t>
+              <a:t>Communicating via Queue and Manager</a:t>
             </a:r>
           </a:p>
         </p:txBody>
@@ -12425,8 +12425,8 @@
           </a:fontRef>
         </p:style>
       </p:cxnSp>
-      <mc:AlternateContent xmlns:mc="http://schemas.openxmlformats.org/markup-compatibility/2006">
-        <mc:Choice xmlns:a14="http://schemas.microsoft.com/office/drawing/2010/main" Requires="a14">
+      <mc:AlternateContent xmlns:mc="http://schemas.openxmlformats.org/markup-compatibility/2006" xmlns:a14="http://schemas.microsoft.com/office/drawing/2010/main">
+        <mc:Choice Requires="a14">
           <p:sp>
             <p:nvSpPr>
               <p:cNvPr id="3" name="Content Placeholder 2">
@@ -12862,7 +12862,7 @@
             </p:txBody>
           </p:sp>
         </mc:Choice>
-        <mc:Fallback>
+        <mc:Fallback xmlns="">
           <p:sp>
             <p:nvSpPr>
               <p:cNvPr id="3" name="Content Placeholder 2">

</xml_diff>

<commit_message>
Add explanation of the Gustafosn's law.
</commit_message>
<xml_diff>
--- a/lecture-2/presentation-2.pptx
+++ b/lecture-2/presentation-2.pptx
@@ -5,7 +5,7 @@
     <p:sldMasterId id="2147483764" r:id="rId1"/>
   </p:sldMasterIdLst>
   <p:notesMasterIdLst>
-    <p:notesMasterId r:id="rId12"/>
+    <p:notesMasterId r:id="rId13"/>
   </p:notesMasterIdLst>
   <p:sldIdLst>
     <p:sldId id="256" r:id="rId2"/>
@@ -16,8 +16,9 @@
     <p:sldId id="310" r:id="rId7"/>
     <p:sldId id="313" r:id="rId8"/>
     <p:sldId id="315" r:id="rId9"/>
-    <p:sldId id="314" r:id="rId10"/>
-    <p:sldId id="312" r:id="rId11"/>
+    <p:sldId id="316" r:id="rId10"/>
+    <p:sldId id="314" r:id="rId11"/>
+    <p:sldId id="312" r:id="rId12"/>
   </p:sldIdLst>
   <p:sldSz cx="12192000" cy="6858000"/>
   <p:notesSz cx="6858000" cy="9144000"/>
@@ -3200,7 +3201,7 @@
           <a:p>
             <a:fld id="{E758746B-B0EA-CA41-BB8E-A8C6FE44757D}" type="datetimeFigureOut">
               <a:rPr lang="en-US"/>
-              <a:t>2/25/20</a:t>
+              <a:t>10/22/20</a:t>
             </a:fld>
             <a:endParaRPr lang="en-US" dirty="0"/>
           </a:p>
@@ -3551,6 +3552,90 @@
 </p:notes>
 </file>
 
+<file path=ppt/notesSlides/notesSlide2.xml><?xml version="1.0" encoding="utf-8"?>
+<p:notes xmlns:a="http://schemas.openxmlformats.org/drawingml/2006/main" xmlns:r="http://schemas.openxmlformats.org/officeDocument/2006/relationships" xmlns:p="http://schemas.openxmlformats.org/presentationml/2006/main">
+  <p:cSld>
+    <p:spTree>
+      <p:nvGrpSpPr>
+        <p:cNvPr id="1" name=""/>
+        <p:cNvGrpSpPr/>
+        <p:nvPr/>
+      </p:nvGrpSpPr>
+      <p:grpSpPr>
+        <a:xfrm>
+          <a:off x="0" y="0"/>
+          <a:ext cx="0" cy="0"/>
+          <a:chOff x="0" y="0"/>
+          <a:chExt cx="0" cy="0"/>
+        </a:xfrm>
+      </p:grpSpPr>
+      <p:sp>
+        <p:nvSpPr>
+          <p:cNvPr id="2" name="Slide Image Placeholder 1"/>
+          <p:cNvSpPr>
+            <a:spLocks noGrp="1" noRot="1" noChangeAspect="1"/>
+          </p:cNvSpPr>
+          <p:nvPr>
+            <p:ph type="sldImg"/>
+          </p:nvPr>
+        </p:nvSpPr>
+        <p:spPr/>
+      </p:sp>
+      <p:sp>
+        <p:nvSpPr>
+          <p:cNvPr id="3" name="Notes Placeholder 2"/>
+          <p:cNvSpPr>
+            <a:spLocks noGrp="1"/>
+          </p:cNvSpPr>
+          <p:nvPr>
+            <p:ph type="body" idx="1"/>
+          </p:nvPr>
+        </p:nvSpPr>
+        <p:spPr/>
+        <p:txBody>
+          <a:bodyPr/>
+          <a:lstStyle/>
+          <a:p>
+            <a:endParaRPr lang="en-US" dirty="0"/>
+          </a:p>
+        </p:txBody>
+      </p:sp>
+      <p:sp>
+        <p:nvSpPr>
+          <p:cNvPr id="4" name="Slide Number Placeholder 3"/>
+          <p:cNvSpPr>
+            <a:spLocks noGrp="1"/>
+          </p:cNvSpPr>
+          <p:nvPr>
+            <p:ph type="sldNum" sz="quarter" idx="5"/>
+          </p:nvPr>
+        </p:nvSpPr>
+        <p:spPr/>
+        <p:txBody>
+          <a:bodyPr/>
+          <a:lstStyle/>
+          <a:p>
+            <a:fld id="{488DFEC0-A4ED-6E4A-B0B6-6FC7C158168F}" type="slidenum">
+              <a:rPr lang="en-US"/>
+              <a:t>9</a:t>
+            </a:fld>
+            <a:endParaRPr lang="en-US" dirty="0"/>
+          </a:p>
+        </p:txBody>
+      </p:sp>
+    </p:spTree>
+    <p:extLst>
+      <p:ext uri="{BB962C8B-B14F-4D97-AF65-F5344CB8AC3E}">
+        <p14:creationId xmlns:p14="http://schemas.microsoft.com/office/powerpoint/2010/main" val="4164528203"/>
+      </p:ext>
+    </p:extLst>
+  </p:cSld>
+  <p:clrMapOvr>
+    <a:masterClrMapping/>
+  </p:clrMapOvr>
+</p:notes>
+</file>
+
 <file path=ppt/slideLayouts/slideLayout1.xml><?xml version="1.0" encoding="utf-8"?>
 <p:sldLayout xmlns:a="http://schemas.openxmlformats.org/drawingml/2006/main" xmlns:r="http://schemas.openxmlformats.org/officeDocument/2006/relationships" xmlns:p="http://schemas.openxmlformats.org/presentationml/2006/main" type="title" preserve="1">
   <p:cSld name="Title Slide">
@@ -3699,7 +3784,7 @@
             <a:fld id="{B61BEF0D-F0BB-DE4B-95CE-6DB70DBA9567}" type="datetimeFigureOut">
               <a:rPr lang="en-US"/>
               <a:pPr/>
-              <a:t>2/25/20</a:t>
+              <a:t>10/22/20</a:t>
             </a:fld>
             <a:endParaRPr lang="en-US" dirty="0"/>
           </a:p>
@@ -3911,7 +3996,7 @@
             <a:fld id="{B61BEF0D-F0BB-DE4B-95CE-6DB70DBA9567}" type="datetimeFigureOut">
               <a:rPr lang="en-US"/>
               <a:pPr/>
-              <a:t>2/25/20</a:t>
+              <a:t>10/22/20</a:t>
             </a:fld>
             <a:endParaRPr lang="en-US" dirty="0"/>
           </a:p>
@@ -4133,7 +4218,7 @@
             <a:fld id="{B61BEF0D-F0BB-DE4B-95CE-6DB70DBA9567}" type="datetimeFigureOut">
               <a:rPr lang="en-US"/>
               <a:pPr/>
-              <a:t>2/25/20</a:t>
+              <a:t>10/22/20</a:t>
             </a:fld>
             <a:endParaRPr lang="en-US" dirty="0"/>
           </a:p>
@@ -4345,7 +4430,7 @@
             <a:fld id="{B61BEF0D-F0BB-DE4B-95CE-6DB70DBA9567}" type="datetimeFigureOut">
               <a:rPr lang="en-US"/>
               <a:pPr/>
-              <a:t>2/25/20</a:t>
+              <a:t>10/22/20</a:t>
             </a:fld>
             <a:endParaRPr lang="en-US" dirty="0"/>
           </a:p>
@@ -4634,7 +4719,7 @@
             <a:fld id="{B61BEF0D-F0BB-DE4B-95CE-6DB70DBA9567}" type="datetimeFigureOut">
               <a:rPr lang="en-US"/>
               <a:pPr/>
-              <a:t>2/25/20</a:t>
+              <a:t>10/22/20</a:t>
             </a:fld>
             <a:endParaRPr lang="en-US" dirty="0"/>
           </a:p>
@@ -4913,7 +4998,7 @@
             <a:fld id="{B61BEF0D-F0BB-DE4B-95CE-6DB70DBA9567}" type="datetimeFigureOut">
               <a:rPr lang="en-US"/>
               <a:pPr/>
-              <a:t>2/25/20</a:t>
+              <a:t>10/22/20</a:t>
             </a:fld>
             <a:endParaRPr lang="en-US" dirty="0"/>
           </a:p>
@@ -5339,7 +5424,7 @@
             <a:fld id="{B61BEF0D-F0BB-DE4B-95CE-6DB70DBA9567}" type="datetimeFigureOut">
               <a:rPr lang="en-US"/>
               <a:pPr/>
-              <a:t>2/25/20</a:t>
+              <a:t>10/22/20</a:t>
             </a:fld>
             <a:endParaRPr lang="en-US" dirty="0"/>
           </a:p>
@@ -5482,7 +5567,7 @@
             <a:fld id="{B61BEF0D-F0BB-DE4B-95CE-6DB70DBA9567}" type="datetimeFigureOut">
               <a:rPr lang="en-US"/>
               <a:pPr/>
-              <a:t>2/25/20</a:t>
+              <a:t>10/22/20</a:t>
             </a:fld>
             <a:endParaRPr lang="en-US" dirty="0"/>
           </a:p>
@@ -5609,7 +5694,7 @@
             <a:fld id="{B61BEF0D-F0BB-DE4B-95CE-6DB70DBA9567}" type="datetimeFigureOut">
               <a:rPr lang="en-US"/>
               <a:pPr/>
-              <a:t>2/25/20</a:t>
+              <a:t>10/22/20</a:t>
             </a:fld>
             <a:endParaRPr lang="en-US" dirty="0"/>
           </a:p>
@@ -5934,7 +6019,7 @@
             <a:fld id="{B61BEF0D-F0BB-DE4B-95CE-6DB70DBA9567}" type="datetimeFigureOut">
               <a:rPr lang="en-US"/>
               <a:pPr/>
-              <a:t>2/25/20</a:t>
+              <a:t>10/22/20</a:t>
             </a:fld>
             <a:endParaRPr lang="en-US" dirty="0"/>
           </a:p>
@@ -6236,7 +6321,7 @@
             <a:fld id="{B61BEF0D-F0BB-DE4B-95CE-6DB70DBA9567}" type="datetimeFigureOut">
               <a:rPr lang="en-US"/>
               <a:pPr/>
-              <a:t>2/25/20</a:t>
+              <a:t>10/22/20</a:t>
             </a:fld>
             <a:endParaRPr lang="en-US" dirty="0"/>
           </a:p>
@@ -6491,7 +6576,7 @@
             <a:fld id="{B61BEF0D-F0BB-DE4B-95CE-6DB70DBA9567}" type="datetimeFigureOut">
               <a:rPr lang="en-US"/>
               <a:pPr/>
-              <a:t>2/25/20</a:t>
+              <a:t>10/22/20</a:t>
             </a:fld>
             <a:endParaRPr lang="en-US" dirty="0"/>
           </a:p>
@@ -7003,6 +7088,253 @@
 </file>
 
 <file path=ppt/slides/slide10.xml><?xml version="1.0" encoding="utf-8"?>
+<p:sld xmlns:a="http://schemas.openxmlformats.org/drawingml/2006/main" xmlns:r="http://schemas.openxmlformats.org/officeDocument/2006/relationships" xmlns:p="http://schemas.openxmlformats.org/presentationml/2006/main">
+  <p:cSld>
+    <p:bg>
+      <p:bgPr>
+        <a:solidFill>
+          <a:srgbClr val="FFFFFF"/>
+        </a:solidFill>
+        <a:effectLst/>
+      </p:bgPr>
+    </p:bg>
+    <p:spTree>
+      <p:nvGrpSpPr>
+        <p:cNvPr id="1" name=""/>
+        <p:cNvGrpSpPr/>
+        <p:nvPr/>
+      </p:nvGrpSpPr>
+      <p:grpSpPr>
+        <a:xfrm>
+          <a:off x="0" y="0"/>
+          <a:ext cx="0" cy="0"/>
+          <a:chOff x="0" y="0"/>
+          <a:chExt cx="0" cy="0"/>
+        </a:xfrm>
+      </p:grpSpPr>
+      <p:sp>
+        <p:nvSpPr>
+          <p:cNvPr id="10" name="Rectangle 9">
+            <a:extLst>
+              <a:ext uri="{FF2B5EF4-FFF2-40B4-BE49-F238E27FC236}">
+                <a16:creationId xmlns:a16="http://schemas.microsoft.com/office/drawing/2014/main" id="{4351DFE5-F63D-4BE0-BDA9-E3EB88F01AA5}"/>
+              </a:ext>
+              <a:ext uri="{C183D7F6-B498-43B3-948B-1728B52AA6E4}">
+                <adec:decorative xmlns:adec="http://schemas.microsoft.com/office/drawing/2017/decorative" val="1"/>
+              </a:ext>
+            </a:extLst>
+          </p:cNvPr>
+          <p:cNvSpPr>
+            <a:spLocks noGrp="1" noRot="1" noChangeAspect="1" noMove="1" noResize="1" noEditPoints="1" noAdjustHandles="1" noChangeArrowheads="1" noChangeShapeType="1" noTextEdit="1"/>
+          </p:cNvSpPr>
+          <p:nvPr>
+            <p:extLst>
+              <p:ext uri="{386F3935-93C4-4BCD-93E2-E3B085C9AB24}">
+                <p16:designElem xmlns:p16="http://schemas.microsoft.com/office/powerpoint/2015/main" val="1"/>
+              </p:ext>
+            </p:extLst>
+          </p:nvPr>
+        </p:nvSpPr>
+        <p:spPr>
+          <a:xfrm>
+            <a:off x="355601" y="0"/>
+            <a:ext cx="11480494" cy="2753936"/>
+          </a:xfrm>
+          <a:prstGeom prst="rect">
+            <a:avLst/>
+          </a:prstGeom>
+          <a:gradFill>
+            <a:gsLst>
+              <a:gs pos="0">
+                <a:schemeClr val="accent5"/>
+              </a:gs>
+              <a:gs pos="25000">
+                <a:schemeClr val="accent5"/>
+              </a:gs>
+              <a:gs pos="94000">
+                <a:schemeClr val="bg2">
+                  <a:lumMod val="25000"/>
+                </a:schemeClr>
+              </a:gs>
+              <a:gs pos="100000">
+                <a:schemeClr val="bg2">
+                  <a:lumMod val="25000"/>
+                </a:schemeClr>
+              </a:gs>
+            </a:gsLst>
+            <a:lin ang="4200000" scaled="0"/>
+          </a:gradFill>
+          <a:ln>
+            <a:noFill/>
+          </a:ln>
+        </p:spPr>
+        <p:style>
+          <a:lnRef idx="2">
+            <a:schemeClr val="accent1">
+              <a:shade val="50000"/>
+            </a:schemeClr>
+          </a:lnRef>
+          <a:fillRef idx="1">
+            <a:schemeClr val="accent1"/>
+          </a:fillRef>
+          <a:effectRef idx="0">
+            <a:schemeClr val="accent1"/>
+          </a:effectRef>
+          <a:fontRef idx="minor">
+            <a:schemeClr val="lt1"/>
+          </a:fontRef>
+        </p:style>
+        <p:txBody>
+          <a:bodyPr rtlCol="0" anchor="ctr"/>
+          <a:lstStyle/>
+          <a:p>
+            <a:pPr algn="ctr"/>
+            <a:endParaRPr lang="en-US" dirty="0"/>
+          </a:p>
+        </p:txBody>
+      </p:sp>
+      <p:pic>
+        <p:nvPicPr>
+          <p:cNvPr id="12" name="Picture 11">
+            <a:extLst>
+              <a:ext uri="{FF2B5EF4-FFF2-40B4-BE49-F238E27FC236}">
+                <a16:creationId xmlns:a16="http://schemas.microsoft.com/office/drawing/2014/main" id="{02DD2BC0-6F29-4B4F-8D61-2DCF6D2E8E73}"/>
+              </a:ext>
+              <a:ext uri="{C183D7F6-B498-43B3-948B-1728B52AA6E4}">
+                <adec:decorative xmlns:adec="http://schemas.microsoft.com/office/drawing/2017/decorative" val="1"/>
+              </a:ext>
+            </a:extLst>
+          </p:cNvPr>
+          <p:cNvPicPr>
+            <a:picLocks noGrp="1" noRot="1" noChangeAspect="1" noMove="1" noResize="1" noEditPoints="1" noAdjustHandles="1" noChangeArrowheads="1" noChangeShapeType="1" noCrop="1"/>
+          </p:cNvPicPr>
+          <p:nvPr>
+            <p:extLst>
+              <p:ext uri="{386F3935-93C4-4BCD-93E2-E3B085C9AB24}">
+                <p16:designElem xmlns:p16="http://schemas.microsoft.com/office/powerpoint/2015/main" val="1"/>
+              </p:ext>
+            </p:extLst>
+          </p:nvPr>
+        </p:nvPicPr>
+        <p:blipFill>
+          <a:blip r:embed="rId2">
+            <a:extLst>
+              <a:ext uri="{28A0092B-C50C-407E-A947-70E740481C1C}">
+                <a14:useLocalDpi xmlns:a14="http://schemas.microsoft.com/office/drawing/2010/main" val="0"/>
+              </a:ext>
+            </a:extLst>
+          </a:blip>
+          <a:stretch>
+            <a:fillRect/>
+          </a:stretch>
+        </p:blipFill>
+        <p:spPr>
+          <a:xfrm>
+            <a:off x="0" y="0"/>
+            <a:ext cx="12192000" cy="6858000"/>
+          </a:xfrm>
+          <a:prstGeom prst="rect">
+            <a:avLst/>
+          </a:prstGeom>
+        </p:spPr>
+      </p:pic>
+      <p:sp>
+        <p:nvSpPr>
+          <p:cNvPr id="2" name="Title 1">
+            <a:extLst>
+              <a:ext uri="{FF2B5EF4-FFF2-40B4-BE49-F238E27FC236}">
+                <a16:creationId xmlns:a16="http://schemas.microsoft.com/office/drawing/2014/main" id="{E0CB8617-FCA3-234D-B332-6CC977819A92}"/>
+              </a:ext>
+            </a:extLst>
+          </p:cNvPr>
+          <p:cNvSpPr>
+            <a:spLocks noGrp="1"/>
+          </p:cNvSpPr>
+          <p:nvPr>
+            <p:ph type="title"/>
+          </p:nvPr>
+        </p:nvSpPr>
+        <p:spPr>
+          <a:xfrm>
+            <a:off x="1179226" y="826680"/>
+            <a:ext cx="9833548" cy="1325563"/>
+          </a:xfrm>
+        </p:spPr>
+        <p:txBody>
+          <a:bodyPr>
+            <a:normAutofit/>
+          </a:bodyPr>
+          <a:lstStyle/>
+          <a:p>
+            <a:pPr algn="ctr"/>
+            <a:r>
+              <a:rPr lang="en-US" sz="4000" dirty="0">
+                <a:solidFill>
+                  <a:srgbClr val="FFFFFF"/>
+                </a:solidFill>
+              </a:rPr>
+              <a:t>Pool/map paradigm</a:t>
+            </a:r>
+          </a:p>
+        </p:txBody>
+      </p:sp>
+      <p:graphicFrame>
+        <p:nvGraphicFramePr>
+          <p:cNvPr id="5" name="Content Placeholder 2">
+            <a:extLst>
+              <a:ext uri="{FF2B5EF4-FFF2-40B4-BE49-F238E27FC236}">
+                <a16:creationId xmlns:a16="http://schemas.microsoft.com/office/drawing/2014/main" id="{9841EF06-6423-489A-9E9E-435ADB9776B1}"/>
+              </a:ext>
+            </a:extLst>
+          </p:cNvPr>
+          <p:cNvGraphicFramePr>
+            <a:graphicFrameLocks noGrp="1"/>
+          </p:cNvGraphicFramePr>
+          <p:nvPr>
+            <p:ph idx="1"/>
+            <p:extLst>
+              <p:ext uri="{D42A27DB-BD31-4B8C-83A1-F6EECF244321}">
+                <p14:modId xmlns:p14="http://schemas.microsoft.com/office/powerpoint/2010/main" val="3370177380"/>
+              </p:ext>
+            </p:extLst>
+          </p:nvPr>
+        </p:nvGraphicFramePr>
+        <p:xfrm>
+          <a:off x="1036320" y="2899956"/>
+          <a:ext cx="10119360" cy="3131364"/>
+        </p:xfrm>
+        <a:graphic>
+          <a:graphicData uri="http://schemas.openxmlformats.org/drawingml/2006/diagram">
+            <dgm:relIds xmlns:dgm="http://schemas.openxmlformats.org/drawingml/2006/diagram" xmlns:r="http://schemas.openxmlformats.org/officeDocument/2006/relationships" r:dm="rId3" r:lo="rId4" r:qs="rId5" r:cs="rId6"/>
+          </a:graphicData>
+        </a:graphic>
+      </p:graphicFrame>
+    </p:spTree>
+    <p:extLst>
+      <p:ext uri="{BB962C8B-B14F-4D97-AF65-F5344CB8AC3E}">
+        <p14:creationId xmlns:p14="http://schemas.microsoft.com/office/powerpoint/2010/main" val="3063423437"/>
+      </p:ext>
+    </p:extLst>
+  </p:cSld>
+  <p:clrMapOvr>
+    <a:masterClrMapping/>
+  </p:clrMapOvr>
+  <mc:AlternateContent xmlns:mc="http://schemas.openxmlformats.org/markup-compatibility/2006" xmlns:p15="http://schemas.microsoft.com/office/powerpoint/2012/main">
+    <mc:Choice Requires="p15">
+      <p:transition xmlns:p14="http://schemas.microsoft.com/office/powerpoint/2010/main" spd="slow" p14:dur="2000">
+        <p15:prstTrans prst="drape"/>
+      </p:transition>
+    </mc:Choice>
+    <mc:Fallback xmlns="">
+      <p:transition spd="slow">
+        <p:fade/>
+      </p:transition>
+    </mc:Fallback>
+  </mc:AlternateContent>
+</p:sld>
+</file>
+
+<file path=ppt/slides/slide11.xml><?xml version="1.0" encoding="utf-8"?>
 <p:sld xmlns:a="http://schemas.openxmlformats.org/drawingml/2006/main" xmlns:r="http://schemas.openxmlformats.org/officeDocument/2006/relationships" xmlns:p="http://schemas.openxmlformats.org/presentationml/2006/main">
   <p:cSld>
     <p:bg>
@@ -12425,8 +12757,8 @@
           </a:fontRef>
         </p:style>
       </p:cxnSp>
-      <mc:AlternateContent xmlns:mc="http://schemas.openxmlformats.org/markup-compatibility/2006" xmlns:a14="http://schemas.microsoft.com/office/drawing/2010/main">
-        <mc:Choice Requires="a14">
+      <mc:AlternateContent xmlns:mc="http://schemas.openxmlformats.org/markup-compatibility/2006">
+        <mc:Choice xmlns:a14="http://schemas.microsoft.com/office/drawing/2010/main" Requires="a14">
           <p:sp>
             <p:nvSpPr>
               <p:cNvPr id="3" name="Content Placeholder 2">
@@ -12859,10 +13191,32 @@
                   <a:t> is the parallel fraction of the code and P is the number of processors.</a:t>
                 </a:r>
               </a:p>
+              <a:p>
+                <a:r>
+                  <a:rPr lang="en-US" sz="2400" dirty="0"/>
+                  <a:t>Gustafson’s law S = P + (1 - P) * f</a:t>
+                </a:r>
+                <a:r>
+                  <a:rPr lang="en-US" sz="2400" baseline="-25000" dirty="0"/>
+                  <a:t>ser</a:t>
+                </a:r>
+                <a:r>
+                  <a:rPr lang="en-US" sz="2400" dirty="0"/>
+                  <a:t>, where f</a:t>
+                </a:r>
+                <a:r>
+                  <a:rPr lang="en-US" sz="2400" baseline="-25000" dirty="0"/>
+                  <a:t>ser</a:t>
+                </a:r>
+                <a:r>
+                  <a:rPr lang="en-US" sz="2400" dirty="0"/>
+                  <a:t> is the serial fraction of the code.</a:t>
+                </a:r>
+              </a:p>
             </p:txBody>
           </p:sp>
         </mc:Choice>
-        <mc:Fallback xmlns="">
+        <mc:Fallback>
           <p:sp>
             <p:nvSpPr>
               <p:cNvPr id="3" name="Content Placeholder 2">
@@ -12887,7 +13241,7 @@
               <a:blipFill>
                 <a:blip r:embed="rId2"/>
                 <a:stretch>
-                  <a:fillRect l="-1193" r="-398"/>
+                  <a:fillRect l="-1190" r="-397"/>
                 </a:stretch>
               </a:blipFill>
             </p:spPr>
@@ -13245,6 +13599,109 @@
                       </p:childTnLst>
                     </p:cTn>
                   </p:par>
+                  <p:par>
+                    <p:cTn id="21" fill="hold">
+                      <p:stCondLst>
+                        <p:cond delay="indefinite"/>
+                      </p:stCondLst>
+                      <p:childTnLst>
+                        <p:par>
+                          <p:cTn id="22" fill="hold">
+                            <p:stCondLst>
+                              <p:cond delay="0"/>
+                            </p:stCondLst>
+                            <p:childTnLst>
+                              <p:par>
+                                <p:cTn id="23" presetID="2" presetClass="entr" presetSubtype="4" fill="hold" grpId="0" nodeType="clickEffect">
+                                  <p:stCondLst>
+                                    <p:cond delay="0"/>
+                                  </p:stCondLst>
+                                  <p:childTnLst>
+                                    <p:set>
+                                      <p:cBhvr>
+                                        <p:cTn id="24" dur="1" fill="hold">
+                                          <p:stCondLst>
+                                            <p:cond delay="0"/>
+                                          </p:stCondLst>
+                                        </p:cTn>
+                                        <p:tgtEl>
+                                          <p:spTgt spid="3">
+                                            <p:txEl>
+                                              <p:pRg st="3" end="3"/>
+                                            </p:txEl>
+                                          </p:spTgt>
+                                        </p:tgtEl>
+                                        <p:attrNameLst>
+                                          <p:attrName>style.visibility</p:attrName>
+                                        </p:attrNameLst>
+                                      </p:cBhvr>
+                                      <p:to>
+                                        <p:strVal val="visible"/>
+                                      </p:to>
+                                    </p:set>
+                                    <p:anim calcmode="lin" valueType="num">
+                                      <p:cBhvr additive="base">
+                                        <p:cTn id="25" dur="500" fill="hold"/>
+                                        <p:tgtEl>
+                                          <p:spTgt spid="3">
+                                            <p:txEl>
+                                              <p:pRg st="3" end="3"/>
+                                            </p:txEl>
+                                          </p:spTgt>
+                                        </p:tgtEl>
+                                        <p:attrNameLst>
+                                          <p:attrName>ppt_x</p:attrName>
+                                        </p:attrNameLst>
+                                      </p:cBhvr>
+                                      <p:tavLst>
+                                        <p:tav tm="0">
+                                          <p:val>
+                                            <p:strVal val="#ppt_x"/>
+                                          </p:val>
+                                        </p:tav>
+                                        <p:tav tm="100000">
+                                          <p:val>
+                                            <p:strVal val="#ppt_x"/>
+                                          </p:val>
+                                        </p:tav>
+                                      </p:tavLst>
+                                    </p:anim>
+                                    <p:anim calcmode="lin" valueType="num">
+                                      <p:cBhvr additive="base">
+                                        <p:cTn id="26" dur="500" fill="hold"/>
+                                        <p:tgtEl>
+                                          <p:spTgt spid="3">
+                                            <p:txEl>
+                                              <p:pRg st="3" end="3"/>
+                                            </p:txEl>
+                                          </p:spTgt>
+                                        </p:tgtEl>
+                                        <p:attrNameLst>
+                                          <p:attrName>ppt_y</p:attrName>
+                                        </p:attrNameLst>
+                                      </p:cBhvr>
+                                      <p:tavLst>
+                                        <p:tav tm="0">
+                                          <p:val>
+                                            <p:strVal val="1+#ppt_h/2"/>
+                                          </p:val>
+                                        </p:tav>
+                                        <p:tav tm="100000">
+                                          <p:val>
+                                            <p:strVal val="#ppt_y"/>
+                                          </p:val>
+                                        </p:tav>
+                                      </p:tavLst>
+                                    </p:anim>
+                                  </p:childTnLst>
+                                </p:cTn>
+                              </p:par>
+                            </p:childTnLst>
+                          </p:cTn>
+                        </p:par>
+                      </p:childTnLst>
+                    </p:cTn>
+                  </p:par>
                 </p:childTnLst>
               </p:cTn>
               <p:prevCondLst>
@@ -13556,7 +14013,7 @@
     <p:bg>
       <p:bgPr>
         <a:solidFill>
-          <a:srgbClr val="FFFFFF"/>
+          <a:schemeClr val="bg1"/>
         </a:solidFill>
         <a:effectLst/>
       </p:bgPr>
@@ -13577,10 +14034,10 @@
       </p:grpSpPr>
       <p:sp>
         <p:nvSpPr>
-          <p:cNvPr id="10" name="Rectangle 9">
+          <p:cNvPr id="17" name="Down Arrow 7">
             <a:extLst>
               <a:ext uri="{FF2B5EF4-FFF2-40B4-BE49-F238E27FC236}">
-                <a16:creationId xmlns:a16="http://schemas.microsoft.com/office/drawing/2014/main" id="{4351DFE5-F63D-4BE0-BDA9-E3EB88F01AA5}"/>
+                <a16:creationId xmlns:a16="http://schemas.microsoft.com/office/drawing/2014/main" id="{73DE2CFE-42F2-48F0-8706-5264E012B10C}"/>
               </a:ext>
               <a:ext uri="{C183D7F6-B498-43B3-948B-1728B52AA6E4}">
                 <adec:decorative xmlns:adec="http://schemas.microsoft.com/office/drawing/2017/decorative" val="1"/>
@@ -13599,35 +14056,20 @@
           </p:nvPr>
         </p:nvSpPr>
         <p:spPr>
-          <a:xfrm>
-            <a:off x="355601" y="0"/>
-            <a:ext cx="11480494" cy="2753936"/>
+          <a:xfrm rot="16200000">
+            <a:off x="1288521" y="381403"/>
+            <a:ext cx="2200313" cy="3342508"/>
           </a:xfrm>
-          <a:prstGeom prst="rect">
-            <a:avLst/>
+          <a:prstGeom prst="downArrow">
+            <a:avLst>
+              <a:gd name="adj1" fmla="val 100000"/>
+              <a:gd name="adj2" fmla="val 15788"/>
+            </a:avLst>
           </a:prstGeom>
-          <a:gradFill>
-            <a:gsLst>
-              <a:gs pos="0">
-                <a:schemeClr val="accent5"/>
-              </a:gs>
-              <a:gs pos="25000">
-                <a:schemeClr val="accent5"/>
-              </a:gs>
-              <a:gs pos="94000">
-                <a:schemeClr val="bg2">
-                  <a:lumMod val="25000"/>
-                </a:schemeClr>
-              </a:gs>
-              <a:gs pos="100000">
-                <a:schemeClr val="bg2">
-                  <a:lumMod val="25000"/>
-                </a:schemeClr>
-              </a:gs>
-            </a:gsLst>
-            <a:lin ang="4200000" scaled="0"/>
-          </a:gradFill>
-          <a:ln>
+          <a:solidFill>
+            <a:srgbClr val="404040"/>
+          </a:solidFill>
+          <a:ln w="53975">
             <a:noFill/>
           </a:ln>
         </p:spPr>
@@ -13651,62 +14093,46 @@
           <a:bodyPr rtlCol="0" anchor="ctr"/>
           <a:lstStyle/>
           <a:p>
-            <a:pPr algn="ctr"/>
-            <a:endParaRPr lang="en-US" dirty="0"/>
+            <a:pPr marL="0" marR="0" lvl="0" indent="0" algn="ctr" defTabSz="914400" rtl="0" eaLnBrk="1" fontAlgn="auto" latinLnBrk="0" hangingPunct="1">
+              <a:lnSpc>
+                <a:spcPct val="100000"/>
+              </a:lnSpc>
+              <a:spcBef>
+                <a:spcPts val="0"/>
+              </a:spcBef>
+              <a:spcAft>
+                <a:spcPts val="0"/>
+              </a:spcAft>
+              <a:buClrTx/>
+              <a:buSzTx/>
+              <a:buFontTx/>
+              <a:buNone/>
+              <a:tabLst/>
+              <a:defRPr/>
+            </a:pPr>
+            <a:endParaRPr kumimoji="0" lang="en-US" sz="1800" b="0" i="0" u="none" strike="noStrike" kern="1200" cap="none" spc="0" normalizeH="0" baseline="0" noProof="0" dirty="0">
+              <a:ln>
+                <a:noFill/>
+              </a:ln>
+              <a:solidFill>
+                <a:prstClr val="white"/>
+              </a:solidFill>
+              <a:effectLst/>
+              <a:uLnTx/>
+              <a:uFillTx/>
+              <a:latin typeface="Calibri" panose="020F0502020204030204"/>
+              <a:ea typeface="+mn-ea"/>
+              <a:cs typeface="+mn-cs"/>
+            </a:endParaRPr>
           </a:p>
         </p:txBody>
       </p:sp>
-      <p:pic>
-        <p:nvPicPr>
-          <p:cNvPr id="12" name="Picture 11">
-            <a:extLst>
-              <a:ext uri="{FF2B5EF4-FFF2-40B4-BE49-F238E27FC236}">
-                <a16:creationId xmlns:a16="http://schemas.microsoft.com/office/drawing/2014/main" id="{02DD2BC0-6F29-4B4F-8D61-2DCF6D2E8E73}"/>
-              </a:ext>
-              <a:ext uri="{C183D7F6-B498-43B3-948B-1728B52AA6E4}">
-                <adec:decorative xmlns:adec="http://schemas.microsoft.com/office/drawing/2017/decorative" val="1"/>
-              </a:ext>
-            </a:extLst>
-          </p:cNvPr>
-          <p:cNvPicPr>
-            <a:picLocks noGrp="1" noRot="1" noChangeAspect="1" noMove="1" noResize="1" noEditPoints="1" noAdjustHandles="1" noChangeArrowheads="1" noChangeShapeType="1" noCrop="1"/>
-          </p:cNvPicPr>
-          <p:nvPr>
-            <p:extLst>
-              <p:ext uri="{386F3935-93C4-4BCD-93E2-E3B085C9AB24}">
-                <p16:designElem xmlns:p16="http://schemas.microsoft.com/office/powerpoint/2015/main" val="1"/>
-              </p:ext>
-            </p:extLst>
-          </p:nvPr>
-        </p:nvPicPr>
-        <p:blipFill>
-          <a:blip r:embed="rId2">
-            <a:extLst>
-              <a:ext uri="{28A0092B-C50C-407E-A947-70E740481C1C}">
-                <a14:useLocalDpi xmlns:a14="http://schemas.microsoft.com/office/drawing/2010/main" val="0"/>
-              </a:ext>
-            </a:extLst>
-          </a:blip>
-          <a:stretch>
-            <a:fillRect/>
-          </a:stretch>
-        </p:blipFill>
-        <p:spPr>
-          <a:xfrm>
-            <a:off x="0" y="0"/>
-            <a:ext cx="12192000" cy="6858000"/>
-          </a:xfrm>
-          <a:prstGeom prst="rect">
-            <a:avLst/>
-          </a:prstGeom>
-        </p:spPr>
-      </p:pic>
       <p:sp>
         <p:nvSpPr>
           <p:cNvPr id="2" name="Title 1">
             <a:extLst>
               <a:ext uri="{FF2B5EF4-FFF2-40B4-BE49-F238E27FC236}">
-                <a16:creationId xmlns:a16="http://schemas.microsoft.com/office/drawing/2014/main" id="{E0CB8617-FCA3-234D-B332-6CC977819A92}"/>
+                <a16:creationId xmlns:a16="http://schemas.microsoft.com/office/drawing/2014/main" id="{3B357B2C-2F78-FA4C-8406-722390C3108F}"/>
               </a:ext>
             </a:extLst>
           </p:cNvPr>
@@ -13719,76 +14145,128 @@
         </p:nvSpPr>
         <p:spPr>
           <a:xfrm>
-            <a:off x="1179226" y="826680"/>
-            <a:ext cx="9833548" cy="1325563"/>
+            <a:off x="717423" y="1204108"/>
+            <a:ext cx="2918935" cy="1781175"/>
           </a:xfrm>
+          <a:prstGeom prst="ellipse">
+            <a:avLst/>
+          </a:prstGeom>
         </p:spPr>
         <p:txBody>
-          <a:bodyPr>
+          <a:bodyPr vert="horz" lIns="91440" tIns="45720" rIns="91440" bIns="45720" rtlCol="0" anchor="ctr">
             <a:normAutofit/>
           </a:bodyPr>
           <a:lstStyle/>
           <a:p>
-            <a:pPr algn="ctr"/>
             <a:r>
-              <a:rPr lang="en-US" sz="4000" dirty="0">
+              <a:rPr lang="en-US" sz="2200" kern="1200" dirty="0">
                 <a:solidFill>
                   <a:srgbClr val="FFFFFF"/>
                 </a:solidFill>
+                <a:latin typeface="+mj-lt"/>
+                <a:ea typeface="+mj-ea"/>
+                <a:cs typeface="+mj-cs"/>
               </a:rPr>
-              <a:t>Pool/map paradigm</a:t>
+              <a:t>Parallel Scalability by Gustafson’s Law</a:t>
             </a:r>
           </a:p>
         </p:txBody>
       </p:sp>
-      <p:graphicFrame>
-        <p:nvGraphicFramePr>
-          <p:cNvPr id="5" name="Content Placeholder 2">
+      <p:sp>
+        <p:nvSpPr>
+          <p:cNvPr id="6" name="TextBox 5">
             <a:extLst>
               <a:ext uri="{FF2B5EF4-FFF2-40B4-BE49-F238E27FC236}">
-                <a16:creationId xmlns:a16="http://schemas.microsoft.com/office/drawing/2014/main" id="{9841EF06-6423-489A-9E9E-435ADB9776B1}"/>
+                <a16:creationId xmlns:a16="http://schemas.microsoft.com/office/drawing/2014/main" id="{85585E1C-3E5A-904D-A762-8135B47EC283}"/>
               </a:ext>
             </a:extLst>
           </p:cNvPr>
-          <p:cNvGraphicFramePr>
-            <a:graphicFrameLocks noGrp="1"/>
-          </p:cNvGraphicFramePr>
+          <p:cNvSpPr txBox="1"/>
+          <p:nvPr/>
+        </p:nvSpPr>
+        <p:spPr>
+          <a:xfrm>
+            <a:off x="717423" y="5842510"/>
+            <a:ext cx="4625286" cy="576790"/>
+          </a:xfrm>
+          <a:prstGeom prst="rect">
+            <a:avLst/>
+          </a:prstGeom>
+        </p:spPr>
+        <p:txBody>
+          <a:bodyPr vert="horz" lIns="91440" tIns="45720" rIns="91440" bIns="45720" rtlCol="0">
+            <a:normAutofit/>
+          </a:bodyPr>
+          <a:lstStyle/>
+          <a:p>
+            <a:pPr>
+              <a:lnSpc>
+                <a:spcPct val="90000"/>
+              </a:lnSpc>
+              <a:spcAft>
+                <a:spcPts val="600"/>
+              </a:spcAft>
+            </a:pPr>
+            <a:r>
+              <a:rPr lang="en-US" sz="1600" dirty="0"/>
+              <a:t>Source: </a:t>
+            </a:r>
+            <a:r>
+              <a:rPr lang="en-US" sz="1600" dirty="0">
+                <a:hlinkClick r:id="rId3"/>
+              </a:rPr>
+              <a:t>https://en.wikipedia.org/wiki/Gustafson%27s_law</a:t>
+            </a:r>
+            <a:endParaRPr lang="en-US" sz="1600" dirty="0"/>
+          </a:p>
+        </p:txBody>
+      </p:sp>
+      <p:pic>
+        <p:nvPicPr>
+          <p:cNvPr id="8" name="Content Placeholder 7" descr="Chart&#10;&#10;Description automatically generated">
+            <a:extLst>
+              <a:ext uri="{FF2B5EF4-FFF2-40B4-BE49-F238E27FC236}">
+                <a16:creationId xmlns:a16="http://schemas.microsoft.com/office/drawing/2014/main" id="{0013FCCF-C5C7-6840-9AF2-0066EC5AFAAC}"/>
+              </a:ext>
+            </a:extLst>
+          </p:cNvPr>
+          <p:cNvPicPr>
+            <a:picLocks noGrp="1" noChangeAspect="1"/>
+          </p:cNvPicPr>
           <p:nvPr>
             <p:ph idx="1"/>
-            <p:extLst>
-              <p:ext uri="{D42A27DB-BD31-4B8C-83A1-F6EECF244321}">
-                <p14:modId xmlns:p14="http://schemas.microsoft.com/office/powerpoint/2010/main" val="3370177380"/>
-              </p:ext>
-            </p:extLst>
           </p:nvPr>
-        </p:nvGraphicFramePr>
-        <p:xfrm>
-          <a:off x="1036320" y="2899956"/>
-          <a:ext cx="10119360" cy="3131364"/>
-        </p:xfrm>
-        <a:graphic>
-          <a:graphicData uri="http://schemas.openxmlformats.org/drawingml/2006/diagram">
-            <dgm:relIds xmlns:dgm="http://schemas.openxmlformats.org/drawingml/2006/diagram" xmlns:r="http://schemas.openxmlformats.org/officeDocument/2006/relationships" r:dm="rId3" r:lo="rId4" r:qs="rId5" r:cs="rId6"/>
-          </a:graphicData>
-        </a:graphic>
-      </p:graphicFrame>
+        </p:nvPicPr>
+        <p:blipFill>
+          <a:blip r:embed="rId4"/>
+          <a:stretch>
+            <a:fillRect/>
+          </a:stretch>
+        </p:blipFill>
+        <p:spPr>
+          <a:xfrm>
+            <a:off x="4103880" y="-1"/>
+            <a:ext cx="7977264" cy="5590903"/>
+          </a:xfrm>
+        </p:spPr>
+      </p:pic>
     </p:spTree>
     <p:extLst>
       <p:ext uri="{BB962C8B-B14F-4D97-AF65-F5344CB8AC3E}">
-        <p14:creationId xmlns:p14="http://schemas.microsoft.com/office/powerpoint/2010/main" val="3063423437"/>
+        <p14:creationId xmlns:p14="http://schemas.microsoft.com/office/powerpoint/2010/main" val="1054207718"/>
       </p:ext>
     </p:extLst>
   </p:cSld>
   <p:clrMapOvr>
     <a:masterClrMapping/>
   </p:clrMapOvr>
-  <mc:AlternateContent xmlns:mc="http://schemas.openxmlformats.org/markup-compatibility/2006" xmlns:p15="http://schemas.microsoft.com/office/powerpoint/2012/main">
-    <mc:Choice Requires="p15">
+  <mc:AlternateContent xmlns:mc="http://schemas.openxmlformats.org/markup-compatibility/2006">
+    <mc:Choice xmlns:p15="http://schemas.microsoft.com/office/powerpoint/2012/main" Requires="p15">
       <p:transition xmlns:p14="http://schemas.microsoft.com/office/powerpoint/2010/main" spd="slow" p14:dur="2000">
         <p15:prstTrans prst="drape"/>
       </p:transition>
     </mc:Choice>
-    <mc:Fallback xmlns="">
+    <mc:Fallback>
       <p:transition spd="slow">
         <p:fade/>
       </p:transition>

</xml_diff>

<commit_message>
Add scheduling example with a weighted DAG.
</commit_message>
<xml_diff>
--- a/lecture-2/presentation-2.pptx
+++ b/lecture-2/presentation-2.pptx
@@ -5,7 +5,7 @@
     <p:sldMasterId id="2147483764" r:id="rId1"/>
   </p:sldMasterIdLst>
   <p:notesMasterIdLst>
-    <p:notesMasterId r:id="rId19"/>
+    <p:notesMasterId r:id="rId21"/>
   </p:notesMasterIdLst>
   <p:sldIdLst>
     <p:sldId id="256" r:id="rId2"/>
@@ -22,9 +22,11 @@
     <p:sldId id="319" r:id="rId13"/>
     <p:sldId id="320" r:id="rId14"/>
     <p:sldId id="321" r:id="rId15"/>
-    <p:sldId id="322" r:id="rId16"/>
-    <p:sldId id="314" r:id="rId17"/>
-    <p:sldId id="312" r:id="rId18"/>
+    <p:sldId id="323" r:id="rId16"/>
+    <p:sldId id="324" r:id="rId17"/>
+    <p:sldId id="322" r:id="rId18"/>
+    <p:sldId id="314" r:id="rId19"/>
+    <p:sldId id="312" r:id="rId20"/>
   </p:sldIdLst>
   <p:sldSz cx="12192000" cy="6858000"/>
   <p:notesSz cx="6858000" cy="9144000"/>
@@ -1651,7 +1653,7 @@
         <a:lstStyle/>
         <a:p>
           <a:r>
-            <a:rPr lang="en-US"/>
+            <a:rPr lang="en-US" dirty="0"/>
             <a:t>18.01</a:t>
           </a:r>
         </a:p>
@@ -1687,7 +1689,7 @@
         <a:lstStyle/>
         <a:p>
           <a:r>
-            <a:rPr lang="en-US"/>
+            <a:rPr lang="en-US" dirty="0"/>
             <a:t>8.01</a:t>
           </a:r>
         </a:p>
@@ -1723,7 +1725,7 @@
         <a:lstStyle/>
         <a:p>
           <a:r>
-            <a:rPr lang="en-US"/>
+            <a:rPr lang="en-US" dirty="0"/>
             <a:t>6.001</a:t>
           </a:r>
         </a:p>
@@ -1759,7 +1761,7 @@
         <a:lstStyle/>
         <a:p>
           <a:r>
-            <a:rPr lang="en-US"/>
+            <a:rPr lang="en-US" dirty="0"/>
             <a:t>18.02</a:t>
           </a:r>
         </a:p>
@@ -1795,7 +1797,7 @@
         <a:lstStyle/>
         <a:p>
           <a:r>
-            <a:rPr lang="en-US"/>
+            <a:rPr lang="en-US" dirty="0"/>
             <a:t>18.03</a:t>
           </a:r>
         </a:p>
@@ -1831,7 +1833,7 @@
         <a:lstStyle/>
         <a:p>
           <a:r>
-            <a:rPr lang="en-US"/>
+            <a:rPr lang="en-US" dirty="0"/>
             <a:t>6.042</a:t>
           </a:r>
         </a:p>
@@ -1867,7 +1869,7 @@
         <a:lstStyle/>
         <a:p>
           <a:r>
-            <a:rPr lang="en-US"/>
+            <a:rPr lang="en-US" dirty="0"/>
             <a:t>8.02</a:t>
           </a:r>
         </a:p>
@@ -1903,7 +1905,7 @@
         <a:lstStyle/>
         <a:p>
           <a:r>
-            <a:rPr lang="en-US"/>
+            <a:rPr lang="en-US" dirty="0"/>
             <a:t>6.034</a:t>
           </a:r>
         </a:p>
@@ -1939,7 +1941,7 @@
         <a:lstStyle/>
         <a:p>
           <a:r>
-            <a:rPr lang="en-US"/>
+            <a:rPr lang="en-US" dirty="0"/>
             <a:t>6.002</a:t>
           </a:r>
         </a:p>
@@ -1975,7 +1977,7 @@
         <a:lstStyle/>
         <a:p>
           <a:r>
-            <a:rPr lang="en-US"/>
+            <a:rPr lang="en-US" dirty="0"/>
             <a:t>6.046</a:t>
           </a:r>
         </a:p>
@@ -2011,7 +2013,7 @@
         <a:lstStyle/>
         <a:p>
           <a:r>
-            <a:rPr lang="en-US"/>
+            <a:rPr lang="en-US" dirty="0"/>
             <a:t>6.003</a:t>
           </a:r>
         </a:p>
@@ -2047,7 +2049,7 @@
         <a:lstStyle/>
         <a:p>
           <a:r>
-            <a:rPr lang="en-US"/>
+            <a:rPr lang="en-US" dirty="0"/>
             <a:t>6.004</a:t>
           </a:r>
         </a:p>
@@ -2083,7 +2085,7 @@
         <a:lstStyle/>
         <a:p>
           <a:r>
-            <a:rPr lang="en-US"/>
+            <a:rPr lang="en-US" dirty="0"/>
             <a:t>6.840</a:t>
           </a:r>
         </a:p>
@@ -2119,7 +2121,7 @@
         <a:lstStyle/>
         <a:p>
           <a:r>
-            <a:rPr lang="en-US"/>
+            <a:rPr lang="en-US" dirty="0"/>
             <a:t>6.033</a:t>
           </a:r>
         </a:p>
@@ -2155,7 +2157,7 @@
         <a:lstStyle/>
         <a:p>
           <a:r>
-            <a:rPr lang="en-US"/>
+            <a:rPr lang="en-US" dirty="0"/>
             <a:t>6.857</a:t>
           </a:r>
         </a:p>
@@ -12027,7 +12029,7 @@
           <a:lstStyle/>
           <a:p>
             <a:r>
-              <a:rPr lang="en-US" sz="3600"/>
+              <a:rPr lang="en-US" sz="3600" dirty="0"/>
               <a:t>Parallel Scheduling</a:t>
             </a:r>
           </a:p>
@@ -12065,15 +12067,15 @@
               <a:buNone/>
             </a:pPr>
             <a:r>
-              <a:rPr lang="en-US" sz="2000"/>
+              <a:rPr lang="en-US" sz="2000" dirty="0"/>
               <a:t>Problem Description</a:t>
             </a:r>
-            <a:endParaRPr lang="en-US" sz="2000">
+            <a:endParaRPr lang="en-US" sz="2000" dirty="0">
               <a:sym typeface="Wingdings" pitchFamily="2" charset="2"/>
             </a:endParaRPr>
           </a:p>
           <a:p>
-            <a:endParaRPr lang="en-US" sz="2000">
+            <a:endParaRPr lang="en-US" sz="2000" dirty="0">
               <a:sym typeface="Wingdings" pitchFamily="2" charset="2"/>
             </a:endParaRPr>
           </a:p>
@@ -12169,7 +12171,7 @@
             <a:lstStyle/>
             <a:p>
               <a:pPr algn="ctr"/>
-              <a:endParaRPr lang="en-US"/>
+              <a:endParaRPr lang="en-US" dirty="0"/>
             </a:p>
           </p:txBody>
         </p:sp>
@@ -12361,7 +12363,7 @@
             <a:lstStyle/>
             <a:p>
               <a:pPr algn="ctr"/>
-              <a:endParaRPr lang="en-US"/>
+              <a:endParaRPr lang="en-US" dirty="0"/>
             </a:p>
           </p:txBody>
         </p:sp>
@@ -12424,7 +12426,7 @@
             <a:lstStyle/>
             <a:p>
               <a:pPr algn="ctr"/>
-              <a:endParaRPr lang="en-US"/>
+              <a:endParaRPr lang="en-US" dirty="0"/>
             </a:p>
           </p:txBody>
         </p:sp>
@@ -12451,8 +12453,8 @@
         </p:blipFill>
         <p:spPr>
           <a:xfrm>
-            <a:off x="4398520" y="5290270"/>
-            <a:ext cx="6253212" cy="1328807"/>
+            <a:off x="4398519" y="5290270"/>
+            <a:ext cx="7377556" cy="1567730"/>
           </a:xfrm>
           <a:prstGeom prst="rect">
             <a:avLst/>
@@ -12488,7 +12490,7 @@
           <a:lstStyle/>
           <a:p>
             <a:r>
-              <a:rPr lang="en-US"/>
+              <a:rPr lang="en-US" dirty="0"/>
               <a:t>Source:</a:t>
             </a:r>
           </a:p>
@@ -12600,7 +12602,7 @@
           <a:lstStyle/>
           <a:p>
             <a:pPr algn="ctr"/>
-            <a:endParaRPr lang="en-US"/>
+            <a:endParaRPr lang="en-US" dirty="0"/>
           </a:p>
         </p:txBody>
       </p:sp>
@@ -12633,7 +12635,7 @@
           <a:lstStyle/>
           <a:p>
             <a:r>
-              <a:rPr lang="en-US" sz="4000"/>
+              <a:rPr lang="en-US" sz="4000" dirty="0"/>
               <a:t>Class Schedule with Greedy Strategy</a:t>
             </a:r>
           </a:p>
@@ -12668,37 +12670,37 @@
           <a:lstStyle/>
           <a:p>
             <a:r>
-              <a:rPr lang="en-US" sz="2000"/>
+              <a:rPr lang="en-US" sz="2000" dirty="0"/>
               <a:t>{18.02, 6.840, 6.003, 6.004, 6.034}</a:t>
             </a:r>
           </a:p>
           <a:p>
             <a:r>
-              <a:rPr lang="en-US" sz="2000"/>
+              <a:rPr lang="en-US" sz="2000" dirty="0"/>
               <a:t>{18.02, 6.840, 6.003, 6.033, 6.034}</a:t>
             </a:r>
           </a:p>
           <a:p>
             <a:r>
-              <a:rPr lang="en-US" sz="2000"/>
+              <a:rPr lang="en-US" sz="2000" dirty="0"/>
               <a:t>{18.02, 6.840, 6.003, 6.857, 6.034}</a:t>
             </a:r>
           </a:p>
           <a:p>
             <a:r>
-              <a:rPr lang="en-US" sz="2000"/>
+              <a:rPr lang="en-US" sz="2000" dirty="0"/>
               <a:t>{18.02, 6.046, 6.003, 6.004, 6.034}</a:t>
             </a:r>
           </a:p>
           <a:p>
             <a:r>
-              <a:rPr lang="en-US" sz="2000"/>
+              <a:rPr lang="en-US" sz="2000" dirty="0"/>
               <a:t>{18.02, 6.046, 6.003, 6.033, 6.034}</a:t>
             </a:r>
           </a:p>
           <a:p>
             <a:r>
-              <a:rPr lang="en-US" sz="2000"/>
+              <a:rPr lang="en-US" sz="2000" dirty="0"/>
               <a:t>{18.02, 6.042, 6.003, 6.004, 6.034}</a:t>
             </a:r>
           </a:p>
@@ -13491,7 +13493,7 @@
           <a:lstStyle/>
           <a:p>
             <a:pPr algn="ctr"/>
-            <a:endParaRPr lang="en-US"/>
+            <a:endParaRPr lang="en-US" dirty="0"/>
           </a:p>
         </p:txBody>
       </p:sp>
@@ -13525,7 +13527,7 @@
           <a:p>
             <a:pPr algn="ctr"/>
             <a:r>
-              <a:rPr lang="en-US" sz="5200"/>
+              <a:rPr lang="en-US" sz="5200" dirty="0"/>
               <a:t>Class Schedule with 1 Subject per Term</a:t>
             </a:r>
           </a:p>
@@ -13668,7 +13670,7 @@
           <a:lstStyle/>
           <a:p>
             <a:pPr algn="ctr"/>
-            <a:endParaRPr lang="en-US"/>
+            <a:endParaRPr lang="en-US" dirty="0"/>
           </a:p>
         </p:txBody>
       </p:sp>
@@ -13702,7 +13704,7 @@
           <a:p>
             <a:pPr algn="r"/>
             <a:r>
-              <a:rPr lang="en-US" sz="5400" kern="1200">
+              <a:rPr lang="en-US" sz="5400" kern="1200" dirty="0">
                 <a:solidFill>
                   <a:srgbClr val="FFFFFF"/>
                 </a:solidFill>
@@ -13908,7 +13910,7 @@
           <a:lstStyle/>
           <a:p>
             <a:pPr algn="ctr"/>
-            <a:endParaRPr lang="en-US"/>
+            <a:endParaRPr lang="en-US" dirty="0"/>
           </a:p>
         </p:txBody>
       </p:sp>
@@ -13942,7 +13944,7 @@
           <a:p>
             <a:pPr algn="r"/>
             <a:r>
-              <a:rPr lang="en-US" sz="5400" kern="1200">
+              <a:rPr lang="en-US" sz="5400" kern="1200" dirty="0">
                 <a:solidFill>
                   <a:srgbClr val="FFFFFF"/>
                 </a:solidFill>
@@ -14049,13 +14051,13 @@
   <p:clrMapOvr>
     <a:masterClrMapping/>
   </p:clrMapOvr>
-  <mc:AlternateContent xmlns:mc="http://schemas.openxmlformats.org/markup-compatibility/2006">
-    <mc:Choice xmlns:p15="http://schemas.microsoft.com/office/powerpoint/2012/main" Requires="p15">
+  <mc:AlternateContent xmlns:mc="http://schemas.openxmlformats.org/markup-compatibility/2006" xmlns:p15="http://schemas.microsoft.com/office/powerpoint/2012/main">
+    <mc:Choice Requires="p15">
       <p:transition xmlns:p14="http://schemas.microsoft.com/office/powerpoint/2010/main" spd="slow" p14:dur="2000">
         <p15:prstTrans prst="drape"/>
       </p:transition>
     </mc:Choice>
-    <mc:Fallback>
+    <mc:Fallback xmlns="">
       <p:transition spd="slow">
         <p:fade/>
       </p:transition>
@@ -14065,6 +14067,930 @@
 </file>
 
 <file path=ppt/slides/slide15.xml><?xml version="1.0" encoding="utf-8"?>
+<p:sld xmlns:a="http://schemas.openxmlformats.org/drawingml/2006/main" xmlns:r="http://schemas.openxmlformats.org/officeDocument/2006/relationships" xmlns:p="http://schemas.openxmlformats.org/presentationml/2006/main">
+  <p:cSld>
+    <p:spTree>
+      <p:nvGrpSpPr>
+        <p:cNvPr id="1" name=""/>
+        <p:cNvGrpSpPr/>
+        <p:nvPr/>
+      </p:nvGrpSpPr>
+      <p:grpSpPr>
+        <a:xfrm>
+          <a:off x="0" y="0"/>
+          <a:ext cx="0" cy="0"/>
+          <a:chOff x="0" y="0"/>
+          <a:chExt cx="0" cy="0"/>
+        </a:xfrm>
+      </p:grpSpPr>
+      <p:sp>
+        <p:nvSpPr>
+          <p:cNvPr id="2" name="Title 1">
+            <a:extLst>
+              <a:ext uri="{FF2B5EF4-FFF2-40B4-BE49-F238E27FC236}">
+                <a16:creationId xmlns:a16="http://schemas.microsoft.com/office/drawing/2014/main" id="{39C64779-D2B2-5F43-B1EC-19B50230F66C}"/>
+              </a:ext>
+            </a:extLst>
+          </p:cNvPr>
+          <p:cNvSpPr>
+            <a:spLocks noGrp="1"/>
+          </p:cNvSpPr>
+          <p:nvPr>
+            <p:ph type="title"/>
+          </p:nvPr>
+        </p:nvSpPr>
+        <p:spPr>
+          <a:xfrm>
+            <a:off x="0" y="18255"/>
+            <a:ext cx="10515600" cy="1325563"/>
+          </a:xfrm>
+        </p:spPr>
+        <p:txBody>
+          <a:bodyPr/>
+          <a:lstStyle/>
+          <a:p>
+            <a:r>
+              <a:rPr lang="en-US" dirty="0"/>
+              <a:t>Weighted DAGs</a:t>
+            </a:r>
+          </a:p>
+        </p:txBody>
+      </p:sp>
+      <p:sp>
+        <p:nvSpPr>
+          <p:cNvPr id="3" name="Content Placeholder 2">
+            <a:extLst>
+              <a:ext uri="{FF2B5EF4-FFF2-40B4-BE49-F238E27FC236}">
+                <a16:creationId xmlns:a16="http://schemas.microsoft.com/office/drawing/2014/main" id="{E6E1C201-673C-C641-8B8A-D8B5B8495E3F}"/>
+              </a:ext>
+            </a:extLst>
+          </p:cNvPr>
+          <p:cNvSpPr>
+            <a:spLocks noGrp="1"/>
+          </p:cNvSpPr>
+          <p:nvPr>
+            <p:ph idx="1"/>
+          </p:nvPr>
+        </p:nvSpPr>
+        <p:spPr>
+          <a:xfrm>
+            <a:off x="0" y="1033303"/>
+            <a:ext cx="10515600" cy="4351338"/>
+          </a:xfrm>
+        </p:spPr>
+        <p:txBody>
+          <a:bodyPr>
+            <a:normAutofit/>
+          </a:bodyPr>
+          <a:lstStyle/>
+          <a:p>
+            <a:pPr marL="0" indent="0">
+              <a:buNone/>
+            </a:pPr>
+            <a:r>
+              <a:rPr lang="en-US" sz="1800" dirty="0"/>
+              <a:t>                               Problem description</a:t>
+            </a:r>
+          </a:p>
+        </p:txBody>
+      </p:sp>
+      <p:pic>
+        <p:nvPicPr>
+          <p:cNvPr id="4" name="Picture 3">
+            <a:extLst>
+              <a:ext uri="{FF2B5EF4-FFF2-40B4-BE49-F238E27FC236}">
+                <a16:creationId xmlns:a16="http://schemas.microsoft.com/office/drawing/2014/main" id="{FDBB2DFC-C0F7-A44D-9E99-7A8382714CA0}"/>
+              </a:ext>
+            </a:extLst>
+          </p:cNvPr>
+          <p:cNvPicPr>
+            <a:picLocks noChangeAspect="1"/>
+          </p:cNvPicPr>
+          <p:nvPr/>
+        </p:nvPicPr>
+        <p:blipFill>
+          <a:blip r:embed="rId2"/>
+          <a:stretch>
+            <a:fillRect/>
+          </a:stretch>
+        </p:blipFill>
+        <p:spPr>
+          <a:xfrm>
+            <a:off x="4398519" y="5290270"/>
+            <a:ext cx="7291651" cy="1549475"/>
+          </a:xfrm>
+          <a:prstGeom prst="rect">
+            <a:avLst/>
+          </a:prstGeom>
+        </p:spPr>
+      </p:pic>
+      <p:sp>
+        <p:nvSpPr>
+          <p:cNvPr id="5" name="TextBox 4">
+            <a:extLst>
+              <a:ext uri="{FF2B5EF4-FFF2-40B4-BE49-F238E27FC236}">
+                <a16:creationId xmlns:a16="http://schemas.microsoft.com/office/drawing/2014/main" id="{4B32BA07-C45F-864C-829D-311067DADF70}"/>
+              </a:ext>
+            </a:extLst>
+          </p:cNvPr>
+          <p:cNvSpPr txBox="1"/>
+          <p:nvPr/>
+        </p:nvSpPr>
+        <p:spPr>
+          <a:xfrm>
+            <a:off x="3133587" y="5610287"/>
+            <a:ext cx="1463040" cy="369332"/>
+          </a:xfrm>
+          <a:prstGeom prst="rect">
+            <a:avLst/>
+          </a:prstGeom>
+          <a:noFill/>
+        </p:spPr>
+        <p:txBody>
+          <a:bodyPr wrap="square" rtlCol="0">
+            <a:spAutoFit/>
+          </a:bodyPr>
+          <a:lstStyle/>
+          <a:p>
+            <a:r>
+              <a:rPr lang="en-US" dirty="0"/>
+              <a:t>Source:</a:t>
+            </a:r>
+          </a:p>
+        </p:txBody>
+      </p:sp>
+      <p:pic>
+        <p:nvPicPr>
+          <p:cNvPr id="6" name="Picture 5">
+            <a:extLst>
+              <a:ext uri="{FF2B5EF4-FFF2-40B4-BE49-F238E27FC236}">
+                <a16:creationId xmlns:a16="http://schemas.microsoft.com/office/drawing/2014/main" id="{4153B4F8-40B1-8945-A736-F916B6F9888A}"/>
+              </a:ext>
+            </a:extLst>
+          </p:cNvPr>
+          <p:cNvPicPr>
+            <a:picLocks noChangeAspect="1"/>
+          </p:cNvPicPr>
+          <p:nvPr/>
+        </p:nvPicPr>
+        <p:blipFill>
+          <a:blip r:embed="rId3"/>
+          <a:stretch>
+            <a:fillRect/>
+          </a:stretch>
+        </p:blipFill>
+        <p:spPr>
+          <a:xfrm>
+            <a:off x="4165600" y="75411"/>
+            <a:ext cx="8026400" cy="2616200"/>
+          </a:xfrm>
+          <a:prstGeom prst="rect">
+            <a:avLst/>
+          </a:prstGeom>
+        </p:spPr>
+      </p:pic>
+      <p:pic>
+        <p:nvPicPr>
+          <p:cNvPr id="7" name="Picture 6">
+            <a:extLst>
+              <a:ext uri="{FF2B5EF4-FFF2-40B4-BE49-F238E27FC236}">
+                <a16:creationId xmlns:a16="http://schemas.microsoft.com/office/drawing/2014/main" id="{16D09B02-58DF-2048-AADA-CDEAE8F97CA2}"/>
+              </a:ext>
+            </a:extLst>
+          </p:cNvPr>
+          <p:cNvPicPr>
+            <a:picLocks noChangeAspect="1"/>
+          </p:cNvPicPr>
+          <p:nvPr/>
+        </p:nvPicPr>
+        <p:blipFill>
+          <a:blip r:embed="rId4"/>
+          <a:stretch>
+            <a:fillRect/>
+          </a:stretch>
+        </p:blipFill>
+        <p:spPr>
+          <a:xfrm>
+            <a:off x="4165600" y="2821442"/>
+            <a:ext cx="8013700" cy="2336800"/>
+          </a:xfrm>
+          <a:prstGeom prst="rect">
+            <a:avLst/>
+          </a:prstGeom>
+        </p:spPr>
+      </p:pic>
+      <p:pic>
+        <p:nvPicPr>
+          <p:cNvPr id="8" name="Picture 7">
+            <a:extLst>
+              <a:ext uri="{FF2B5EF4-FFF2-40B4-BE49-F238E27FC236}">
+                <a16:creationId xmlns:a16="http://schemas.microsoft.com/office/drawing/2014/main" id="{9D18C182-F213-A04D-8901-DBB4932B1239}"/>
+              </a:ext>
+            </a:extLst>
+          </p:cNvPr>
+          <p:cNvPicPr>
+            <a:picLocks noChangeAspect="1"/>
+          </p:cNvPicPr>
+          <p:nvPr/>
+        </p:nvPicPr>
+        <p:blipFill>
+          <a:blip r:embed="rId5"/>
+          <a:stretch>
+            <a:fillRect/>
+          </a:stretch>
+        </p:blipFill>
+        <p:spPr>
+          <a:xfrm>
+            <a:off x="0" y="1838099"/>
+            <a:ext cx="4154535" cy="3254827"/>
+          </a:xfrm>
+          <a:prstGeom prst="rect">
+            <a:avLst/>
+          </a:prstGeom>
+        </p:spPr>
+      </p:pic>
+    </p:spTree>
+    <p:extLst>
+      <p:ext uri="{BB962C8B-B14F-4D97-AF65-F5344CB8AC3E}">
+        <p14:creationId xmlns:p14="http://schemas.microsoft.com/office/powerpoint/2010/main" val="3900789438"/>
+      </p:ext>
+    </p:extLst>
+  </p:cSld>
+  <p:clrMapOvr>
+    <a:masterClrMapping/>
+  </p:clrMapOvr>
+  <mc:AlternateContent xmlns:mc="http://schemas.openxmlformats.org/markup-compatibility/2006" xmlns:p15="http://schemas.microsoft.com/office/powerpoint/2012/main">
+    <mc:Choice Requires="p15">
+      <p:transition xmlns:p14="http://schemas.microsoft.com/office/powerpoint/2010/main" spd="slow" p14:dur="2000">
+        <p15:prstTrans prst="drape"/>
+      </p:transition>
+    </mc:Choice>
+    <mc:Fallback xmlns="">
+      <p:transition spd="slow">
+        <p:fade/>
+      </p:transition>
+    </mc:Fallback>
+  </mc:AlternateContent>
+</p:sld>
+</file>
+
+<file path=ppt/slides/slide16.xml><?xml version="1.0" encoding="utf-8"?>
+<p:sld xmlns:a="http://schemas.openxmlformats.org/drawingml/2006/main" xmlns:r="http://schemas.openxmlformats.org/officeDocument/2006/relationships" xmlns:p="http://schemas.openxmlformats.org/presentationml/2006/main">
+  <p:cSld>
+    <p:spTree>
+      <p:nvGrpSpPr>
+        <p:cNvPr id="1" name=""/>
+        <p:cNvGrpSpPr/>
+        <p:nvPr/>
+      </p:nvGrpSpPr>
+      <p:grpSpPr>
+        <a:xfrm>
+          <a:off x="0" y="0"/>
+          <a:ext cx="0" cy="0"/>
+          <a:chOff x="0" y="0"/>
+          <a:chExt cx="0" cy="0"/>
+        </a:xfrm>
+      </p:grpSpPr>
+      <p:sp>
+        <p:nvSpPr>
+          <p:cNvPr id="2" name="Title 1">
+            <a:extLst>
+              <a:ext uri="{FF2B5EF4-FFF2-40B4-BE49-F238E27FC236}">
+                <a16:creationId xmlns:a16="http://schemas.microsoft.com/office/drawing/2014/main" id="{07C710AF-2F4F-3D43-B36F-54CD3CD3A041}"/>
+              </a:ext>
+            </a:extLst>
+          </p:cNvPr>
+          <p:cNvSpPr>
+            <a:spLocks noGrp="1"/>
+          </p:cNvSpPr>
+          <p:nvPr>
+            <p:ph type="title"/>
+          </p:nvPr>
+        </p:nvSpPr>
+        <p:spPr>
+          <a:xfrm>
+            <a:off x="0" y="0"/>
+            <a:ext cx="3927764" cy="1325563"/>
+          </a:xfrm>
+        </p:spPr>
+        <p:txBody>
+          <a:bodyPr/>
+          <a:lstStyle/>
+          <a:p>
+            <a:r>
+              <a:rPr lang="en-US" dirty="0"/>
+              <a:t>Scheduling Plans</a:t>
+            </a:r>
+          </a:p>
+        </p:txBody>
+      </p:sp>
+      <p:sp>
+        <p:nvSpPr>
+          <p:cNvPr id="3" name="Content Placeholder 2">
+            <a:extLst>
+              <a:ext uri="{FF2B5EF4-FFF2-40B4-BE49-F238E27FC236}">
+                <a16:creationId xmlns:a16="http://schemas.microsoft.com/office/drawing/2014/main" id="{A4FD1ED8-29EF-5B47-B3B5-7E0835781095}"/>
+              </a:ext>
+            </a:extLst>
+          </p:cNvPr>
+          <p:cNvSpPr>
+            <a:spLocks noGrp="1"/>
+          </p:cNvSpPr>
+          <p:nvPr>
+            <p:ph idx="1"/>
+          </p:nvPr>
+        </p:nvSpPr>
+        <p:spPr/>
+        <p:txBody>
+          <a:bodyPr/>
+          <a:lstStyle/>
+          <a:p>
+            <a:r>
+              <a:rPr lang="en-US" dirty="0"/>
+              <a:t>Sequential execution requires 74 days. One possible order is: devise logo-&gt;seize control-&gt;get shots-&gt;build fleet-&gt;open chains-&gt;</a:t>
+            </a:r>
+            <a:br>
+              <a:rPr lang="en-US" dirty="0"/>
+            </a:br>
+            <a:r>
+              <a:rPr lang="en-US" dirty="0"/>
+              <a:t>train army-&gt;launch fleet-&gt;defeat Microsoft.</a:t>
+            </a:r>
+          </a:p>
+          <a:p>
+            <a:r>
+              <a:rPr lang="en-US" dirty="0"/>
+              <a:t>Estimation based on equal division of work is too optimistic and gives 37 days. This ideal parallelism cannot be achieved here due to interdependencies between tasks of different weights.</a:t>
+            </a:r>
+          </a:p>
+          <a:p>
+            <a:r>
+              <a:rPr lang="en-US" dirty="0"/>
+              <a:t>Estimation based on critical path is also too low and gives 39 days. It cannot be achieved, as blindly following the critical path would result in extra 2 days of idle time.</a:t>
+            </a:r>
+          </a:p>
+          <a:p>
+            <a:r>
+              <a:rPr lang="en-US" dirty="0"/>
+              <a:t>The minimum number of days to finish the project is 40 days.</a:t>
+            </a:r>
+          </a:p>
+        </p:txBody>
+      </p:sp>
+      <p:pic>
+        <p:nvPicPr>
+          <p:cNvPr id="4" name="Picture 3">
+            <a:extLst>
+              <a:ext uri="{FF2B5EF4-FFF2-40B4-BE49-F238E27FC236}">
+                <a16:creationId xmlns:a16="http://schemas.microsoft.com/office/drawing/2014/main" id="{797997D3-2836-EF48-92AC-F7200FCD82A5}"/>
+              </a:ext>
+            </a:extLst>
+          </p:cNvPr>
+          <p:cNvPicPr>
+            <a:picLocks noChangeAspect="1"/>
+          </p:cNvPicPr>
+          <p:nvPr/>
+        </p:nvPicPr>
+        <p:blipFill>
+          <a:blip r:embed="rId2"/>
+          <a:stretch>
+            <a:fillRect/>
+          </a:stretch>
+        </p:blipFill>
+        <p:spPr>
+          <a:xfrm>
+            <a:off x="4140200" y="1588"/>
+            <a:ext cx="8051800" cy="1689100"/>
+          </a:xfrm>
+          <a:prstGeom prst="rect">
+            <a:avLst/>
+          </a:prstGeom>
+        </p:spPr>
+      </p:pic>
+    </p:spTree>
+    <p:extLst>
+      <p:ext uri="{BB962C8B-B14F-4D97-AF65-F5344CB8AC3E}">
+        <p14:creationId xmlns:p14="http://schemas.microsoft.com/office/powerpoint/2010/main" val="1359481260"/>
+      </p:ext>
+    </p:extLst>
+  </p:cSld>
+  <p:clrMapOvr>
+    <a:masterClrMapping/>
+  </p:clrMapOvr>
+  <mc:AlternateContent xmlns:mc="http://schemas.openxmlformats.org/markup-compatibility/2006" xmlns:p15="http://schemas.microsoft.com/office/powerpoint/2012/main">
+    <mc:Choice Requires="p15">
+      <p:transition xmlns:p14="http://schemas.microsoft.com/office/powerpoint/2010/main" spd="slow" p14:dur="2000">
+        <p15:prstTrans prst="drape"/>
+      </p:transition>
+    </mc:Choice>
+    <mc:Fallback xmlns="">
+      <p:transition spd="slow">
+        <p:fade/>
+      </p:transition>
+    </mc:Fallback>
+  </mc:AlternateContent>
+  <p:timing>
+    <p:tnLst>
+      <p:par>
+        <p:cTn id="1" dur="indefinite" restart="never" nodeType="tmRoot">
+          <p:childTnLst>
+            <p:seq concurrent="1" nextAc="seek">
+              <p:cTn id="2" dur="indefinite" nodeType="mainSeq">
+                <p:childTnLst>
+                  <p:par>
+                    <p:cTn id="3" fill="hold">
+                      <p:stCondLst>
+                        <p:cond delay="indefinite"/>
+                      </p:stCondLst>
+                      <p:childTnLst>
+                        <p:par>
+                          <p:cTn id="4" fill="hold">
+                            <p:stCondLst>
+                              <p:cond delay="0"/>
+                            </p:stCondLst>
+                            <p:childTnLst>
+                              <p:par>
+                                <p:cTn id="5" presetID="2" presetClass="entr" presetSubtype="4" fill="hold" grpId="0" nodeType="clickEffect">
+                                  <p:stCondLst>
+                                    <p:cond delay="0"/>
+                                  </p:stCondLst>
+                                  <p:childTnLst>
+                                    <p:set>
+                                      <p:cBhvr>
+                                        <p:cTn id="6" dur="1" fill="hold">
+                                          <p:stCondLst>
+                                            <p:cond delay="0"/>
+                                          </p:stCondLst>
+                                        </p:cTn>
+                                        <p:tgtEl>
+                                          <p:spTgt spid="3">
+                                            <p:txEl>
+                                              <p:pRg st="0" end="0"/>
+                                            </p:txEl>
+                                          </p:spTgt>
+                                        </p:tgtEl>
+                                        <p:attrNameLst>
+                                          <p:attrName>style.visibility</p:attrName>
+                                        </p:attrNameLst>
+                                      </p:cBhvr>
+                                      <p:to>
+                                        <p:strVal val="visible"/>
+                                      </p:to>
+                                    </p:set>
+                                    <p:anim calcmode="lin" valueType="num">
+                                      <p:cBhvr additive="base">
+                                        <p:cTn id="7" dur="500" fill="hold"/>
+                                        <p:tgtEl>
+                                          <p:spTgt spid="3">
+                                            <p:txEl>
+                                              <p:pRg st="0" end="0"/>
+                                            </p:txEl>
+                                          </p:spTgt>
+                                        </p:tgtEl>
+                                        <p:attrNameLst>
+                                          <p:attrName>ppt_x</p:attrName>
+                                        </p:attrNameLst>
+                                      </p:cBhvr>
+                                      <p:tavLst>
+                                        <p:tav tm="0">
+                                          <p:val>
+                                            <p:strVal val="#ppt_x"/>
+                                          </p:val>
+                                        </p:tav>
+                                        <p:tav tm="100000">
+                                          <p:val>
+                                            <p:strVal val="#ppt_x"/>
+                                          </p:val>
+                                        </p:tav>
+                                      </p:tavLst>
+                                    </p:anim>
+                                    <p:anim calcmode="lin" valueType="num">
+                                      <p:cBhvr additive="base">
+                                        <p:cTn id="8" dur="500" fill="hold"/>
+                                        <p:tgtEl>
+                                          <p:spTgt spid="3">
+                                            <p:txEl>
+                                              <p:pRg st="0" end="0"/>
+                                            </p:txEl>
+                                          </p:spTgt>
+                                        </p:tgtEl>
+                                        <p:attrNameLst>
+                                          <p:attrName>ppt_y</p:attrName>
+                                        </p:attrNameLst>
+                                      </p:cBhvr>
+                                      <p:tavLst>
+                                        <p:tav tm="0">
+                                          <p:val>
+                                            <p:strVal val="1+#ppt_h/2"/>
+                                          </p:val>
+                                        </p:tav>
+                                        <p:tav tm="100000">
+                                          <p:val>
+                                            <p:strVal val="#ppt_y"/>
+                                          </p:val>
+                                        </p:tav>
+                                      </p:tavLst>
+                                    </p:anim>
+                                  </p:childTnLst>
+                                </p:cTn>
+                              </p:par>
+                            </p:childTnLst>
+                          </p:cTn>
+                        </p:par>
+                      </p:childTnLst>
+                    </p:cTn>
+                  </p:par>
+                  <p:par>
+                    <p:cTn id="9" fill="hold">
+                      <p:stCondLst>
+                        <p:cond delay="indefinite"/>
+                      </p:stCondLst>
+                      <p:childTnLst>
+                        <p:par>
+                          <p:cTn id="10" fill="hold">
+                            <p:stCondLst>
+                              <p:cond delay="0"/>
+                            </p:stCondLst>
+                            <p:childTnLst>
+                              <p:par>
+                                <p:cTn id="11" presetID="6" presetClass="entr" presetSubtype="16" fill="hold" nodeType="clickEffect">
+                                  <p:stCondLst>
+                                    <p:cond delay="0"/>
+                                  </p:stCondLst>
+                                  <p:childTnLst>
+                                    <p:set>
+                                      <p:cBhvr>
+                                        <p:cTn id="12" dur="1" fill="hold">
+                                          <p:stCondLst>
+                                            <p:cond delay="0"/>
+                                          </p:stCondLst>
+                                        </p:cTn>
+                                        <p:tgtEl>
+                                          <p:spTgt spid="4"/>
+                                        </p:tgtEl>
+                                        <p:attrNameLst>
+                                          <p:attrName>style.visibility</p:attrName>
+                                        </p:attrNameLst>
+                                      </p:cBhvr>
+                                      <p:to>
+                                        <p:strVal val="visible"/>
+                                      </p:to>
+                                    </p:set>
+                                    <p:animEffect transition="in" filter="circle(in)">
+                                      <p:cBhvr>
+                                        <p:cTn id="13" dur="2000"/>
+                                        <p:tgtEl>
+                                          <p:spTgt spid="4"/>
+                                        </p:tgtEl>
+                                      </p:cBhvr>
+                                    </p:animEffect>
+                                  </p:childTnLst>
+                                </p:cTn>
+                              </p:par>
+                            </p:childTnLst>
+                          </p:cTn>
+                        </p:par>
+                      </p:childTnLst>
+                    </p:cTn>
+                  </p:par>
+                  <p:par>
+                    <p:cTn id="14" fill="hold">
+                      <p:stCondLst>
+                        <p:cond delay="indefinite"/>
+                      </p:stCondLst>
+                      <p:childTnLst>
+                        <p:par>
+                          <p:cTn id="15" fill="hold">
+                            <p:stCondLst>
+                              <p:cond delay="0"/>
+                            </p:stCondLst>
+                            <p:childTnLst>
+                              <p:par>
+                                <p:cTn id="16" presetID="2" presetClass="entr" presetSubtype="4" fill="hold" grpId="0" nodeType="clickEffect">
+                                  <p:stCondLst>
+                                    <p:cond delay="0"/>
+                                  </p:stCondLst>
+                                  <p:childTnLst>
+                                    <p:set>
+                                      <p:cBhvr>
+                                        <p:cTn id="17" dur="1" fill="hold">
+                                          <p:stCondLst>
+                                            <p:cond delay="0"/>
+                                          </p:stCondLst>
+                                        </p:cTn>
+                                        <p:tgtEl>
+                                          <p:spTgt spid="3">
+                                            <p:txEl>
+                                              <p:pRg st="1" end="1"/>
+                                            </p:txEl>
+                                          </p:spTgt>
+                                        </p:tgtEl>
+                                        <p:attrNameLst>
+                                          <p:attrName>style.visibility</p:attrName>
+                                        </p:attrNameLst>
+                                      </p:cBhvr>
+                                      <p:to>
+                                        <p:strVal val="visible"/>
+                                      </p:to>
+                                    </p:set>
+                                    <p:anim calcmode="lin" valueType="num">
+                                      <p:cBhvr additive="base">
+                                        <p:cTn id="18" dur="500" fill="hold"/>
+                                        <p:tgtEl>
+                                          <p:spTgt spid="3">
+                                            <p:txEl>
+                                              <p:pRg st="1" end="1"/>
+                                            </p:txEl>
+                                          </p:spTgt>
+                                        </p:tgtEl>
+                                        <p:attrNameLst>
+                                          <p:attrName>ppt_x</p:attrName>
+                                        </p:attrNameLst>
+                                      </p:cBhvr>
+                                      <p:tavLst>
+                                        <p:tav tm="0">
+                                          <p:val>
+                                            <p:strVal val="#ppt_x"/>
+                                          </p:val>
+                                        </p:tav>
+                                        <p:tav tm="100000">
+                                          <p:val>
+                                            <p:strVal val="#ppt_x"/>
+                                          </p:val>
+                                        </p:tav>
+                                      </p:tavLst>
+                                    </p:anim>
+                                    <p:anim calcmode="lin" valueType="num">
+                                      <p:cBhvr additive="base">
+                                        <p:cTn id="19" dur="500" fill="hold"/>
+                                        <p:tgtEl>
+                                          <p:spTgt spid="3">
+                                            <p:txEl>
+                                              <p:pRg st="1" end="1"/>
+                                            </p:txEl>
+                                          </p:spTgt>
+                                        </p:tgtEl>
+                                        <p:attrNameLst>
+                                          <p:attrName>ppt_y</p:attrName>
+                                        </p:attrNameLst>
+                                      </p:cBhvr>
+                                      <p:tavLst>
+                                        <p:tav tm="0">
+                                          <p:val>
+                                            <p:strVal val="1+#ppt_h/2"/>
+                                          </p:val>
+                                        </p:tav>
+                                        <p:tav tm="100000">
+                                          <p:val>
+                                            <p:strVal val="#ppt_y"/>
+                                          </p:val>
+                                        </p:tav>
+                                      </p:tavLst>
+                                    </p:anim>
+                                  </p:childTnLst>
+                                </p:cTn>
+                              </p:par>
+                            </p:childTnLst>
+                          </p:cTn>
+                        </p:par>
+                      </p:childTnLst>
+                    </p:cTn>
+                  </p:par>
+                  <p:par>
+                    <p:cTn id="20" fill="hold">
+                      <p:stCondLst>
+                        <p:cond delay="indefinite"/>
+                      </p:stCondLst>
+                      <p:childTnLst>
+                        <p:par>
+                          <p:cTn id="21" fill="hold">
+                            <p:stCondLst>
+                              <p:cond delay="0"/>
+                            </p:stCondLst>
+                            <p:childTnLst>
+                              <p:par>
+                                <p:cTn id="22" presetID="2" presetClass="entr" presetSubtype="4" fill="hold" grpId="0" nodeType="clickEffect">
+                                  <p:stCondLst>
+                                    <p:cond delay="0"/>
+                                  </p:stCondLst>
+                                  <p:childTnLst>
+                                    <p:set>
+                                      <p:cBhvr>
+                                        <p:cTn id="23" dur="1" fill="hold">
+                                          <p:stCondLst>
+                                            <p:cond delay="0"/>
+                                          </p:stCondLst>
+                                        </p:cTn>
+                                        <p:tgtEl>
+                                          <p:spTgt spid="3">
+                                            <p:txEl>
+                                              <p:pRg st="2" end="2"/>
+                                            </p:txEl>
+                                          </p:spTgt>
+                                        </p:tgtEl>
+                                        <p:attrNameLst>
+                                          <p:attrName>style.visibility</p:attrName>
+                                        </p:attrNameLst>
+                                      </p:cBhvr>
+                                      <p:to>
+                                        <p:strVal val="visible"/>
+                                      </p:to>
+                                    </p:set>
+                                    <p:anim calcmode="lin" valueType="num">
+                                      <p:cBhvr additive="base">
+                                        <p:cTn id="24" dur="500" fill="hold"/>
+                                        <p:tgtEl>
+                                          <p:spTgt spid="3">
+                                            <p:txEl>
+                                              <p:pRg st="2" end="2"/>
+                                            </p:txEl>
+                                          </p:spTgt>
+                                        </p:tgtEl>
+                                        <p:attrNameLst>
+                                          <p:attrName>ppt_x</p:attrName>
+                                        </p:attrNameLst>
+                                      </p:cBhvr>
+                                      <p:tavLst>
+                                        <p:tav tm="0">
+                                          <p:val>
+                                            <p:strVal val="#ppt_x"/>
+                                          </p:val>
+                                        </p:tav>
+                                        <p:tav tm="100000">
+                                          <p:val>
+                                            <p:strVal val="#ppt_x"/>
+                                          </p:val>
+                                        </p:tav>
+                                      </p:tavLst>
+                                    </p:anim>
+                                    <p:anim calcmode="lin" valueType="num">
+                                      <p:cBhvr additive="base">
+                                        <p:cTn id="25" dur="500" fill="hold"/>
+                                        <p:tgtEl>
+                                          <p:spTgt spid="3">
+                                            <p:txEl>
+                                              <p:pRg st="2" end="2"/>
+                                            </p:txEl>
+                                          </p:spTgt>
+                                        </p:tgtEl>
+                                        <p:attrNameLst>
+                                          <p:attrName>ppt_y</p:attrName>
+                                        </p:attrNameLst>
+                                      </p:cBhvr>
+                                      <p:tavLst>
+                                        <p:tav tm="0">
+                                          <p:val>
+                                            <p:strVal val="1+#ppt_h/2"/>
+                                          </p:val>
+                                        </p:tav>
+                                        <p:tav tm="100000">
+                                          <p:val>
+                                            <p:strVal val="#ppt_y"/>
+                                          </p:val>
+                                        </p:tav>
+                                      </p:tavLst>
+                                    </p:anim>
+                                  </p:childTnLst>
+                                </p:cTn>
+                              </p:par>
+                            </p:childTnLst>
+                          </p:cTn>
+                        </p:par>
+                      </p:childTnLst>
+                    </p:cTn>
+                  </p:par>
+                  <p:par>
+                    <p:cTn id="26" fill="hold">
+                      <p:stCondLst>
+                        <p:cond delay="indefinite"/>
+                      </p:stCondLst>
+                      <p:childTnLst>
+                        <p:par>
+                          <p:cTn id="27" fill="hold">
+                            <p:stCondLst>
+                              <p:cond delay="0"/>
+                            </p:stCondLst>
+                            <p:childTnLst>
+                              <p:par>
+                                <p:cTn id="28" presetID="2" presetClass="entr" presetSubtype="4" fill="hold" grpId="0" nodeType="clickEffect">
+                                  <p:stCondLst>
+                                    <p:cond delay="0"/>
+                                  </p:stCondLst>
+                                  <p:childTnLst>
+                                    <p:set>
+                                      <p:cBhvr>
+                                        <p:cTn id="29" dur="1" fill="hold">
+                                          <p:stCondLst>
+                                            <p:cond delay="0"/>
+                                          </p:stCondLst>
+                                        </p:cTn>
+                                        <p:tgtEl>
+                                          <p:spTgt spid="3">
+                                            <p:txEl>
+                                              <p:pRg st="3" end="3"/>
+                                            </p:txEl>
+                                          </p:spTgt>
+                                        </p:tgtEl>
+                                        <p:attrNameLst>
+                                          <p:attrName>style.visibility</p:attrName>
+                                        </p:attrNameLst>
+                                      </p:cBhvr>
+                                      <p:to>
+                                        <p:strVal val="visible"/>
+                                      </p:to>
+                                    </p:set>
+                                    <p:anim calcmode="lin" valueType="num">
+                                      <p:cBhvr additive="base">
+                                        <p:cTn id="30" dur="500" fill="hold"/>
+                                        <p:tgtEl>
+                                          <p:spTgt spid="3">
+                                            <p:txEl>
+                                              <p:pRg st="3" end="3"/>
+                                            </p:txEl>
+                                          </p:spTgt>
+                                        </p:tgtEl>
+                                        <p:attrNameLst>
+                                          <p:attrName>ppt_x</p:attrName>
+                                        </p:attrNameLst>
+                                      </p:cBhvr>
+                                      <p:tavLst>
+                                        <p:tav tm="0">
+                                          <p:val>
+                                            <p:strVal val="#ppt_x"/>
+                                          </p:val>
+                                        </p:tav>
+                                        <p:tav tm="100000">
+                                          <p:val>
+                                            <p:strVal val="#ppt_x"/>
+                                          </p:val>
+                                        </p:tav>
+                                      </p:tavLst>
+                                    </p:anim>
+                                    <p:anim calcmode="lin" valueType="num">
+                                      <p:cBhvr additive="base">
+                                        <p:cTn id="31" dur="500" fill="hold"/>
+                                        <p:tgtEl>
+                                          <p:spTgt spid="3">
+                                            <p:txEl>
+                                              <p:pRg st="3" end="3"/>
+                                            </p:txEl>
+                                          </p:spTgt>
+                                        </p:tgtEl>
+                                        <p:attrNameLst>
+                                          <p:attrName>ppt_y</p:attrName>
+                                        </p:attrNameLst>
+                                      </p:cBhvr>
+                                      <p:tavLst>
+                                        <p:tav tm="0">
+                                          <p:val>
+                                            <p:strVal val="1+#ppt_h/2"/>
+                                          </p:val>
+                                        </p:tav>
+                                        <p:tav tm="100000">
+                                          <p:val>
+                                            <p:strVal val="#ppt_y"/>
+                                          </p:val>
+                                        </p:tav>
+                                      </p:tavLst>
+                                    </p:anim>
+                                  </p:childTnLst>
+                                </p:cTn>
+                              </p:par>
+                            </p:childTnLst>
+                          </p:cTn>
+                        </p:par>
+                      </p:childTnLst>
+                    </p:cTn>
+                  </p:par>
+                </p:childTnLst>
+              </p:cTn>
+              <p:prevCondLst>
+                <p:cond evt="onPrev" delay="0">
+                  <p:tgtEl>
+                    <p:sldTgt/>
+                  </p:tgtEl>
+                </p:cond>
+              </p:prevCondLst>
+              <p:nextCondLst>
+                <p:cond evt="onNext" delay="0">
+                  <p:tgtEl>
+                    <p:sldTgt/>
+                  </p:tgtEl>
+                </p:cond>
+              </p:nextCondLst>
+            </p:seq>
+          </p:childTnLst>
+        </p:cTn>
+      </p:par>
+    </p:tnLst>
+    <p:bldLst>
+      <p:bldP spid="3" grpId="0" uiExpand="1" build="p"/>
+    </p:bldLst>
+  </p:timing>
+</p:sld>
+</file>
+
+<file path=ppt/slides/slide17.xml><?xml version="1.0" encoding="utf-8"?>
 <p:sld xmlns:a="http://schemas.openxmlformats.org/drawingml/2006/main" xmlns:r="http://schemas.openxmlformats.org/officeDocument/2006/relationships" xmlns:p="http://schemas.openxmlformats.org/presentationml/2006/main">
   <p:cSld>
     <p:bg>
@@ -14164,7 +15090,7 @@
               <a:tabLst/>
               <a:defRPr/>
             </a:pPr>
-            <a:endParaRPr kumimoji="0" lang="en-US" sz="1800" b="0" i="0" u="none" strike="noStrike" kern="1200" cap="none" spc="0" normalizeH="0" baseline="0" noProof="0">
+            <a:endParaRPr kumimoji="0" lang="en-US" sz="1800" b="0" i="0" u="none" strike="noStrike" kern="1200" cap="none" spc="0" normalizeH="0" baseline="0" noProof="0" dirty="0">
               <a:ln>
                 <a:noFill/>
               </a:ln>
@@ -14211,7 +15137,7 @@
           <a:p>
             <a:pPr algn="r"/>
             <a:r>
-              <a:rPr lang="en-US" sz="4800">
+              <a:rPr lang="en-US" sz="4800" dirty="0">
                 <a:solidFill>
                   <a:srgbClr val="FFFFFF"/>
                 </a:solidFill>
@@ -14345,7 +15271,7 @@
 </p:sld>
 </file>
 
-<file path=ppt/slides/slide16.xml><?xml version="1.0" encoding="utf-8"?>
+<file path=ppt/slides/slide18.xml><?xml version="1.0" encoding="utf-8"?>
 <p:sld xmlns:a="http://schemas.openxmlformats.org/drawingml/2006/main" xmlns:r="http://schemas.openxmlformats.org/officeDocument/2006/relationships" xmlns:p="http://schemas.openxmlformats.org/presentationml/2006/main">
   <p:cSld>
     <p:bg>
@@ -14592,7 +15518,7 @@
 </p:sld>
 </file>
 
-<file path=ppt/slides/slide17.xml><?xml version="1.0" encoding="utf-8"?>
+<file path=ppt/slides/slide19.xml><?xml version="1.0" encoding="utf-8"?>
 <p:sld xmlns:a="http://schemas.openxmlformats.org/drawingml/2006/main" xmlns:r="http://schemas.openxmlformats.org/officeDocument/2006/relationships" xmlns:p="http://schemas.openxmlformats.org/presentationml/2006/main">
   <p:cSld>
     <p:bg>
@@ -20015,8 +20941,8 @@
           </a:fontRef>
         </p:style>
       </p:cxnSp>
-      <mc:AlternateContent xmlns:mc="http://schemas.openxmlformats.org/markup-compatibility/2006" xmlns:a14="http://schemas.microsoft.com/office/drawing/2010/main">
-        <mc:Choice Requires="a14">
+      <mc:AlternateContent xmlns:mc="http://schemas.openxmlformats.org/markup-compatibility/2006">
+        <mc:Choice xmlns:a14="http://schemas.microsoft.com/office/drawing/2010/main" Requires="a14">
           <p:sp>
             <p:nvSpPr>
               <p:cNvPr id="3" name="Content Placeholder 2">
@@ -20474,7 +21400,7 @@
             </p:txBody>
           </p:sp>
         </mc:Choice>
-        <mc:Fallback xmlns="">
+        <mc:Fallback>
           <p:sp>
             <p:nvSpPr>
               <p:cNvPr id="3" name="Content Placeholder 2">

</xml_diff>